<commit_message>
Updated memory leak avoidance slides
</commit_message>
<xml_diff>
--- a/ppt/Garbage Collection and Memory Leak Avoidance in .NET.pptx
+++ b/ppt/Garbage Collection and Memory Leak Avoidance in .NET.pptx
@@ -7,7 +7,9 @@
   <p:sldIdLst>
     <p:sldId id="262" r:id="rId2"/>
     <p:sldId id="263" r:id="rId3"/>
-    <p:sldId id="261" r:id="rId4"/>
+    <p:sldId id="264" r:id="rId4"/>
+    <p:sldId id="265" r:id="rId5"/>
+    <p:sldId id="261" r:id="rId6"/>
   </p:sldIdLst>
   <p:sldSz cx="9144000" cy="6858000" type="screen4x3"/>
   <p:notesSz cx="6858000" cy="9144000"/>
@@ -1864,6 +1866,478 @@
 </file>
 
 <file path=ppt/slides/slide3.xml><?xml version="1.0" encoding="utf-8"?>
+<p:sld xmlns:a="http://schemas.openxmlformats.org/drawingml/2006/main" xmlns:r="http://schemas.openxmlformats.org/officeDocument/2006/relationships" xmlns:p="http://schemas.openxmlformats.org/presentationml/2006/main">
+  <p:cSld>
+    <p:spTree>
+      <p:nvGrpSpPr>
+        <p:cNvPr id="1" name=""/>
+        <p:cNvGrpSpPr/>
+        <p:nvPr/>
+      </p:nvGrpSpPr>
+      <p:grpSpPr>
+        <a:xfrm>
+          <a:off x="0" y="0"/>
+          <a:ext cx="0" cy="0"/>
+          <a:chOff x="0" y="0"/>
+          <a:chExt cx="0" cy="0"/>
+        </a:xfrm>
+      </p:grpSpPr>
+      <p:sp>
+        <p:nvSpPr>
+          <p:cNvPr id="2" name="Title 1"/>
+          <p:cNvSpPr>
+            <a:spLocks noGrp="1"/>
+          </p:cNvSpPr>
+          <p:nvPr>
+            <p:ph type="title"/>
+          </p:nvPr>
+        </p:nvSpPr>
+        <p:spPr/>
+        <p:txBody>
+          <a:bodyPr/>
+          <a:lstStyle/>
+          <a:p>
+            <a:r>
+              <a:rPr lang="en-US" dirty="0" smtClean="0"/>
+              <a:t>Tracing (Generational) GC algorithm</a:t>
+            </a:r>
+            <a:endParaRPr lang="en-US" dirty="0"/>
+          </a:p>
+        </p:txBody>
+      </p:sp>
+      <p:sp>
+        <p:nvSpPr>
+          <p:cNvPr id="3" name="Content Placeholder 2"/>
+          <p:cNvSpPr txBox="1">
+            <a:spLocks/>
+          </p:cNvSpPr>
+          <p:nvPr/>
+        </p:nvSpPr>
+        <p:spPr>
+          <a:xfrm>
+            <a:off x="611560" y="1196752"/>
+            <a:ext cx="8280920" cy="5112567"/>
+          </a:xfrm>
+          <a:prstGeom prst="rect">
+            <a:avLst/>
+          </a:prstGeom>
+        </p:spPr>
+        <p:txBody>
+          <a:bodyPr/>
+          <a:lstStyle>
+            <a:lvl1pPr marL="342900" indent="-342900" algn="l" defTabSz="914400" rtl="0" eaLnBrk="1" latinLnBrk="0" hangingPunct="1">
+              <a:spcBef>
+                <a:spcPct val="20000"/>
+              </a:spcBef>
+              <a:buFont typeface="Arial" pitchFamily="34" charset="0"/>
+              <a:buChar char="•"/>
+              <a:defRPr sz="3200" kern="1200">
+                <a:solidFill>
+                  <a:schemeClr val="tx1"/>
+                </a:solidFill>
+                <a:latin typeface="+mn-lt"/>
+                <a:ea typeface="+mn-ea"/>
+                <a:cs typeface="+mn-cs"/>
+              </a:defRPr>
+            </a:lvl1pPr>
+            <a:lvl2pPr marL="742950" indent="-285750" algn="l" defTabSz="914400" rtl="0" eaLnBrk="1" latinLnBrk="0" hangingPunct="1">
+              <a:spcBef>
+                <a:spcPct val="20000"/>
+              </a:spcBef>
+              <a:buFont typeface="Arial" pitchFamily="34" charset="0"/>
+              <a:buChar char="–"/>
+              <a:defRPr sz="2800" kern="1200">
+                <a:solidFill>
+                  <a:schemeClr val="tx1"/>
+                </a:solidFill>
+                <a:latin typeface="+mn-lt"/>
+                <a:ea typeface="+mn-ea"/>
+                <a:cs typeface="+mn-cs"/>
+              </a:defRPr>
+            </a:lvl2pPr>
+            <a:lvl3pPr marL="1143000" indent="-228600" algn="l" defTabSz="914400" rtl="0" eaLnBrk="1" latinLnBrk="0" hangingPunct="1">
+              <a:spcBef>
+                <a:spcPct val="20000"/>
+              </a:spcBef>
+              <a:buFont typeface="Arial" pitchFamily="34" charset="0"/>
+              <a:buChar char="•"/>
+              <a:defRPr sz="2400" kern="1200">
+                <a:solidFill>
+                  <a:schemeClr val="tx1"/>
+                </a:solidFill>
+                <a:latin typeface="+mn-lt"/>
+                <a:ea typeface="+mn-ea"/>
+                <a:cs typeface="+mn-cs"/>
+              </a:defRPr>
+            </a:lvl3pPr>
+            <a:lvl4pPr marL="1600200" indent="-228600" algn="l" defTabSz="914400" rtl="0" eaLnBrk="1" latinLnBrk="0" hangingPunct="1">
+              <a:spcBef>
+                <a:spcPct val="20000"/>
+              </a:spcBef>
+              <a:buFont typeface="Arial" pitchFamily="34" charset="0"/>
+              <a:buChar char="–"/>
+              <a:defRPr sz="2000" kern="1200">
+                <a:solidFill>
+                  <a:schemeClr val="tx1"/>
+                </a:solidFill>
+                <a:latin typeface="+mn-lt"/>
+                <a:ea typeface="+mn-ea"/>
+                <a:cs typeface="+mn-cs"/>
+              </a:defRPr>
+            </a:lvl4pPr>
+            <a:lvl5pPr marL="2057400" indent="-228600" algn="l" defTabSz="914400" rtl="0" eaLnBrk="1" latinLnBrk="0" hangingPunct="1">
+              <a:spcBef>
+                <a:spcPct val="20000"/>
+              </a:spcBef>
+              <a:buFont typeface="Arial" pitchFamily="34" charset="0"/>
+              <a:buChar char="»"/>
+              <a:defRPr sz="2000" kern="1200">
+                <a:solidFill>
+                  <a:schemeClr val="tx1"/>
+                </a:solidFill>
+                <a:latin typeface="+mn-lt"/>
+                <a:ea typeface="+mn-ea"/>
+                <a:cs typeface="+mn-cs"/>
+              </a:defRPr>
+            </a:lvl5pPr>
+            <a:lvl6pPr marL="2514600" indent="-228600" algn="l" defTabSz="914400" rtl="0" eaLnBrk="1" latinLnBrk="0" hangingPunct="1">
+              <a:spcBef>
+                <a:spcPct val="20000"/>
+              </a:spcBef>
+              <a:buFont typeface="Arial" pitchFamily="34" charset="0"/>
+              <a:buChar char="•"/>
+              <a:defRPr sz="2000" kern="1200">
+                <a:solidFill>
+                  <a:schemeClr val="tx1"/>
+                </a:solidFill>
+                <a:latin typeface="+mn-lt"/>
+                <a:ea typeface="+mn-ea"/>
+                <a:cs typeface="+mn-cs"/>
+              </a:defRPr>
+            </a:lvl6pPr>
+            <a:lvl7pPr marL="2971800" indent="-228600" algn="l" defTabSz="914400" rtl="0" eaLnBrk="1" latinLnBrk="0" hangingPunct="1">
+              <a:spcBef>
+                <a:spcPct val="20000"/>
+              </a:spcBef>
+              <a:buFont typeface="Arial" pitchFamily="34" charset="0"/>
+              <a:buChar char="•"/>
+              <a:defRPr sz="2000" kern="1200">
+                <a:solidFill>
+                  <a:schemeClr val="tx1"/>
+                </a:solidFill>
+                <a:latin typeface="+mn-lt"/>
+                <a:ea typeface="+mn-ea"/>
+                <a:cs typeface="+mn-cs"/>
+              </a:defRPr>
+            </a:lvl7pPr>
+            <a:lvl8pPr marL="3429000" indent="-228600" algn="l" defTabSz="914400" rtl="0" eaLnBrk="1" latinLnBrk="0" hangingPunct="1">
+              <a:spcBef>
+                <a:spcPct val="20000"/>
+              </a:spcBef>
+              <a:buFont typeface="Arial" pitchFamily="34" charset="0"/>
+              <a:buChar char="•"/>
+              <a:defRPr sz="2000" kern="1200">
+                <a:solidFill>
+                  <a:schemeClr val="tx1"/>
+                </a:solidFill>
+                <a:latin typeface="+mn-lt"/>
+                <a:ea typeface="+mn-ea"/>
+                <a:cs typeface="+mn-cs"/>
+              </a:defRPr>
+            </a:lvl8pPr>
+            <a:lvl9pPr marL="3886200" indent="-228600" algn="l" defTabSz="914400" rtl="0" eaLnBrk="1" latinLnBrk="0" hangingPunct="1">
+              <a:spcBef>
+                <a:spcPct val="20000"/>
+              </a:spcBef>
+              <a:buFont typeface="Arial" pitchFamily="34" charset="0"/>
+              <a:buChar char="•"/>
+              <a:defRPr sz="2000" kern="1200">
+                <a:solidFill>
+                  <a:schemeClr val="tx1"/>
+                </a:solidFill>
+                <a:latin typeface="+mn-lt"/>
+                <a:ea typeface="+mn-ea"/>
+                <a:cs typeface="+mn-cs"/>
+              </a:defRPr>
+            </a:lvl9pPr>
+          </a:lstStyle>
+          <a:p>
+            <a:r>
+              <a:rPr lang="en-US" sz="2400" dirty="0" smtClean="0"/>
+              <a:t>How garbage collector works in .NET</a:t>
+            </a:r>
+          </a:p>
+          <a:p>
+            <a:r>
+              <a:rPr lang="en-US" sz="2400" dirty="0" smtClean="0"/>
+              <a:t>What is a memory leak, and why it is bad.</a:t>
+            </a:r>
+          </a:p>
+          <a:p>
+            <a:r>
+              <a:rPr lang="en-US" sz="2400" dirty="0" smtClean="0"/>
+              <a:t>What might be a reason of memory leak</a:t>
+            </a:r>
+          </a:p>
+          <a:p>
+            <a:r>
+              <a:rPr lang="en-US" sz="2400" dirty="0" smtClean="0"/>
+              <a:t>What tool we have to profile application memory consuming.</a:t>
+            </a:r>
+          </a:p>
+          <a:p>
+            <a:r>
+              <a:rPr lang="en-US" sz="2400" dirty="0" smtClean="0"/>
+              <a:t>Design principles to avoid memory leak problems.</a:t>
+            </a:r>
+          </a:p>
+          <a:p>
+            <a:endParaRPr lang="ru-RU" sz="2400" dirty="0"/>
+          </a:p>
+        </p:txBody>
+      </p:sp>
+    </p:spTree>
+    <p:extLst>
+      <p:ext uri="{BB962C8B-B14F-4D97-AF65-F5344CB8AC3E}">
+        <p14:creationId xmlns:p14="http://schemas.microsoft.com/office/powerpoint/2010/main" val="3117169676"/>
+      </p:ext>
+    </p:extLst>
+  </p:cSld>
+  <p:clrMapOvr>
+    <a:masterClrMapping/>
+  </p:clrMapOvr>
+  <p:timing>
+    <p:tnLst>
+      <p:par>
+        <p:cTn id="1" dur="indefinite" restart="never" nodeType="tmRoot"/>
+      </p:par>
+    </p:tnLst>
+  </p:timing>
+</p:sld>
+</file>
+
+<file path=ppt/slides/slide4.xml><?xml version="1.0" encoding="utf-8"?>
+<p:sld xmlns:a="http://schemas.openxmlformats.org/drawingml/2006/main" xmlns:r="http://schemas.openxmlformats.org/officeDocument/2006/relationships" xmlns:p="http://schemas.openxmlformats.org/presentationml/2006/main">
+  <p:cSld>
+    <p:spTree>
+      <p:nvGrpSpPr>
+        <p:cNvPr id="1" name=""/>
+        <p:cNvGrpSpPr/>
+        <p:nvPr/>
+      </p:nvGrpSpPr>
+      <p:grpSpPr>
+        <a:xfrm>
+          <a:off x="0" y="0"/>
+          <a:ext cx="0" cy="0"/>
+          <a:chOff x="0" y="0"/>
+          <a:chExt cx="0" cy="0"/>
+        </a:xfrm>
+      </p:grpSpPr>
+      <p:sp>
+        <p:nvSpPr>
+          <p:cNvPr id="2" name="Title 1"/>
+          <p:cNvSpPr>
+            <a:spLocks noGrp="1"/>
+          </p:cNvSpPr>
+          <p:nvPr>
+            <p:ph type="title"/>
+          </p:nvPr>
+        </p:nvSpPr>
+        <p:spPr/>
+        <p:txBody>
+          <a:bodyPr/>
+          <a:lstStyle/>
+          <a:p>
+            <a:r>
+              <a:rPr lang="en-US" dirty="0" smtClean="0"/>
+              <a:t>Resource Dispose Omitting</a:t>
+            </a:r>
+            <a:endParaRPr lang="en-US" dirty="0"/>
+          </a:p>
+        </p:txBody>
+      </p:sp>
+      <p:sp>
+        <p:nvSpPr>
+          <p:cNvPr id="3" name="Content Placeholder 2"/>
+          <p:cNvSpPr txBox="1">
+            <a:spLocks/>
+          </p:cNvSpPr>
+          <p:nvPr/>
+        </p:nvSpPr>
+        <p:spPr>
+          <a:xfrm>
+            <a:off x="611560" y="1196752"/>
+            <a:ext cx="8280920" cy="5112567"/>
+          </a:xfrm>
+          <a:prstGeom prst="rect">
+            <a:avLst/>
+          </a:prstGeom>
+        </p:spPr>
+        <p:txBody>
+          <a:bodyPr/>
+          <a:lstStyle>
+            <a:lvl1pPr marL="342900" indent="-342900" algn="l" defTabSz="914400" rtl="0" eaLnBrk="1" latinLnBrk="0" hangingPunct="1">
+              <a:spcBef>
+                <a:spcPct val="20000"/>
+              </a:spcBef>
+              <a:buFont typeface="Arial" pitchFamily="34" charset="0"/>
+              <a:buChar char="•"/>
+              <a:defRPr sz="3200" kern="1200">
+                <a:solidFill>
+                  <a:schemeClr val="tx1"/>
+                </a:solidFill>
+                <a:latin typeface="+mn-lt"/>
+                <a:ea typeface="+mn-ea"/>
+                <a:cs typeface="+mn-cs"/>
+              </a:defRPr>
+            </a:lvl1pPr>
+            <a:lvl2pPr marL="742950" indent="-285750" algn="l" defTabSz="914400" rtl="0" eaLnBrk="1" latinLnBrk="0" hangingPunct="1">
+              <a:spcBef>
+                <a:spcPct val="20000"/>
+              </a:spcBef>
+              <a:buFont typeface="Arial" pitchFamily="34" charset="0"/>
+              <a:buChar char="–"/>
+              <a:defRPr sz="2800" kern="1200">
+                <a:solidFill>
+                  <a:schemeClr val="tx1"/>
+                </a:solidFill>
+                <a:latin typeface="+mn-lt"/>
+                <a:ea typeface="+mn-ea"/>
+                <a:cs typeface="+mn-cs"/>
+              </a:defRPr>
+            </a:lvl2pPr>
+            <a:lvl3pPr marL="1143000" indent="-228600" algn="l" defTabSz="914400" rtl="0" eaLnBrk="1" latinLnBrk="0" hangingPunct="1">
+              <a:spcBef>
+                <a:spcPct val="20000"/>
+              </a:spcBef>
+              <a:buFont typeface="Arial" pitchFamily="34" charset="0"/>
+              <a:buChar char="•"/>
+              <a:defRPr sz="2400" kern="1200">
+                <a:solidFill>
+                  <a:schemeClr val="tx1"/>
+                </a:solidFill>
+                <a:latin typeface="+mn-lt"/>
+                <a:ea typeface="+mn-ea"/>
+                <a:cs typeface="+mn-cs"/>
+              </a:defRPr>
+            </a:lvl3pPr>
+            <a:lvl4pPr marL="1600200" indent="-228600" algn="l" defTabSz="914400" rtl="0" eaLnBrk="1" latinLnBrk="0" hangingPunct="1">
+              <a:spcBef>
+                <a:spcPct val="20000"/>
+              </a:spcBef>
+              <a:buFont typeface="Arial" pitchFamily="34" charset="0"/>
+              <a:buChar char="–"/>
+              <a:defRPr sz="2000" kern="1200">
+                <a:solidFill>
+                  <a:schemeClr val="tx1"/>
+                </a:solidFill>
+                <a:latin typeface="+mn-lt"/>
+                <a:ea typeface="+mn-ea"/>
+                <a:cs typeface="+mn-cs"/>
+              </a:defRPr>
+            </a:lvl4pPr>
+            <a:lvl5pPr marL="2057400" indent="-228600" algn="l" defTabSz="914400" rtl="0" eaLnBrk="1" latinLnBrk="0" hangingPunct="1">
+              <a:spcBef>
+                <a:spcPct val="20000"/>
+              </a:spcBef>
+              <a:buFont typeface="Arial" pitchFamily="34" charset="0"/>
+              <a:buChar char="»"/>
+              <a:defRPr sz="2000" kern="1200">
+                <a:solidFill>
+                  <a:schemeClr val="tx1"/>
+                </a:solidFill>
+                <a:latin typeface="+mn-lt"/>
+                <a:ea typeface="+mn-ea"/>
+                <a:cs typeface="+mn-cs"/>
+              </a:defRPr>
+            </a:lvl5pPr>
+            <a:lvl6pPr marL="2514600" indent="-228600" algn="l" defTabSz="914400" rtl="0" eaLnBrk="1" latinLnBrk="0" hangingPunct="1">
+              <a:spcBef>
+                <a:spcPct val="20000"/>
+              </a:spcBef>
+              <a:buFont typeface="Arial" pitchFamily="34" charset="0"/>
+              <a:buChar char="•"/>
+              <a:defRPr sz="2000" kern="1200">
+                <a:solidFill>
+                  <a:schemeClr val="tx1"/>
+                </a:solidFill>
+                <a:latin typeface="+mn-lt"/>
+                <a:ea typeface="+mn-ea"/>
+                <a:cs typeface="+mn-cs"/>
+              </a:defRPr>
+            </a:lvl6pPr>
+            <a:lvl7pPr marL="2971800" indent="-228600" algn="l" defTabSz="914400" rtl="0" eaLnBrk="1" latinLnBrk="0" hangingPunct="1">
+              <a:spcBef>
+                <a:spcPct val="20000"/>
+              </a:spcBef>
+              <a:buFont typeface="Arial" pitchFamily="34" charset="0"/>
+              <a:buChar char="•"/>
+              <a:defRPr sz="2000" kern="1200">
+                <a:solidFill>
+                  <a:schemeClr val="tx1"/>
+                </a:solidFill>
+                <a:latin typeface="+mn-lt"/>
+                <a:ea typeface="+mn-ea"/>
+                <a:cs typeface="+mn-cs"/>
+              </a:defRPr>
+            </a:lvl7pPr>
+            <a:lvl8pPr marL="3429000" indent="-228600" algn="l" defTabSz="914400" rtl="0" eaLnBrk="1" latinLnBrk="0" hangingPunct="1">
+              <a:spcBef>
+                <a:spcPct val="20000"/>
+              </a:spcBef>
+              <a:buFont typeface="Arial" pitchFamily="34" charset="0"/>
+              <a:buChar char="•"/>
+              <a:defRPr sz="2000" kern="1200">
+                <a:solidFill>
+                  <a:schemeClr val="tx1"/>
+                </a:solidFill>
+                <a:latin typeface="+mn-lt"/>
+                <a:ea typeface="+mn-ea"/>
+                <a:cs typeface="+mn-cs"/>
+              </a:defRPr>
+            </a:lvl8pPr>
+            <a:lvl9pPr marL="3886200" indent="-228600" algn="l" defTabSz="914400" rtl="0" eaLnBrk="1" latinLnBrk="0" hangingPunct="1">
+              <a:spcBef>
+                <a:spcPct val="20000"/>
+              </a:spcBef>
+              <a:buFont typeface="Arial" pitchFamily="34" charset="0"/>
+              <a:buChar char="•"/>
+              <a:defRPr sz="2000" kern="1200">
+                <a:solidFill>
+                  <a:schemeClr val="tx1"/>
+                </a:solidFill>
+                <a:latin typeface="+mn-lt"/>
+                <a:ea typeface="+mn-ea"/>
+                <a:cs typeface="+mn-cs"/>
+              </a:defRPr>
+            </a:lvl9pPr>
+          </a:lstStyle>
+          <a:p>
+            <a:endParaRPr lang="ru-RU" sz="2400" dirty="0"/>
+          </a:p>
+        </p:txBody>
+      </p:sp>
+    </p:spTree>
+    <p:extLst>
+      <p:ext uri="{BB962C8B-B14F-4D97-AF65-F5344CB8AC3E}">
+        <p14:creationId xmlns:p14="http://schemas.microsoft.com/office/powerpoint/2010/main" val="669050793"/>
+      </p:ext>
+    </p:extLst>
+  </p:cSld>
+  <p:clrMapOvr>
+    <a:masterClrMapping/>
+  </p:clrMapOvr>
+  <p:timing>
+    <p:tnLst>
+      <p:par>
+        <p:cTn id="1" dur="indefinite" restart="never" nodeType="tmRoot"/>
+      </p:par>
+    </p:tnLst>
+  </p:timing>
+</p:sld>
+</file>
+
+<file path=ppt/slides/slide5.xml><?xml version="1.0" encoding="utf-8"?>
 <p:sld xmlns:a="http://schemas.openxmlformats.org/drawingml/2006/main" xmlns:r="http://schemas.openxmlformats.org/officeDocument/2006/relationships" xmlns:p="http://schemas.openxmlformats.org/presentationml/2006/main">
   <p:cSld>
     <p:spTree>

</xml_diff>

<commit_message>
Updated section about memory leaks
</commit_message>
<xml_diff>
--- a/ppt/Garbage Collection and Memory Leak Avoidance in .NET.pptx
+++ b/ppt/Garbage Collection and Memory Leak Avoidance in .NET.pptx
@@ -25,14 +25,18 @@
     <p:sldId id="282" r:id="rId19"/>
     <p:sldId id="283" r:id="rId20"/>
     <p:sldId id="277" r:id="rId21"/>
-    <p:sldId id="265" r:id="rId22"/>
-    <p:sldId id="284" r:id="rId23"/>
-    <p:sldId id="285" r:id="rId24"/>
-    <p:sldId id="286" r:id="rId25"/>
-    <p:sldId id="288" r:id="rId26"/>
-    <p:sldId id="289" r:id="rId27"/>
-    <p:sldId id="287" r:id="rId28"/>
-    <p:sldId id="261" r:id="rId29"/>
+    <p:sldId id="290" r:id="rId22"/>
+    <p:sldId id="291" r:id="rId23"/>
+    <p:sldId id="292" r:id="rId24"/>
+    <p:sldId id="284" r:id="rId25"/>
+    <p:sldId id="293" r:id="rId26"/>
+    <p:sldId id="294" r:id="rId27"/>
+    <p:sldId id="285" r:id="rId28"/>
+    <p:sldId id="286" r:id="rId29"/>
+    <p:sldId id="288" r:id="rId30"/>
+    <p:sldId id="289" r:id="rId31"/>
+    <p:sldId id="287" r:id="rId32"/>
+    <p:sldId id="261" r:id="rId33"/>
   </p:sldIdLst>
   <p:sldSz cx="9144000" cy="6858000" type="screen4x3"/>
   <p:notesSz cx="6858000" cy="9144000"/>
@@ -28246,7 +28250,7 @@
           <a:p>
             <a:r>
               <a:rPr lang="en-US" dirty="0" smtClean="0"/>
-              <a:t>Finalization</a:t>
+              <a:t>Problems in highly available systems</a:t>
             </a:r>
             <a:endParaRPr lang="en-US" dirty="0"/>
           </a:p>
@@ -28570,40 +28574,15 @@
             </a:lvl9pPr>
           </a:lstStyle>
           <a:p>
-            <a:pPr marL="0" indent="0">
-              <a:buSzPct val="80000"/>
-              <a:buNone/>
-            </a:pPr>
-            <a:r>
-              <a:rPr lang="en-US" sz="2400" dirty="0">
-                <a:latin typeface="Calibri" panose="020F0502020204030204" pitchFamily="34" charset="0"/>
-                <a:cs typeface="Calibri" panose="020F0502020204030204" pitchFamily="34" charset="0"/>
-              </a:rPr>
-              <a:t>Finalization can be called in following cases</a:t>
-            </a:r>
-          </a:p>
-          <a:p>
             <a:pPr>
               <a:buSzPct val="80000"/>
             </a:pPr>
             <a:r>
-              <a:rPr lang="en-US" sz="2400" dirty="0">
+              <a:rPr lang="en-US" sz="2400" dirty="0" smtClean="0">
                 <a:latin typeface="Calibri" panose="020F0502020204030204" pitchFamily="34" charset="0"/>
                 <a:cs typeface="Calibri" panose="020F0502020204030204" pitchFamily="34" charset="0"/>
               </a:rPr>
-              <a:t>Generation 0 is full</a:t>
-            </a:r>
-          </a:p>
-          <a:p>
-            <a:pPr lvl="1">
-              <a:buSzPct val="80000"/>
-            </a:pPr>
-            <a:r>
-              <a:rPr lang="en-US" sz="2200" dirty="0">
-                <a:latin typeface="Calibri" panose="020F0502020204030204" pitchFamily="34" charset="0"/>
-                <a:cs typeface="Calibri" panose="020F0502020204030204" pitchFamily="34" charset="0"/>
-              </a:rPr>
-              <a:t>The most common way to call Finalize().</a:t>
+              <a:t>Memory leak consume available memory space on the server.</a:t>
             </a:r>
           </a:p>
           <a:p>
@@ -28611,37 +28590,11 @@
               <a:buSzPct val="80000"/>
             </a:pPr>
             <a:r>
-              <a:rPr lang="en-US" sz="2400" dirty="0">
+              <a:rPr lang="en-US" sz="2400" dirty="0" smtClean="0">
                 <a:latin typeface="Calibri" panose="020F0502020204030204" pitchFamily="34" charset="0"/>
                 <a:cs typeface="Calibri" panose="020F0502020204030204" pitchFamily="34" charset="0"/>
               </a:rPr>
-              <a:t>Explicit call static method </a:t>
-            </a:r>
-            <a:r>
-              <a:rPr lang="en-US" sz="2400" dirty="0" err="1">
-                <a:latin typeface="Calibri" panose="020F0502020204030204" pitchFamily="34" charset="0"/>
-                <a:cs typeface="Calibri" panose="020F0502020204030204" pitchFamily="34" charset="0"/>
-              </a:rPr>
-              <a:t>GC.Collect</a:t>
-            </a:r>
-            <a:r>
-              <a:rPr lang="en-US" sz="2400" dirty="0">
-                <a:latin typeface="Calibri" panose="020F0502020204030204" pitchFamily="34" charset="0"/>
-                <a:cs typeface="Calibri" panose="020F0502020204030204" pitchFamily="34" charset="0"/>
-              </a:rPr>
-              <a:t>()</a:t>
-            </a:r>
-          </a:p>
-          <a:p>
-            <a:pPr lvl="1">
-              <a:buSzPct val="80000"/>
-            </a:pPr>
-            <a:r>
-              <a:rPr lang="en-US" sz="2200" dirty="0">
-                <a:latin typeface="Calibri" panose="020F0502020204030204" pitchFamily="34" charset="0"/>
-                <a:cs typeface="Calibri" panose="020F0502020204030204" pitchFamily="34" charset="0"/>
-              </a:rPr>
-              <a:t>Although Microsoft does not recommend to do that, sometime it make sense to force collecting.</a:t>
+              <a:t>It might take one hour or a month.</a:t>
             </a:r>
           </a:p>
           <a:p>
@@ -28649,48 +28602,418 @@
               <a:buSzPct val="80000"/>
             </a:pPr>
             <a:r>
-              <a:rPr lang="en-US" sz="2400" dirty="0">
+              <a:rPr lang="en-US" sz="2400" dirty="0" smtClean="0">
                 <a:latin typeface="Calibri" panose="020F0502020204030204" pitchFamily="34" charset="0"/>
                 <a:cs typeface="Calibri" panose="020F0502020204030204" pitchFamily="34" charset="0"/>
               </a:rPr>
-              <a:t>Unload application domain.</a:t>
+              <a:t>Sometimes there is only one way to live with this problem – scheduled regular server reboot. </a:t>
             </a:r>
-          </a:p>
-          <a:p>
-            <a:pPr lvl="1">
-              <a:buSzPct val="80000"/>
-            </a:pPr>
+            <a:endParaRPr lang="en-US" sz="2200" dirty="0">
+              <a:latin typeface="Calibri" panose="020F0502020204030204" pitchFamily="34" charset="0"/>
+              <a:cs typeface="Calibri" panose="020F0502020204030204" pitchFamily="34" charset="0"/>
+            </a:endParaRPr>
+          </a:p>
+        </p:txBody>
+      </p:sp>
+      <p:sp>
+        <p:nvSpPr>
+          <p:cNvPr id="10" name="Right Arrow 9"/>
+          <p:cNvSpPr/>
+          <p:nvPr/>
+        </p:nvSpPr>
+        <p:spPr>
+          <a:xfrm>
+            <a:off x="4413880" y="4581128"/>
+            <a:ext cx="792088" cy="540063"/>
+          </a:xfrm>
+          <a:prstGeom prst="rightArrow">
+            <a:avLst/>
+          </a:prstGeom>
+          <a:solidFill>
+            <a:schemeClr val="bg1">
+              <a:lumMod val="65000"/>
+            </a:schemeClr>
+          </a:solidFill>
+          <a:ln>
+            <a:solidFill>
+              <a:schemeClr val="bg1">
+                <a:lumMod val="65000"/>
+              </a:schemeClr>
+            </a:solidFill>
+          </a:ln>
+        </p:spPr>
+        <p:style>
+          <a:lnRef idx="2">
+            <a:schemeClr val="accent1">
+              <a:shade val="50000"/>
+            </a:schemeClr>
+          </a:lnRef>
+          <a:fillRef idx="1">
+            <a:schemeClr val="accent1"/>
+          </a:fillRef>
+          <a:effectRef idx="0">
+            <a:schemeClr val="accent1"/>
+          </a:effectRef>
+          <a:fontRef idx="minor">
+            <a:schemeClr val="lt1"/>
+          </a:fontRef>
+        </p:style>
+        <p:txBody>
+          <a:bodyPr rtlCol="0" anchor="ctr"/>
+          <a:lstStyle/>
+          <a:p>
+            <a:pPr algn="ctr"/>
+            <a:endParaRPr lang="ru-RU"/>
+          </a:p>
+        </p:txBody>
+      </p:sp>
+      <p:sp>
+        <p:nvSpPr>
+          <p:cNvPr id="11" name="Rectangle 10"/>
+          <p:cNvSpPr/>
+          <p:nvPr/>
+        </p:nvSpPr>
+        <p:spPr>
+          <a:xfrm>
+            <a:off x="1187624" y="3501008"/>
+            <a:ext cx="3096344" cy="2778040"/>
+          </a:xfrm>
+          <a:prstGeom prst="rect">
+            <a:avLst/>
+          </a:prstGeom>
+          <a:solidFill>
+            <a:schemeClr val="accent5">
+              <a:lumMod val="40000"/>
+              <a:lumOff val="60000"/>
+            </a:schemeClr>
+          </a:solidFill>
+          <a:ln w="12700">
+            <a:solidFill>
+              <a:schemeClr val="bg1">
+                <a:lumMod val="65000"/>
+              </a:schemeClr>
+            </a:solidFill>
+          </a:ln>
+        </p:spPr>
+        <p:style>
+          <a:lnRef idx="2">
+            <a:schemeClr val="accent1">
+              <a:shade val="50000"/>
+            </a:schemeClr>
+          </a:lnRef>
+          <a:fillRef idx="1">
+            <a:schemeClr val="accent1"/>
+          </a:fillRef>
+          <a:effectRef idx="0">
+            <a:schemeClr val="accent1"/>
+          </a:effectRef>
+          <a:fontRef idx="minor">
+            <a:schemeClr val="lt1"/>
+          </a:fontRef>
+        </p:style>
+        <p:txBody>
+          <a:bodyPr rtlCol="0" anchor="t"/>
+          <a:lstStyle/>
+          <a:p>
+            <a:pPr algn="ctr"/>
             <a:r>
-              <a:rPr lang="en-US" sz="2200" dirty="0">
-                <a:latin typeface="Calibri" panose="020F0502020204030204" pitchFamily="34" charset="0"/>
-                <a:cs typeface="Calibri" panose="020F0502020204030204" pitchFamily="34" charset="0"/>
+              <a:rPr lang="en-US" b="1" dirty="0" smtClean="0">
+                <a:solidFill>
+                  <a:schemeClr val="bg1"/>
+                </a:solidFill>
+                <a:effectLst>
+                  <a:outerShdw blurRad="38100" dist="38100" dir="2700000" algn="tl">
+                    <a:srgbClr val="000000">
+                      <a:alpha val="43137"/>
+                    </a:srgbClr>
+                  </a:outerShdw>
+                </a:effectLst>
               </a:rPr>
-              <a:t>CLR treat that application has no roots anymore.</a:t>
+              <a:t>Memory</a:t>
             </a:r>
-          </a:p>
-          <a:p>
-            <a:pPr>
-              <a:buSzPct val="80000"/>
-            </a:pPr>
+            <a:endParaRPr lang="ru-RU" b="1" dirty="0">
+              <a:solidFill>
+                <a:schemeClr val="bg1"/>
+              </a:solidFill>
+              <a:effectLst>
+                <a:outerShdw blurRad="38100" dist="38100" dir="2700000" algn="tl">
+                  <a:srgbClr val="000000">
+                    <a:alpha val="43137"/>
+                  </a:srgbClr>
+                </a:outerShdw>
+              </a:effectLst>
+            </a:endParaRPr>
+          </a:p>
+        </p:txBody>
+      </p:sp>
+      <p:sp>
+        <p:nvSpPr>
+          <p:cNvPr id="12" name="Rectangle 11"/>
+          <p:cNvSpPr/>
+          <p:nvPr/>
+        </p:nvSpPr>
+        <p:spPr>
+          <a:xfrm>
+            <a:off x="1551112" y="3861048"/>
+            <a:ext cx="2660848" cy="2376264"/>
+          </a:xfrm>
+          <a:prstGeom prst="rect">
+            <a:avLst/>
+          </a:prstGeom>
+          <a:solidFill>
+            <a:srgbClr val="00B050"/>
+          </a:solidFill>
+          <a:ln>
+            <a:noFill/>
+          </a:ln>
+        </p:spPr>
+        <p:style>
+          <a:lnRef idx="2">
+            <a:schemeClr val="accent1">
+              <a:shade val="50000"/>
+            </a:schemeClr>
+          </a:lnRef>
+          <a:fillRef idx="1">
+            <a:schemeClr val="accent1"/>
+          </a:fillRef>
+          <a:effectRef idx="0">
+            <a:schemeClr val="accent1"/>
+          </a:effectRef>
+          <a:fontRef idx="minor">
+            <a:schemeClr val="lt1"/>
+          </a:fontRef>
+        </p:style>
+        <p:txBody>
+          <a:bodyPr rtlCol="0" anchor="ctr"/>
+          <a:lstStyle/>
+          <a:p>
+            <a:pPr algn="ctr"/>
             <a:r>
-              <a:rPr lang="en-US" sz="2400" dirty="0">
-                <a:latin typeface="Calibri" panose="020F0502020204030204" pitchFamily="34" charset="0"/>
-                <a:cs typeface="Calibri" panose="020F0502020204030204" pitchFamily="34" charset="0"/>
+              <a:rPr lang="en-US" dirty="0" smtClean="0"/>
+              <a:t>Application Available Memory</a:t>
+            </a:r>
+            <a:endParaRPr lang="ru-RU" dirty="0"/>
+          </a:p>
+        </p:txBody>
+      </p:sp>
+      <p:sp>
+        <p:nvSpPr>
+          <p:cNvPr id="13" name="Rectangle 12"/>
+          <p:cNvSpPr/>
+          <p:nvPr/>
+        </p:nvSpPr>
+        <p:spPr>
+          <a:xfrm>
+            <a:off x="1344256" y="3861048"/>
+            <a:ext cx="131400" cy="2376264"/>
+          </a:xfrm>
+          <a:prstGeom prst="rect">
+            <a:avLst/>
+          </a:prstGeom>
+          <a:solidFill>
+            <a:srgbClr val="FF0000"/>
+          </a:solidFill>
+          <a:ln>
+            <a:noFill/>
+          </a:ln>
+        </p:spPr>
+        <p:style>
+          <a:lnRef idx="2">
+            <a:schemeClr val="accent1">
+              <a:shade val="50000"/>
+            </a:schemeClr>
+          </a:lnRef>
+          <a:fillRef idx="1">
+            <a:schemeClr val="accent1"/>
+          </a:fillRef>
+          <a:effectRef idx="0">
+            <a:schemeClr val="accent1"/>
+          </a:effectRef>
+          <a:fontRef idx="minor">
+            <a:schemeClr val="lt1"/>
+          </a:fontRef>
+        </p:style>
+        <p:txBody>
+          <a:bodyPr rtlCol="0" anchor="ctr"/>
+          <a:lstStyle/>
+          <a:p>
+            <a:pPr algn="ctr"/>
+            <a:endParaRPr lang="ru-RU"/>
+          </a:p>
+        </p:txBody>
+      </p:sp>
+      <p:sp>
+        <p:nvSpPr>
+          <p:cNvPr id="14" name="Rectangle 13"/>
+          <p:cNvSpPr/>
+          <p:nvPr/>
+        </p:nvSpPr>
+        <p:spPr>
+          <a:xfrm>
+            <a:off x="5364088" y="3501008"/>
+            <a:ext cx="3096344" cy="2778040"/>
+          </a:xfrm>
+          <a:prstGeom prst="rect">
+            <a:avLst/>
+          </a:prstGeom>
+          <a:solidFill>
+            <a:schemeClr val="accent5">
+              <a:lumMod val="40000"/>
+              <a:lumOff val="60000"/>
+            </a:schemeClr>
+          </a:solidFill>
+          <a:ln w="12700">
+            <a:solidFill>
+              <a:schemeClr val="bg1">
+                <a:lumMod val="65000"/>
+              </a:schemeClr>
+            </a:solidFill>
+          </a:ln>
+        </p:spPr>
+        <p:style>
+          <a:lnRef idx="2">
+            <a:schemeClr val="accent1">
+              <a:shade val="50000"/>
+            </a:schemeClr>
+          </a:lnRef>
+          <a:fillRef idx="1">
+            <a:schemeClr val="accent1"/>
+          </a:fillRef>
+          <a:effectRef idx="0">
+            <a:schemeClr val="accent1"/>
+          </a:effectRef>
+          <a:fontRef idx="minor">
+            <a:schemeClr val="lt1"/>
+          </a:fontRef>
+        </p:style>
+        <p:txBody>
+          <a:bodyPr rtlCol="0" anchor="t"/>
+          <a:lstStyle/>
+          <a:p>
+            <a:pPr algn="ctr"/>
+            <a:r>
+              <a:rPr lang="en-US" b="1" dirty="0" smtClean="0">
+                <a:solidFill>
+                  <a:schemeClr val="bg1"/>
+                </a:solidFill>
+                <a:effectLst>
+                  <a:outerShdw blurRad="38100" dist="38100" dir="2700000" algn="tl">
+                    <a:srgbClr val="000000">
+                      <a:alpha val="43137"/>
+                    </a:srgbClr>
+                  </a:outerShdw>
+                </a:effectLst>
               </a:rPr>
-              <a:t>Closing CLR</a:t>
+              <a:t>Memory</a:t>
             </a:r>
-          </a:p>
-          <a:p>
-            <a:pPr lvl="1">
-              <a:buSzPct val="80000"/>
-            </a:pPr>
+            <a:endParaRPr lang="ru-RU" b="1" dirty="0">
+              <a:solidFill>
+                <a:schemeClr val="bg1"/>
+              </a:solidFill>
+              <a:effectLst>
+                <a:outerShdw blurRad="38100" dist="38100" dir="2700000" algn="tl">
+                  <a:srgbClr val="000000">
+                    <a:alpha val="43137"/>
+                  </a:srgbClr>
+                </a:outerShdw>
+              </a:effectLst>
+            </a:endParaRPr>
+          </a:p>
+        </p:txBody>
+      </p:sp>
+      <p:sp>
+        <p:nvSpPr>
+          <p:cNvPr id="15" name="Rectangle 14"/>
+          <p:cNvSpPr/>
+          <p:nvPr/>
+        </p:nvSpPr>
+        <p:spPr>
+          <a:xfrm>
+            <a:off x="7047940" y="3861048"/>
+            <a:ext cx="1320853" cy="2376264"/>
+          </a:xfrm>
+          <a:prstGeom prst="rect">
+            <a:avLst/>
+          </a:prstGeom>
+          <a:solidFill>
+            <a:srgbClr val="00B050"/>
+          </a:solidFill>
+          <a:ln>
+            <a:noFill/>
+          </a:ln>
+        </p:spPr>
+        <p:style>
+          <a:lnRef idx="2">
+            <a:schemeClr val="accent1">
+              <a:shade val="50000"/>
+            </a:schemeClr>
+          </a:lnRef>
+          <a:fillRef idx="1">
+            <a:schemeClr val="accent1"/>
+          </a:fillRef>
+          <a:effectRef idx="0">
+            <a:schemeClr val="accent1"/>
+          </a:effectRef>
+          <a:fontRef idx="minor">
+            <a:schemeClr val="lt1"/>
+          </a:fontRef>
+        </p:style>
+        <p:txBody>
+          <a:bodyPr rtlCol="0" anchor="ctr"/>
+          <a:lstStyle/>
+          <a:p>
+            <a:pPr algn="ctr"/>
             <a:r>
-              <a:rPr lang="en-US" sz="2200" dirty="0">
-                <a:latin typeface="Calibri" panose="020F0502020204030204" pitchFamily="34" charset="0"/>
-                <a:cs typeface="Calibri" panose="020F0502020204030204" pitchFamily="34" charset="0"/>
-              </a:rPr>
-              <a:t>CLR tries to call Finalize() for each object in managed heap</a:t>
+              <a:rPr lang="en-US" dirty="0" smtClean="0"/>
+              <a:t>Application Available Memory</a:t>
             </a:r>
+            <a:endParaRPr lang="ru-RU" dirty="0"/>
+          </a:p>
+        </p:txBody>
+      </p:sp>
+      <p:sp>
+        <p:nvSpPr>
+          <p:cNvPr id="16" name="Rectangle 15"/>
+          <p:cNvSpPr/>
+          <p:nvPr/>
+        </p:nvSpPr>
+        <p:spPr>
+          <a:xfrm>
+            <a:off x="5436096" y="3861048"/>
+            <a:ext cx="1611843" cy="2376264"/>
+          </a:xfrm>
+          <a:prstGeom prst="rect">
+            <a:avLst/>
+          </a:prstGeom>
+          <a:solidFill>
+            <a:srgbClr val="FF0000"/>
+          </a:solidFill>
+          <a:ln>
+            <a:noFill/>
+          </a:ln>
+        </p:spPr>
+        <p:style>
+          <a:lnRef idx="2">
+            <a:schemeClr val="accent1">
+              <a:shade val="50000"/>
+            </a:schemeClr>
+          </a:lnRef>
+          <a:fillRef idx="1">
+            <a:schemeClr val="accent1"/>
+          </a:fillRef>
+          <a:effectRef idx="0">
+            <a:schemeClr val="accent1"/>
+          </a:effectRef>
+          <a:fontRef idx="minor">
+            <a:schemeClr val="lt1"/>
+          </a:fontRef>
+        </p:style>
+        <p:txBody>
+          <a:bodyPr rtlCol="0" anchor="ctr"/>
+          <a:lstStyle/>
+          <a:p>
+            <a:pPr algn="ctr"/>
+            <a:endParaRPr lang="ru-RU" dirty="0"/>
           </a:p>
         </p:txBody>
       </p:sp>
@@ -28748,7 +29071,7 @@
           <a:p>
             <a:r>
               <a:rPr lang="en-US" dirty="0" smtClean="0"/>
-              <a:t>Memory Leak Types</a:t>
+              <a:t>Performance decrease</a:t>
             </a:r>
             <a:endParaRPr lang="en-US" dirty="0"/>
           </a:p>
@@ -29072,58 +29395,389 @@
             </a:lvl9pPr>
           </a:lstStyle>
           <a:p>
+            <a:pPr>
+              <a:buSzPct val="80000"/>
+            </a:pPr>
             <a:r>
-              <a:rPr lang="en-US" sz="2400" dirty="0" smtClean="0"/>
-              <a:t>Memory leak in </a:t>
+              <a:rPr lang="en-US" sz="2200" dirty="0" smtClean="0">
+                <a:latin typeface="Calibri" panose="020F0502020204030204" pitchFamily="34" charset="0"/>
+                <a:cs typeface="Calibri" panose="020F0502020204030204" pitchFamily="34" charset="0"/>
+              </a:rPr>
+              <a:t>Physical Memory</a:t>
             </a:r>
+          </a:p>
+          <a:p>
+            <a:pPr lvl="1">
+              <a:buSzPct val="80000"/>
+            </a:pPr>
             <a:r>
-              <a:rPr lang="en-US" sz="2400" b="1" dirty="0" smtClean="0"/>
-              <a:t>managed</a:t>
+              <a:rPr lang="en-US" sz="1800" dirty="0" smtClean="0">
+                <a:latin typeface="Calibri" panose="020F0502020204030204" pitchFamily="34" charset="0"/>
+                <a:cs typeface="Calibri" panose="020F0502020204030204" pitchFamily="34" charset="0"/>
+              </a:rPr>
+              <a:t> Fast Memory.</a:t>
             </a:r>
+          </a:p>
+          <a:p>
+            <a:pPr>
+              <a:buSzPct val="80000"/>
+            </a:pPr>
             <a:r>
-              <a:rPr lang="en-US" sz="2400" dirty="0" smtClean="0"/>
-              <a:t> heap</a:t>
+              <a:rPr lang="en-US" sz="2200" dirty="0" smtClean="0">
+                <a:latin typeface="Calibri" panose="020F0502020204030204" pitchFamily="34" charset="0"/>
+                <a:cs typeface="Calibri" panose="020F0502020204030204" pitchFamily="34" charset="0"/>
+              </a:rPr>
+              <a:t>Virtual Memory</a:t>
             </a:r>
           </a:p>
           <a:p>
-            <a:pPr lvl="1"/>
+            <a:pPr lvl="1">
+              <a:buSzPct val="80000"/>
+            </a:pPr>
             <a:r>
-              <a:rPr lang="en-US" sz="2000" dirty="0" smtClean="0"/>
-              <a:t>Unintended reference keeping managed object alive</a:t>
+              <a:rPr lang="en-US" sz="1800" dirty="0" smtClean="0">
+                <a:latin typeface="Calibri" panose="020F0502020204030204" pitchFamily="34" charset="0"/>
+                <a:cs typeface="Calibri" panose="020F0502020204030204" pitchFamily="34" charset="0"/>
+              </a:rPr>
+              <a:t>Much slower memory. Using when physical memory is not enough. </a:t>
             </a:r>
-          </a:p>
-          <a:p>
-            <a:pPr lvl="1"/>
-            <a:endParaRPr lang="en-US" sz="2000" dirty="0" smtClean="0"/>
-          </a:p>
-          <a:p>
+            <a:endParaRPr lang="en-US" sz="1800" dirty="0">
+              <a:latin typeface="Calibri" panose="020F0502020204030204" pitchFamily="34" charset="0"/>
+              <a:cs typeface="Calibri" panose="020F0502020204030204" pitchFamily="34" charset="0"/>
+            </a:endParaRPr>
+          </a:p>
+        </p:txBody>
+      </p:sp>
+      <p:sp>
+        <p:nvSpPr>
+          <p:cNvPr id="6" name="Rectangle 5"/>
+          <p:cNvSpPr/>
+          <p:nvPr/>
+        </p:nvSpPr>
+        <p:spPr>
+          <a:xfrm>
+            <a:off x="1187624" y="3501008"/>
+            <a:ext cx="6912768" cy="2778040"/>
+          </a:xfrm>
+          <a:prstGeom prst="rect">
+            <a:avLst/>
+          </a:prstGeom>
+          <a:solidFill>
+            <a:schemeClr val="accent5">
+              <a:lumMod val="40000"/>
+              <a:lumOff val="60000"/>
+            </a:schemeClr>
+          </a:solidFill>
+          <a:ln w="12700">
+            <a:solidFill>
+              <a:schemeClr val="bg1">
+                <a:lumMod val="65000"/>
+              </a:schemeClr>
+            </a:solidFill>
+          </a:ln>
+        </p:spPr>
+        <p:style>
+          <a:lnRef idx="2">
+            <a:schemeClr val="accent1">
+              <a:shade val="50000"/>
+            </a:schemeClr>
+          </a:lnRef>
+          <a:fillRef idx="1">
+            <a:schemeClr val="accent1"/>
+          </a:fillRef>
+          <a:effectRef idx="0">
+            <a:schemeClr val="accent1"/>
+          </a:effectRef>
+          <a:fontRef idx="minor">
+            <a:schemeClr val="lt1"/>
+          </a:fontRef>
+        </p:style>
+        <p:txBody>
+          <a:bodyPr rtlCol="0" anchor="t"/>
+          <a:lstStyle/>
+          <a:p>
+            <a:pPr algn="ctr"/>
             <a:r>
-              <a:rPr lang="en-US" sz="2400" dirty="0" smtClean="0"/>
-              <a:t>Memory leak in </a:t>
+              <a:rPr lang="en-US" b="1" dirty="0" smtClean="0">
+                <a:solidFill>
+                  <a:schemeClr val="bg1"/>
+                </a:solidFill>
+                <a:effectLst>
+                  <a:outerShdw blurRad="38100" dist="38100" dir="2700000" algn="tl">
+                    <a:srgbClr val="000000">
+                      <a:alpha val="43137"/>
+                    </a:srgbClr>
+                  </a:outerShdw>
+                </a:effectLst>
+              </a:rPr>
+              <a:t>Memory</a:t>
             </a:r>
+            <a:endParaRPr lang="ru-RU" b="1" dirty="0">
+              <a:solidFill>
+                <a:schemeClr val="bg1"/>
+              </a:solidFill>
+              <a:effectLst>
+                <a:outerShdw blurRad="38100" dist="38100" dir="2700000" algn="tl">
+                  <a:srgbClr val="000000">
+                    <a:alpha val="43137"/>
+                  </a:srgbClr>
+                </a:outerShdw>
+              </a:effectLst>
+            </a:endParaRPr>
+          </a:p>
+        </p:txBody>
+      </p:sp>
+      <p:sp>
+        <p:nvSpPr>
+          <p:cNvPr id="11" name="Rectangle 10"/>
+          <p:cNvSpPr/>
+          <p:nvPr/>
+        </p:nvSpPr>
+        <p:spPr>
+          <a:xfrm>
+            <a:off x="1209328" y="4104508"/>
+            <a:ext cx="3578696" cy="2174540"/>
+          </a:xfrm>
+          <a:prstGeom prst="rect">
+            <a:avLst/>
+          </a:prstGeom>
+          <a:solidFill>
+            <a:schemeClr val="accent1">
+              <a:lumMod val="75000"/>
+            </a:schemeClr>
+          </a:solidFill>
+          <a:ln>
+            <a:solidFill>
+              <a:schemeClr val="accent1">
+                <a:lumMod val="20000"/>
+                <a:lumOff val="80000"/>
+              </a:schemeClr>
+            </a:solidFill>
+          </a:ln>
+        </p:spPr>
+        <p:style>
+          <a:lnRef idx="2">
+            <a:schemeClr val="accent1">
+              <a:shade val="50000"/>
+            </a:schemeClr>
+          </a:lnRef>
+          <a:fillRef idx="1">
+            <a:schemeClr val="accent1"/>
+          </a:fillRef>
+          <a:effectRef idx="0">
+            <a:schemeClr val="accent1"/>
+          </a:effectRef>
+          <a:fontRef idx="minor">
+            <a:schemeClr val="lt1"/>
+          </a:fontRef>
+        </p:style>
+        <p:txBody>
+          <a:bodyPr rtlCol="0" anchor="t"/>
+          <a:lstStyle/>
+          <a:p>
+            <a:pPr algn="ctr"/>
             <a:r>
-              <a:rPr lang="en-US" sz="2400" b="1" dirty="0" smtClean="0"/>
-              <a:t>unmanaged</a:t>
+              <a:rPr lang="en-US" dirty="0" smtClean="0"/>
+              <a:t>Physical Memory</a:t>
             </a:r>
+            <a:endParaRPr lang="ru-RU" dirty="0"/>
+          </a:p>
+        </p:txBody>
+      </p:sp>
+      <p:sp>
+        <p:nvSpPr>
+          <p:cNvPr id="12" name="Rectangle 11"/>
+          <p:cNvSpPr/>
+          <p:nvPr/>
+        </p:nvSpPr>
+        <p:spPr>
+          <a:xfrm>
+            <a:off x="4788024" y="4104508"/>
+            <a:ext cx="3312368" cy="2174540"/>
+          </a:xfrm>
+          <a:prstGeom prst="rect">
+            <a:avLst/>
+          </a:prstGeom>
+          <a:solidFill>
+            <a:schemeClr val="accent1">
+              <a:lumMod val="75000"/>
+            </a:schemeClr>
+          </a:solidFill>
+          <a:ln>
+            <a:solidFill>
+              <a:schemeClr val="accent1">
+                <a:lumMod val="20000"/>
+                <a:lumOff val="80000"/>
+              </a:schemeClr>
+            </a:solidFill>
+          </a:ln>
+        </p:spPr>
+        <p:style>
+          <a:lnRef idx="2">
+            <a:schemeClr val="accent1">
+              <a:shade val="50000"/>
+            </a:schemeClr>
+          </a:lnRef>
+          <a:fillRef idx="1">
+            <a:schemeClr val="accent1"/>
+          </a:fillRef>
+          <a:effectRef idx="0">
+            <a:schemeClr val="accent1"/>
+          </a:effectRef>
+          <a:fontRef idx="minor">
+            <a:schemeClr val="lt1"/>
+          </a:fontRef>
+        </p:style>
+        <p:txBody>
+          <a:bodyPr rtlCol="0" anchor="t"/>
+          <a:lstStyle/>
+          <a:p>
+            <a:pPr algn="ctr"/>
             <a:r>
-              <a:rPr lang="en-US" sz="2400" dirty="0" smtClean="0"/>
-              <a:t> heap</a:t>
+              <a:rPr lang="en-US" dirty="0" smtClean="0"/>
+              <a:t>Virtual Memory</a:t>
             </a:r>
-            <a:endParaRPr lang="en-US" sz="2400" dirty="0"/>
-          </a:p>
-          <a:p>
-            <a:pPr lvl="1"/>
+            <a:endParaRPr lang="ru-RU" dirty="0"/>
+          </a:p>
+        </p:txBody>
+      </p:sp>
+      <p:sp>
+        <p:nvSpPr>
+          <p:cNvPr id="13" name="Rectangle 12"/>
+          <p:cNvSpPr/>
+          <p:nvPr/>
+        </p:nvSpPr>
+        <p:spPr>
+          <a:xfrm>
+            <a:off x="1551112" y="4509120"/>
+            <a:ext cx="2948880" cy="1728192"/>
+          </a:xfrm>
+          <a:prstGeom prst="rect">
+            <a:avLst/>
+          </a:prstGeom>
+          <a:solidFill>
+            <a:srgbClr val="00B050"/>
+          </a:solidFill>
+        </p:spPr>
+        <p:style>
+          <a:lnRef idx="2">
+            <a:schemeClr val="accent1">
+              <a:shade val="50000"/>
+            </a:schemeClr>
+          </a:lnRef>
+          <a:fillRef idx="1">
+            <a:schemeClr val="accent1"/>
+          </a:fillRef>
+          <a:effectRef idx="0">
+            <a:schemeClr val="accent1"/>
+          </a:effectRef>
+          <a:fontRef idx="minor">
+            <a:schemeClr val="lt1"/>
+          </a:fontRef>
+        </p:style>
+        <p:txBody>
+          <a:bodyPr rtlCol="0" anchor="ctr"/>
+          <a:lstStyle/>
+          <a:p>
+            <a:pPr algn="ctr"/>
             <a:r>
-              <a:rPr lang="en-US" sz="2000" dirty="0" smtClean="0"/>
-              <a:t>Resource disposing omitting</a:t>
+              <a:rPr lang="en-US" dirty="0" smtClean="0"/>
+              <a:t>Application Memory</a:t>
             </a:r>
+            <a:endParaRPr lang="ru-RU" dirty="0"/>
+          </a:p>
+        </p:txBody>
+      </p:sp>
+      <p:sp>
+        <p:nvSpPr>
+          <p:cNvPr id="14" name="Rectangle 13"/>
+          <p:cNvSpPr/>
+          <p:nvPr/>
+        </p:nvSpPr>
+        <p:spPr>
+          <a:xfrm>
+            <a:off x="1344256" y="4509120"/>
+            <a:ext cx="144016" cy="1728192"/>
+          </a:xfrm>
+          <a:prstGeom prst="rect">
+            <a:avLst/>
+          </a:prstGeom>
+          <a:solidFill>
+            <a:srgbClr val="FF0000"/>
+          </a:solidFill>
+        </p:spPr>
+        <p:style>
+          <a:lnRef idx="2">
+            <a:schemeClr val="accent1">
+              <a:shade val="50000"/>
+            </a:schemeClr>
+          </a:lnRef>
+          <a:fillRef idx="1">
+            <a:schemeClr val="accent1"/>
+          </a:fillRef>
+          <a:effectRef idx="0">
+            <a:schemeClr val="accent1"/>
+          </a:effectRef>
+          <a:fontRef idx="minor">
+            <a:schemeClr val="lt1"/>
+          </a:fontRef>
+        </p:style>
+        <p:txBody>
+          <a:bodyPr rtlCol="0" anchor="ctr"/>
+          <a:lstStyle/>
+          <a:p>
+            <a:pPr algn="ctr"/>
+            <a:endParaRPr lang="ru-RU"/>
+          </a:p>
+        </p:txBody>
+      </p:sp>
+      <p:sp>
+        <p:nvSpPr>
+          <p:cNvPr id="15" name="Rectangle 14"/>
+          <p:cNvSpPr/>
+          <p:nvPr/>
+        </p:nvSpPr>
+        <p:spPr>
+          <a:xfrm>
+            <a:off x="7915788" y="4523713"/>
+            <a:ext cx="144016" cy="1728192"/>
+          </a:xfrm>
+          <a:prstGeom prst="rect">
+            <a:avLst/>
+          </a:prstGeom>
+          <a:solidFill>
+            <a:srgbClr val="FF0000"/>
+          </a:solidFill>
+        </p:spPr>
+        <p:style>
+          <a:lnRef idx="2">
+            <a:schemeClr val="accent1">
+              <a:shade val="50000"/>
+            </a:schemeClr>
+          </a:lnRef>
+          <a:fillRef idx="1">
+            <a:schemeClr val="accent1"/>
+          </a:fillRef>
+          <a:effectRef idx="0">
+            <a:schemeClr val="accent1"/>
+          </a:effectRef>
+          <a:fontRef idx="minor">
+            <a:schemeClr val="lt1"/>
+          </a:fontRef>
+        </p:style>
+        <p:txBody>
+          <a:bodyPr rtlCol="0" anchor="ctr"/>
+          <a:lstStyle/>
+          <a:p>
+            <a:pPr algn="ctr"/>
+            <a:endParaRPr lang="ru-RU"/>
           </a:p>
         </p:txBody>
       </p:sp>
     </p:spTree>
     <p:extLst>
       <p:ext uri="{BB962C8B-B14F-4D97-AF65-F5344CB8AC3E}">
-        <p14:creationId xmlns:p14="http://schemas.microsoft.com/office/powerpoint/2010/main" val="669050793"/>
+        <p14:creationId xmlns:p14="http://schemas.microsoft.com/office/powerpoint/2010/main" val="3974372387"/>
       </p:ext>
     </p:extLst>
   </p:cSld>
@@ -29174,7 +29828,7 @@
           <a:p>
             <a:r>
               <a:rPr lang="en-US" dirty="0" smtClean="0"/>
-              <a:t>Memory Leak Types</a:t>
+              <a:t>Performance decrease</a:t>
             </a:r>
             <a:endParaRPr lang="en-US" dirty="0"/>
           </a:p>
@@ -29498,58 +30152,389 @@
             </a:lvl9pPr>
           </a:lstStyle>
           <a:p>
+            <a:pPr>
+              <a:buSzPct val="80000"/>
+            </a:pPr>
             <a:r>
-              <a:rPr lang="en-US" sz="2400" dirty="0" smtClean="0"/>
-              <a:t>Memory leak in </a:t>
+              <a:rPr lang="en-US" sz="2200" dirty="0" smtClean="0">
+                <a:latin typeface="Calibri" panose="020F0502020204030204" pitchFamily="34" charset="0"/>
+                <a:cs typeface="Calibri" panose="020F0502020204030204" pitchFamily="34" charset="0"/>
+              </a:rPr>
+              <a:t>Physical Memory</a:t>
             </a:r>
+          </a:p>
+          <a:p>
+            <a:pPr lvl="1">
+              <a:buSzPct val="80000"/>
+            </a:pPr>
             <a:r>
-              <a:rPr lang="en-US" sz="2400" b="1" dirty="0" smtClean="0"/>
-              <a:t>managed</a:t>
+              <a:rPr lang="en-US" sz="1800" dirty="0" smtClean="0">
+                <a:latin typeface="Calibri" panose="020F0502020204030204" pitchFamily="34" charset="0"/>
+                <a:cs typeface="Calibri" panose="020F0502020204030204" pitchFamily="34" charset="0"/>
+              </a:rPr>
+              <a:t> Fast Memory.</a:t>
             </a:r>
+          </a:p>
+          <a:p>
+            <a:pPr>
+              <a:buSzPct val="80000"/>
+            </a:pPr>
             <a:r>
-              <a:rPr lang="en-US" sz="2400" dirty="0" smtClean="0"/>
-              <a:t> heap</a:t>
+              <a:rPr lang="en-US" sz="2200" dirty="0" smtClean="0">
+                <a:latin typeface="Calibri" panose="020F0502020204030204" pitchFamily="34" charset="0"/>
+                <a:cs typeface="Calibri" panose="020F0502020204030204" pitchFamily="34" charset="0"/>
+              </a:rPr>
+              <a:t>Virtual Memory</a:t>
             </a:r>
           </a:p>
           <a:p>
-            <a:pPr lvl="1"/>
+            <a:pPr lvl="1">
+              <a:buSzPct val="80000"/>
+            </a:pPr>
             <a:r>
-              <a:rPr lang="en-US" sz="2000" dirty="0" smtClean="0"/>
-              <a:t>Unintended reference keeping managed object alive</a:t>
+              <a:rPr lang="en-US" sz="1800" dirty="0" smtClean="0">
+                <a:latin typeface="Calibri" panose="020F0502020204030204" pitchFamily="34" charset="0"/>
+                <a:cs typeface="Calibri" panose="020F0502020204030204" pitchFamily="34" charset="0"/>
+              </a:rPr>
+              <a:t>Much slower memory. Using when physical memory is not enough. </a:t>
             </a:r>
-          </a:p>
-          <a:p>
-            <a:pPr lvl="1"/>
-            <a:endParaRPr lang="en-US" sz="2000" dirty="0" smtClean="0"/>
-          </a:p>
-          <a:p>
+            <a:endParaRPr lang="en-US" sz="1800" dirty="0">
+              <a:latin typeface="Calibri" panose="020F0502020204030204" pitchFamily="34" charset="0"/>
+              <a:cs typeface="Calibri" panose="020F0502020204030204" pitchFamily="34" charset="0"/>
+            </a:endParaRPr>
+          </a:p>
+        </p:txBody>
+      </p:sp>
+      <p:sp>
+        <p:nvSpPr>
+          <p:cNvPr id="6" name="Rectangle 5"/>
+          <p:cNvSpPr/>
+          <p:nvPr/>
+        </p:nvSpPr>
+        <p:spPr>
+          <a:xfrm>
+            <a:off x="1187624" y="3501008"/>
+            <a:ext cx="6912768" cy="2778040"/>
+          </a:xfrm>
+          <a:prstGeom prst="rect">
+            <a:avLst/>
+          </a:prstGeom>
+          <a:solidFill>
+            <a:schemeClr val="accent5">
+              <a:lumMod val="40000"/>
+              <a:lumOff val="60000"/>
+            </a:schemeClr>
+          </a:solidFill>
+          <a:ln w="12700">
+            <a:solidFill>
+              <a:schemeClr val="bg1">
+                <a:lumMod val="65000"/>
+              </a:schemeClr>
+            </a:solidFill>
+          </a:ln>
+        </p:spPr>
+        <p:style>
+          <a:lnRef idx="2">
+            <a:schemeClr val="accent1">
+              <a:shade val="50000"/>
+            </a:schemeClr>
+          </a:lnRef>
+          <a:fillRef idx="1">
+            <a:schemeClr val="accent1"/>
+          </a:fillRef>
+          <a:effectRef idx="0">
+            <a:schemeClr val="accent1"/>
+          </a:effectRef>
+          <a:fontRef idx="minor">
+            <a:schemeClr val="lt1"/>
+          </a:fontRef>
+        </p:style>
+        <p:txBody>
+          <a:bodyPr rtlCol="0" anchor="t"/>
+          <a:lstStyle/>
+          <a:p>
+            <a:pPr algn="ctr"/>
             <a:r>
-              <a:rPr lang="en-US" sz="2400" dirty="0" smtClean="0"/>
-              <a:t>Memory leak in </a:t>
+              <a:rPr lang="en-US" b="1" dirty="0" smtClean="0">
+                <a:solidFill>
+                  <a:schemeClr val="bg1"/>
+                </a:solidFill>
+                <a:effectLst>
+                  <a:outerShdw blurRad="38100" dist="38100" dir="2700000" algn="tl">
+                    <a:srgbClr val="000000">
+                      <a:alpha val="43137"/>
+                    </a:srgbClr>
+                  </a:outerShdw>
+                </a:effectLst>
+              </a:rPr>
+              <a:t>Memory</a:t>
             </a:r>
+            <a:endParaRPr lang="ru-RU" b="1" dirty="0">
+              <a:solidFill>
+                <a:schemeClr val="bg1"/>
+              </a:solidFill>
+              <a:effectLst>
+                <a:outerShdw blurRad="38100" dist="38100" dir="2700000" algn="tl">
+                  <a:srgbClr val="000000">
+                    <a:alpha val="43137"/>
+                  </a:srgbClr>
+                </a:outerShdw>
+              </a:effectLst>
+            </a:endParaRPr>
+          </a:p>
+        </p:txBody>
+      </p:sp>
+      <p:sp>
+        <p:nvSpPr>
+          <p:cNvPr id="11" name="Rectangle 10"/>
+          <p:cNvSpPr/>
+          <p:nvPr/>
+        </p:nvSpPr>
+        <p:spPr>
+          <a:xfrm>
+            <a:off x="1209328" y="4104508"/>
+            <a:ext cx="3578696" cy="2174540"/>
+          </a:xfrm>
+          <a:prstGeom prst="rect">
+            <a:avLst/>
+          </a:prstGeom>
+          <a:solidFill>
+            <a:schemeClr val="accent1">
+              <a:lumMod val="75000"/>
+            </a:schemeClr>
+          </a:solidFill>
+          <a:ln>
+            <a:solidFill>
+              <a:schemeClr val="accent1">
+                <a:lumMod val="20000"/>
+                <a:lumOff val="80000"/>
+              </a:schemeClr>
+            </a:solidFill>
+          </a:ln>
+        </p:spPr>
+        <p:style>
+          <a:lnRef idx="2">
+            <a:schemeClr val="accent1">
+              <a:shade val="50000"/>
+            </a:schemeClr>
+          </a:lnRef>
+          <a:fillRef idx="1">
+            <a:schemeClr val="accent1"/>
+          </a:fillRef>
+          <a:effectRef idx="0">
+            <a:schemeClr val="accent1"/>
+          </a:effectRef>
+          <a:fontRef idx="minor">
+            <a:schemeClr val="lt1"/>
+          </a:fontRef>
+        </p:style>
+        <p:txBody>
+          <a:bodyPr rtlCol="0" anchor="t"/>
+          <a:lstStyle/>
+          <a:p>
+            <a:pPr algn="ctr"/>
             <a:r>
-              <a:rPr lang="en-US" sz="2400" b="1" dirty="0" smtClean="0"/>
-              <a:t>unmanaged</a:t>
+              <a:rPr lang="en-US" dirty="0" smtClean="0"/>
+              <a:t>Physical Memory</a:t>
             </a:r>
+            <a:endParaRPr lang="ru-RU" dirty="0"/>
+          </a:p>
+        </p:txBody>
+      </p:sp>
+      <p:sp>
+        <p:nvSpPr>
+          <p:cNvPr id="12" name="Rectangle 11"/>
+          <p:cNvSpPr/>
+          <p:nvPr/>
+        </p:nvSpPr>
+        <p:spPr>
+          <a:xfrm>
+            <a:off x="4788024" y="4104508"/>
+            <a:ext cx="3312368" cy="2174540"/>
+          </a:xfrm>
+          <a:prstGeom prst="rect">
+            <a:avLst/>
+          </a:prstGeom>
+          <a:solidFill>
+            <a:schemeClr val="accent1">
+              <a:lumMod val="75000"/>
+            </a:schemeClr>
+          </a:solidFill>
+          <a:ln>
+            <a:solidFill>
+              <a:schemeClr val="accent1">
+                <a:lumMod val="20000"/>
+                <a:lumOff val="80000"/>
+              </a:schemeClr>
+            </a:solidFill>
+          </a:ln>
+        </p:spPr>
+        <p:style>
+          <a:lnRef idx="2">
+            <a:schemeClr val="accent1">
+              <a:shade val="50000"/>
+            </a:schemeClr>
+          </a:lnRef>
+          <a:fillRef idx="1">
+            <a:schemeClr val="accent1"/>
+          </a:fillRef>
+          <a:effectRef idx="0">
+            <a:schemeClr val="accent1"/>
+          </a:effectRef>
+          <a:fontRef idx="minor">
+            <a:schemeClr val="lt1"/>
+          </a:fontRef>
+        </p:style>
+        <p:txBody>
+          <a:bodyPr rtlCol="0" anchor="t"/>
+          <a:lstStyle/>
+          <a:p>
+            <a:pPr algn="ctr"/>
             <a:r>
-              <a:rPr lang="en-US" sz="2400" dirty="0" smtClean="0"/>
-              <a:t> heap</a:t>
+              <a:rPr lang="en-US" dirty="0" smtClean="0"/>
+              <a:t>Virtual Memory</a:t>
             </a:r>
-            <a:endParaRPr lang="en-US" sz="2400" dirty="0"/>
-          </a:p>
-          <a:p>
-            <a:pPr lvl="1"/>
+            <a:endParaRPr lang="ru-RU" dirty="0"/>
+          </a:p>
+        </p:txBody>
+      </p:sp>
+      <p:sp>
+        <p:nvSpPr>
+          <p:cNvPr id="13" name="Rectangle 12"/>
+          <p:cNvSpPr/>
+          <p:nvPr/>
+        </p:nvSpPr>
+        <p:spPr>
+          <a:xfrm>
+            <a:off x="4032528" y="4509120"/>
+            <a:ext cx="2948880" cy="1728192"/>
+          </a:xfrm>
+          <a:prstGeom prst="rect">
+            <a:avLst/>
+          </a:prstGeom>
+          <a:solidFill>
+            <a:srgbClr val="00B050"/>
+          </a:solidFill>
+        </p:spPr>
+        <p:style>
+          <a:lnRef idx="2">
+            <a:schemeClr val="accent1">
+              <a:shade val="50000"/>
+            </a:schemeClr>
+          </a:lnRef>
+          <a:fillRef idx="1">
+            <a:schemeClr val="accent1"/>
+          </a:fillRef>
+          <a:effectRef idx="0">
+            <a:schemeClr val="accent1"/>
+          </a:effectRef>
+          <a:fontRef idx="minor">
+            <a:schemeClr val="lt1"/>
+          </a:fontRef>
+        </p:style>
+        <p:txBody>
+          <a:bodyPr rtlCol="0" anchor="ctr"/>
+          <a:lstStyle/>
+          <a:p>
+            <a:pPr algn="ctr"/>
             <a:r>
-              <a:rPr lang="en-US" sz="2000" dirty="0" smtClean="0"/>
-              <a:t>Resource disposing omitting</a:t>
+              <a:rPr lang="en-US" dirty="0" smtClean="0"/>
+              <a:t>Application Memory</a:t>
             </a:r>
+            <a:endParaRPr lang="ru-RU" dirty="0"/>
+          </a:p>
+        </p:txBody>
+      </p:sp>
+      <p:sp>
+        <p:nvSpPr>
+          <p:cNvPr id="14" name="Rectangle 13"/>
+          <p:cNvSpPr/>
+          <p:nvPr/>
+        </p:nvSpPr>
+        <p:spPr>
+          <a:xfrm>
+            <a:off x="1344255" y="4509120"/>
+            <a:ext cx="2647685" cy="1728192"/>
+          </a:xfrm>
+          <a:prstGeom prst="rect">
+            <a:avLst/>
+          </a:prstGeom>
+          <a:solidFill>
+            <a:srgbClr val="FF0000"/>
+          </a:solidFill>
+        </p:spPr>
+        <p:style>
+          <a:lnRef idx="2">
+            <a:schemeClr val="accent1">
+              <a:shade val="50000"/>
+            </a:schemeClr>
+          </a:lnRef>
+          <a:fillRef idx="1">
+            <a:schemeClr val="accent1"/>
+          </a:fillRef>
+          <a:effectRef idx="0">
+            <a:schemeClr val="accent1"/>
+          </a:effectRef>
+          <a:fontRef idx="minor">
+            <a:schemeClr val="lt1"/>
+          </a:fontRef>
+        </p:style>
+        <p:txBody>
+          <a:bodyPr rtlCol="0" anchor="ctr"/>
+          <a:lstStyle/>
+          <a:p>
+            <a:pPr algn="ctr"/>
+            <a:endParaRPr lang="ru-RU"/>
+          </a:p>
+        </p:txBody>
+      </p:sp>
+      <p:sp>
+        <p:nvSpPr>
+          <p:cNvPr id="15" name="Rectangle 14"/>
+          <p:cNvSpPr/>
+          <p:nvPr/>
+        </p:nvSpPr>
+        <p:spPr>
+          <a:xfrm>
+            <a:off x="7570636" y="4523713"/>
+            <a:ext cx="489168" cy="1728192"/>
+          </a:xfrm>
+          <a:prstGeom prst="rect">
+            <a:avLst/>
+          </a:prstGeom>
+          <a:solidFill>
+            <a:srgbClr val="FF0000"/>
+          </a:solidFill>
+        </p:spPr>
+        <p:style>
+          <a:lnRef idx="2">
+            <a:schemeClr val="accent1">
+              <a:shade val="50000"/>
+            </a:schemeClr>
+          </a:lnRef>
+          <a:fillRef idx="1">
+            <a:schemeClr val="accent1"/>
+          </a:fillRef>
+          <a:effectRef idx="0">
+            <a:schemeClr val="accent1"/>
+          </a:effectRef>
+          <a:fontRef idx="minor">
+            <a:schemeClr val="lt1"/>
+          </a:fontRef>
+        </p:style>
+        <p:txBody>
+          <a:bodyPr rtlCol="0" anchor="ctr"/>
+          <a:lstStyle/>
+          <a:p>
+            <a:pPr algn="ctr"/>
+            <a:endParaRPr lang="ru-RU"/>
           </a:p>
         </p:txBody>
       </p:sp>
     </p:spTree>
     <p:extLst>
       <p:ext uri="{BB962C8B-B14F-4D97-AF65-F5344CB8AC3E}">
-        <p14:creationId xmlns:p14="http://schemas.microsoft.com/office/powerpoint/2010/main" val="1999073894"/>
+        <p14:creationId xmlns:p14="http://schemas.microsoft.com/office/powerpoint/2010/main" val="164133738"/>
       </p:ext>
     </p:extLst>
   </p:cSld>
@@ -29600,7 +30585,7 @@
           <a:p>
             <a:r>
               <a:rPr lang="en-US" dirty="0" smtClean="0"/>
-              <a:t>Profiling Tools</a:t>
+              <a:t>Performance decrease</a:t>
             </a:r>
             <a:endParaRPr lang="en-US" dirty="0"/>
           </a:p>
@@ -29924,119 +30909,365 @@
             </a:lvl9pPr>
           </a:lstStyle>
           <a:p>
+            <a:pPr>
+              <a:buSzPct val="80000"/>
+            </a:pPr>
             <a:r>
-              <a:rPr lang="en-US" sz="2400" dirty="0" err="1" smtClean="0"/>
-              <a:t>MemProfiler</a:t>
+              <a:rPr lang="en-US" sz="2200" dirty="0" smtClean="0">
+                <a:latin typeface="Calibri" panose="020F0502020204030204" pitchFamily="34" charset="0"/>
+                <a:cs typeface="Calibri" panose="020F0502020204030204" pitchFamily="34" charset="0"/>
+              </a:rPr>
+              <a:t>Garbage Collector know that there are too less memory left, so it increase garbage collection procedure up to 50 times. </a:t>
             </a:r>
+          </a:p>
+          <a:p>
+            <a:pPr>
+              <a:buSzPct val="80000"/>
+            </a:pPr>
             <a:r>
-              <a:rPr lang="en-US" sz="2400" dirty="0" smtClean="0"/>
-              <a:t> (SciTech Software)</a:t>
+              <a:rPr lang="en-US" sz="2200" dirty="0" smtClean="0">
+                <a:latin typeface="Calibri" panose="020F0502020204030204" pitchFamily="34" charset="0"/>
+                <a:cs typeface="Calibri" panose="020F0502020204030204" pitchFamily="34" charset="0"/>
+              </a:rPr>
+              <a:t>But it does not help, because leaked memory objects are not reachable for GC.</a:t>
             </a:r>
-          </a:p>
-          <a:p>
-            <a:pPr lvl="1"/>
+            <a:endParaRPr lang="en-US" sz="1800" dirty="0">
+              <a:latin typeface="Calibri" panose="020F0502020204030204" pitchFamily="34" charset="0"/>
+              <a:cs typeface="Calibri" panose="020F0502020204030204" pitchFamily="34" charset="0"/>
+            </a:endParaRPr>
+          </a:p>
+        </p:txBody>
+      </p:sp>
+      <p:sp>
+        <p:nvSpPr>
+          <p:cNvPr id="6" name="Rectangle 5"/>
+          <p:cNvSpPr/>
+          <p:nvPr/>
+        </p:nvSpPr>
+        <p:spPr>
+          <a:xfrm>
+            <a:off x="1187624" y="3501008"/>
+            <a:ext cx="6912768" cy="2778040"/>
+          </a:xfrm>
+          <a:prstGeom prst="rect">
+            <a:avLst/>
+          </a:prstGeom>
+          <a:solidFill>
+            <a:schemeClr val="accent5">
+              <a:lumMod val="40000"/>
+              <a:lumOff val="60000"/>
+            </a:schemeClr>
+          </a:solidFill>
+          <a:ln w="12700">
+            <a:solidFill>
+              <a:schemeClr val="bg1">
+                <a:lumMod val="65000"/>
+              </a:schemeClr>
+            </a:solidFill>
+          </a:ln>
+        </p:spPr>
+        <p:style>
+          <a:lnRef idx="2">
+            <a:schemeClr val="accent1">
+              <a:shade val="50000"/>
+            </a:schemeClr>
+          </a:lnRef>
+          <a:fillRef idx="1">
+            <a:schemeClr val="accent1"/>
+          </a:fillRef>
+          <a:effectRef idx="0">
+            <a:schemeClr val="accent1"/>
+          </a:effectRef>
+          <a:fontRef idx="minor">
+            <a:schemeClr val="lt1"/>
+          </a:fontRef>
+        </p:style>
+        <p:txBody>
+          <a:bodyPr rtlCol="0" anchor="t"/>
+          <a:lstStyle/>
+          <a:p>
+            <a:pPr algn="ctr"/>
             <a:r>
-              <a:rPr lang="en-US" sz="1600" dirty="0">
-                <a:hlinkClick r:id="rId2"/>
+              <a:rPr lang="en-US" b="1" dirty="0" smtClean="0">
+                <a:solidFill>
+                  <a:schemeClr val="bg1"/>
+                </a:solidFill>
+                <a:effectLst>
+                  <a:outerShdw blurRad="38100" dist="38100" dir="2700000" algn="tl">
+                    <a:srgbClr val="000000">
+                      <a:alpha val="43137"/>
+                    </a:srgbClr>
+                  </a:outerShdw>
+                </a:effectLst>
               </a:rPr>
-              <a:t>http://memprofiler.com</a:t>
+              <a:t>Memory</a:t>
             </a:r>
+            <a:endParaRPr lang="ru-RU" b="1" dirty="0">
+              <a:solidFill>
+                <a:schemeClr val="bg1"/>
+              </a:solidFill>
+              <a:effectLst>
+                <a:outerShdw blurRad="38100" dist="38100" dir="2700000" algn="tl">
+                  <a:srgbClr val="000000">
+                    <a:alpha val="43137"/>
+                  </a:srgbClr>
+                </a:outerShdw>
+              </a:effectLst>
+            </a:endParaRPr>
+          </a:p>
+        </p:txBody>
+      </p:sp>
+      <p:sp>
+        <p:nvSpPr>
+          <p:cNvPr id="11" name="Rectangle 10"/>
+          <p:cNvSpPr/>
+          <p:nvPr/>
+        </p:nvSpPr>
+        <p:spPr>
+          <a:xfrm>
+            <a:off x="1209328" y="4104508"/>
+            <a:ext cx="3578696" cy="2174540"/>
+          </a:xfrm>
+          <a:prstGeom prst="rect">
+            <a:avLst/>
+          </a:prstGeom>
+          <a:solidFill>
+            <a:schemeClr val="accent1">
+              <a:lumMod val="75000"/>
+            </a:schemeClr>
+          </a:solidFill>
+          <a:ln>
+            <a:solidFill>
+              <a:schemeClr val="accent1">
+                <a:lumMod val="20000"/>
+                <a:lumOff val="80000"/>
+              </a:schemeClr>
+            </a:solidFill>
+          </a:ln>
+        </p:spPr>
+        <p:style>
+          <a:lnRef idx="2">
+            <a:schemeClr val="accent1">
+              <a:shade val="50000"/>
+            </a:schemeClr>
+          </a:lnRef>
+          <a:fillRef idx="1">
+            <a:schemeClr val="accent1"/>
+          </a:fillRef>
+          <a:effectRef idx="0">
+            <a:schemeClr val="accent1"/>
+          </a:effectRef>
+          <a:fontRef idx="minor">
+            <a:schemeClr val="lt1"/>
+          </a:fontRef>
+        </p:style>
+        <p:txBody>
+          <a:bodyPr rtlCol="0" anchor="t"/>
+          <a:lstStyle/>
+          <a:p>
+            <a:pPr algn="ctr"/>
             <a:r>
-              <a:rPr lang="en-US" sz="1600" dirty="0" smtClean="0">
-                <a:hlinkClick r:id="rId2"/>
-              </a:rPr>
-              <a:t>/</a:t>
+              <a:rPr lang="en-US" dirty="0" smtClean="0"/>
+              <a:t>Physical Memory</a:t>
             </a:r>
-            <a:endParaRPr lang="en-US" sz="1600" dirty="0" smtClean="0"/>
-          </a:p>
-          <a:p>
-            <a:pPr lvl="1"/>
-            <a:endParaRPr lang="en-US" sz="1600" dirty="0" smtClean="0"/>
-          </a:p>
-          <a:p>
+            <a:endParaRPr lang="ru-RU" dirty="0"/>
+          </a:p>
+        </p:txBody>
+      </p:sp>
+      <p:sp>
+        <p:nvSpPr>
+          <p:cNvPr id="12" name="Rectangle 11"/>
+          <p:cNvSpPr/>
+          <p:nvPr/>
+        </p:nvSpPr>
+        <p:spPr>
+          <a:xfrm>
+            <a:off x="4788024" y="4104508"/>
+            <a:ext cx="3312368" cy="2174540"/>
+          </a:xfrm>
+          <a:prstGeom prst="rect">
+            <a:avLst/>
+          </a:prstGeom>
+          <a:solidFill>
+            <a:schemeClr val="accent1">
+              <a:lumMod val="75000"/>
+            </a:schemeClr>
+          </a:solidFill>
+          <a:ln>
+            <a:solidFill>
+              <a:schemeClr val="accent1">
+                <a:lumMod val="20000"/>
+                <a:lumOff val="80000"/>
+              </a:schemeClr>
+            </a:solidFill>
+          </a:ln>
+        </p:spPr>
+        <p:style>
+          <a:lnRef idx="2">
+            <a:schemeClr val="accent1">
+              <a:shade val="50000"/>
+            </a:schemeClr>
+          </a:lnRef>
+          <a:fillRef idx="1">
+            <a:schemeClr val="accent1"/>
+          </a:fillRef>
+          <a:effectRef idx="0">
+            <a:schemeClr val="accent1"/>
+          </a:effectRef>
+          <a:fontRef idx="minor">
+            <a:schemeClr val="lt1"/>
+          </a:fontRef>
+        </p:style>
+        <p:txBody>
+          <a:bodyPr rtlCol="0" anchor="t"/>
+          <a:lstStyle/>
+          <a:p>
+            <a:pPr algn="ctr"/>
             <a:r>
-              <a:rPr lang="en-US" sz="2000" dirty="0" err="1" smtClean="0"/>
-              <a:t>dotTrace</a:t>
+              <a:rPr lang="en-US" dirty="0" smtClean="0"/>
+              <a:t>Virtual Memory</a:t>
             </a:r>
+            <a:endParaRPr lang="ru-RU" dirty="0"/>
+          </a:p>
+        </p:txBody>
+      </p:sp>
+      <p:sp>
+        <p:nvSpPr>
+          <p:cNvPr id="13" name="Rectangle 12"/>
+          <p:cNvSpPr/>
+          <p:nvPr/>
+        </p:nvSpPr>
+        <p:spPr>
+          <a:xfrm>
+            <a:off x="4032528" y="4509120"/>
+            <a:ext cx="2948880" cy="1728192"/>
+          </a:xfrm>
+          <a:prstGeom prst="rect">
+            <a:avLst/>
+          </a:prstGeom>
+          <a:solidFill>
+            <a:srgbClr val="00B050"/>
+          </a:solidFill>
+        </p:spPr>
+        <p:style>
+          <a:lnRef idx="2">
+            <a:schemeClr val="accent1">
+              <a:shade val="50000"/>
+            </a:schemeClr>
+          </a:lnRef>
+          <a:fillRef idx="1">
+            <a:schemeClr val="accent1"/>
+          </a:fillRef>
+          <a:effectRef idx="0">
+            <a:schemeClr val="accent1"/>
+          </a:effectRef>
+          <a:fontRef idx="minor">
+            <a:schemeClr val="lt1"/>
+          </a:fontRef>
+        </p:style>
+        <p:txBody>
+          <a:bodyPr rtlCol="0" anchor="ctr"/>
+          <a:lstStyle/>
+          <a:p>
+            <a:pPr algn="ctr"/>
             <a:r>
-              <a:rPr lang="en-US" sz="2000" dirty="0" smtClean="0"/>
-              <a:t> Memory (</a:t>
+              <a:rPr lang="en-US" dirty="0" smtClean="0"/>
+              <a:t>Application Memory</a:t>
             </a:r>
-            <a:r>
-              <a:rPr lang="en-US" sz="2000" dirty="0" err="1" smtClean="0"/>
-              <a:t>JetBrains</a:t>
-            </a:r>
-            <a:r>
-              <a:rPr lang="en-US" sz="2000" dirty="0" smtClean="0"/>
-              <a:t>)</a:t>
-            </a:r>
-          </a:p>
-          <a:p>
-            <a:pPr lvl="1"/>
-            <a:r>
-              <a:rPr lang="en-US" sz="1600" dirty="0">
-                <a:hlinkClick r:id="rId3"/>
-              </a:rPr>
-              <a:t>http://www.jetbrains.com/profiler</a:t>
-            </a:r>
-            <a:r>
-              <a:rPr lang="en-US" sz="1600" dirty="0" smtClean="0">
-                <a:hlinkClick r:id="rId3"/>
-              </a:rPr>
-              <a:t>/</a:t>
-            </a:r>
-            <a:endParaRPr lang="en-US" sz="1600" dirty="0" smtClean="0"/>
-          </a:p>
-          <a:p>
-            <a:pPr lvl="1"/>
-            <a:endParaRPr lang="en-US" sz="1600" dirty="0" smtClean="0"/>
-          </a:p>
-          <a:p>
-            <a:r>
-              <a:rPr lang="en-US" sz="2000" dirty="0" smtClean="0"/>
-              <a:t>ANTS Performance Profiler 8 (</a:t>
-            </a:r>
-            <a:r>
-              <a:rPr lang="en-US" sz="2000" dirty="0" err="1" smtClean="0"/>
-              <a:t>Redgate</a:t>
-            </a:r>
-            <a:r>
-              <a:rPr lang="en-US" sz="2000" dirty="0" smtClean="0"/>
-              <a:t>)</a:t>
-            </a:r>
-          </a:p>
-          <a:p>
-            <a:pPr lvl="1"/>
-            <a:r>
-              <a:rPr lang="en-US" sz="1600" dirty="0">
-                <a:hlinkClick r:id="rId4"/>
-              </a:rPr>
-              <a:t>http://www.red-gate.com/products/dotnet-development/ants-performance-profiler</a:t>
-            </a:r>
-            <a:r>
-              <a:rPr lang="en-US" sz="1600" dirty="0" smtClean="0">
-                <a:hlinkClick r:id="rId4"/>
-              </a:rPr>
-              <a:t>/</a:t>
-            </a:r>
-            <a:endParaRPr lang="en-US" sz="1600" dirty="0" smtClean="0"/>
-          </a:p>
-          <a:p>
-            <a:pPr lvl="1"/>
-            <a:endParaRPr lang="en-US" sz="1600" dirty="0" smtClean="0"/>
-          </a:p>
-          <a:p>
-            <a:r>
-              <a:rPr lang="en-US" sz="2000" dirty="0" smtClean="0"/>
-              <a:t>WinDbg.exe + SOS</a:t>
-            </a:r>
+            <a:endParaRPr lang="ru-RU" dirty="0"/>
+          </a:p>
+        </p:txBody>
+      </p:sp>
+      <p:sp>
+        <p:nvSpPr>
+          <p:cNvPr id="14" name="Rectangle 13"/>
+          <p:cNvSpPr/>
+          <p:nvPr/>
+        </p:nvSpPr>
+        <p:spPr>
+          <a:xfrm>
+            <a:off x="1344255" y="4509120"/>
+            <a:ext cx="2647685" cy="1728192"/>
+          </a:xfrm>
+          <a:prstGeom prst="rect">
+            <a:avLst/>
+          </a:prstGeom>
+          <a:solidFill>
+            <a:srgbClr val="FF0000"/>
+          </a:solidFill>
+        </p:spPr>
+        <p:style>
+          <a:lnRef idx="2">
+            <a:schemeClr val="accent1">
+              <a:shade val="50000"/>
+            </a:schemeClr>
+          </a:lnRef>
+          <a:fillRef idx="1">
+            <a:schemeClr val="accent1"/>
+          </a:fillRef>
+          <a:effectRef idx="0">
+            <a:schemeClr val="accent1"/>
+          </a:effectRef>
+          <a:fontRef idx="minor">
+            <a:schemeClr val="lt1"/>
+          </a:fontRef>
+        </p:style>
+        <p:txBody>
+          <a:bodyPr rtlCol="0" anchor="ctr"/>
+          <a:lstStyle/>
+          <a:p>
+            <a:pPr algn="ctr"/>
+            <a:endParaRPr lang="ru-RU"/>
+          </a:p>
+        </p:txBody>
+      </p:sp>
+      <p:sp>
+        <p:nvSpPr>
+          <p:cNvPr id="15" name="Rectangle 14"/>
+          <p:cNvSpPr/>
+          <p:nvPr/>
+        </p:nvSpPr>
+        <p:spPr>
+          <a:xfrm>
+            <a:off x="7133808" y="4523713"/>
+            <a:ext cx="925996" cy="1728192"/>
+          </a:xfrm>
+          <a:prstGeom prst="rect">
+            <a:avLst/>
+          </a:prstGeom>
+          <a:solidFill>
+            <a:srgbClr val="FF0000"/>
+          </a:solidFill>
+        </p:spPr>
+        <p:style>
+          <a:lnRef idx="2">
+            <a:schemeClr val="accent1">
+              <a:shade val="50000"/>
+            </a:schemeClr>
+          </a:lnRef>
+          <a:fillRef idx="1">
+            <a:schemeClr val="accent1"/>
+          </a:fillRef>
+          <a:effectRef idx="0">
+            <a:schemeClr val="accent1"/>
+          </a:effectRef>
+          <a:fontRef idx="minor">
+            <a:schemeClr val="lt1"/>
+          </a:fontRef>
+        </p:style>
+        <p:txBody>
+          <a:bodyPr rtlCol="0" anchor="ctr"/>
+          <a:lstStyle/>
+          <a:p>
+            <a:pPr algn="ctr"/>
+            <a:endParaRPr lang="ru-RU"/>
           </a:p>
         </p:txBody>
       </p:sp>
     </p:spTree>
     <p:extLst>
       <p:ext uri="{BB962C8B-B14F-4D97-AF65-F5344CB8AC3E}">
-        <p14:creationId xmlns:p14="http://schemas.microsoft.com/office/powerpoint/2010/main" val="3974821222"/>
+        <p14:creationId xmlns:p14="http://schemas.microsoft.com/office/powerpoint/2010/main" val="412438192"/>
       </p:ext>
     </p:extLst>
   </p:cSld>
@@ -30087,11 +31318,7 @@
           <a:p>
             <a:r>
               <a:rPr lang="en-US" dirty="0" smtClean="0"/>
-              <a:t>Profiling Tool: </a:t>
-            </a:r>
-            <a:r>
-              <a:rPr lang="en-US" dirty="0" err="1" smtClean="0"/>
-              <a:t>MemProfiler</a:t>
+              <a:t>Memory Leak Types</a:t>
             </a:r>
             <a:endParaRPr lang="en-US" dirty="0"/>
           </a:p>
@@ -30107,7 +31334,7 @@
         </p:nvSpPr>
         <p:spPr>
           <a:xfrm>
-            <a:off x="611560" y="1174019"/>
+            <a:off x="611560" y="1196752"/>
             <a:ext cx="8280920" cy="5112567"/>
           </a:xfrm>
           <a:prstGeom prst="rect">
@@ -30416,98 +31643,57 @@
           </a:lstStyle>
           <a:p>
             <a:r>
-              <a:rPr lang="en-US" sz="2000" dirty="0" smtClean="0"/>
-              <a:t>Highly focused on memory profiling and leak detection.</a:t>
+              <a:rPr lang="en-US" sz="2400" dirty="0" smtClean="0"/>
+              <a:t>Memory leak in </a:t>
             </a:r>
-          </a:p>
-          <a:p>
+            <a:r>
+              <a:rPr lang="en-US" sz="2400" b="1" dirty="0" smtClean="0"/>
+              <a:t>managed</a:t>
+            </a:r>
+            <a:r>
+              <a:rPr lang="en-US" sz="2400" dirty="0" smtClean="0"/>
+              <a:t> heap</a:t>
+            </a:r>
+          </a:p>
+          <a:p>
+            <a:pPr lvl="1"/>
             <a:r>
               <a:rPr lang="en-US" sz="2000" dirty="0" smtClean="0"/>
-              <a:t>Rich User interface.</a:t>
+              <a:t>Unintended reference keeping managed object alive</a:t>
             </a:r>
           </a:p>
           <a:p>
+            <a:pPr lvl="1"/>
+            <a:endParaRPr lang="en-US" sz="2000" dirty="0" smtClean="0"/>
+          </a:p>
+          <a:p>
+            <a:r>
+              <a:rPr lang="en-US" sz="2400" dirty="0" smtClean="0"/>
+              <a:t>Memory leak in </a:t>
+            </a:r>
+            <a:r>
+              <a:rPr lang="en-US" sz="2400" b="1" dirty="0" smtClean="0"/>
+              <a:t>unmanaged</a:t>
+            </a:r>
+            <a:r>
+              <a:rPr lang="en-US" sz="2400" dirty="0" smtClean="0"/>
+              <a:t> heap</a:t>
+            </a:r>
+            <a:endParaRPr lang="en-US" sz="2400" dirty="0"/>
+          </a:p>
+          <a:p>
+            <a:pPr lvl="1"/>
             <a:r>
               <a:rPr lang="en-US" sz="2000" dirty="0" smtClean="0"/>
-              <a:t>Can work on production server and generate reports.</a:t>
+              <a:t>Resource disposing omitting</a:t>
             </a:r>
-            <a:endParaRPr lang="en-US" sz="2000" dirty="0" smtClean="0"/>
-          </a:p>
-        </p:txBody>
-      </p:sp>
-      <p:sp>
-        <p:nvSpPr>
-          <p:cNvPr id="6" name="AutoShape 4" descr="http://www-cdn.memprofiler.com/screenshots/GuidedOverview.png"/>
-          <p:cNvSpPr>
-            <a:spLocks noChangeAspect="1" noChangeArrowheads="1"/>
-          </p:cNvSpPr>
-          <p:nvPr/>
-        </p:nvSpPr>
-        <p:spPr bwMode="auto">
-          <a:xfrm>
-            <a:off x="63500" y="-136525"/>
-            <a:ext cx="10534650" cy="6781800"/>
-          </a:xfrm>
-          <a:prstGeom prst="rect">
-            <a:avLst/>
-          </a:prstGeom>
-          <a:noFill/>
-          <a:extLst>
-            <a:ext uri="{909E8E84-426E-40DD-AFC4-6F175D3DCCD1}">
-              <a14:hiddenFill xmlns:a14="http://schemas.microsoft.com/office/drawing/2010/main">
-                <a:solidFill>
-                  <a:srgbClr val="FFFFFF"/>
-                </a:solidFill>
-              </a14:hiddenFill>
-            </a:ext>
-          </a:extLst>
-        </p:spPr>
-        <p:txBody>
-          <a:bodyPr vert="horz" wrap="square" lIns="91440" tIns="45720" rIns="91440" bIns="45720" numCol="1" anchor="t" anchorCtr="0" compatLnSpc="1">
-            <a:prstTxWarp prst="textNoShape">
-              <a:avLst/>
-            </a:prstTxWarp>
-          </a:bodyPr>
-          <a:lstStyle/>
-          <a:p>
-            <a:endParaRPr lang="ru-RU"/>
-          </a:p>
-        </p:txBody>
-      </p:sp>
-      <p:pic>
-        <p:nvPicPr>
-          <p:cNvPr id="8" name="Picture 7"/>
-          <p:cNvPicPr>
-            <a:picLocks noChangeAspect="1"/>
-          </p:cNvPicPr>
-          <p:nvPr/>
-        </p:nvPicPr>
-        <p:blipFill>
-          <a:blip r:embed="rId2">
-            <a:extLst>
-              <a:ext uri="{28A0092B-C50C-407E-A947-70E740481C1C}">
-                <a14:useLocalDpi xmlns:a14="http://schemas.microsoft.com/office/drawing/2010/main" val="0"/>
-              </a:ext>
-            </a:extLst>
-          </a:blip>
-          <a:stretch>
-            <a:fillRect/>
-          </a:stretch>
-        </p:blipFill>
-        <p:spPr>
-          <a:xfrm>
-            <a:off x="1434664" y="2647970"/>
-            <a:ext cx="5652120" cy="3638616"/>
-          </a:xfrm>
-          <a:prstGeom prst="rect">
-            <a:avLst/>
-          </a:prstGeom>
-        </p:spPr>
-      </p:pic>
+          </a:p>
+        </p:txBody>
+      </p:sp>
     </p:spTree>
     <p:extLst>
       <p:ext uri="{BB962C8B-B14F-4D97-AF65-F5344CB8AC3E}">
-        <p14:creationId xmlns:p14="http://schemas.microsoft.com/office/powerpoint/2010/main" val="1142978076"/>
+        <p14:creationId xmlns:p14="http://schemas.microsoft.com/office/powerpoint/2010/main" val="1999073894"/>
       </p:ext>
     </p:extLst>
   </p:cSld>
@@ -30558,15 +31744,7 @@
           <a:p>
             <a:r>
               <a:rPr lang="en-US" dirty="0" smtClean="0"/>
-              <a:t>Profiling Tool: </a:t>
-            </a:r>
-            <a:r>
-              <a:rPr lang="en-US" dirty="0" err="1" smtClean="0"/>
-              <a:t>dotTrace</a:t>
-            </a:r>
-            <a:r>
-              <a:rPr lang="en-US" dirty="0" smtClean="0"/>
-              <a:t> Memory</a:t>
+              <a:t>Memory Leak in Managed Heap</a:t>
             </a:r>
             <a:endParaRPr lang="en-US" dirty="0"/>
           </a:p>
@@ -30891,53 +32069,51 @@
           </a:lstStyle>
           <a:p>
             <a:r>
-              <a:rPr lang="en-US" sz="2000" dirty="0" smtClean="0"/>
-              <a:t>Very convenient data representation, easy to use.</a:t>
+              <a:rPr lang="en-US" sz="2400" dirty="0" smtClean="0"/>
+              <a:t>Memory leak in </a:t>
             </a:r>
-          </a:p>
-          <a:p>
+            <a:r>
+              <a:rPr lang="en-US" sz="2400" b="1" dirty="0" smtClean="0"/>
+              <a:t>managed</a:t>
+            </a:r>
+            <a:r>
+              <a:rPr lang="en-US" sz="2400" dirty="0" smtClean="0"/>
+              <a:t> heap</a:t>
+            </a:r>
+          </a:p>
+          <a:p>
+            <a:pPr lvl="1"/>
             <a:r>
               <a:rPr lang="en-US" sz="2000" dirty="0" smtClean="0"/>
-              <a:t>Provide referencing to source code which is cause memory leak.</a:t>
+              <a:t>Unintended reference keeping managed object alive</a:t>
             </a:r>
+          </a:p>
+          <a:p>
+            <a:pPr lvl="1"/>
+            <a:r>
+              <a:rPr lang="en-US" sz="2000" dirty="0" smtClean="0"/>
+              <a:t>Aggregating object references</a:t>
+            </a:r>
+          </a:p>
+          <a:p>
+            <a:pPr lvl="1"/>
+            <a:r>
+              <a:rPr lang="en-US" sz="2000" dirty="0" smtClean="0"/>
+              <a:t>Delegates (closure context variables)</a:t>
+            </a:r>
+          </a:p>
+          <a:p>
+            <a:pPr marL="457200" lvl="1" indent="0">
+              <a:buNone/>
+            </a:pPr>
             <a:endParaRPr lang="en-US" sz="2000" dirty="0" smtClean="0"/>
           </a:p>
         </p:txBody>
       </p:sp>
-      <p:pic>
-        <p:nvPicPr>
-          <p:cNvPr id="5" name="Picture 4"/>
-          <p:cNvPicPr>
-            <a:picLocks noChangeAspect="1"/>
-          </p:cNvPicPr>
-          <p:nvPr/>
-        </p:nvPicPr>
-        <p:blipFill>
-          <a:blip r:embed="rId2">
-            <a:extLst>
-              <a:ext uri="{28A0092B-C50C-407E-A947-70E740481C1C}">
-                <a14:useLocalDpi xmlns:a14="http://schemas.microsoft.com/office/drawing/2010/main" val="0"/>
-              </a:ext>
-            </a:extLst>
-          </a:blip>
-          <a:stretch>
-            <a:fillRect/>
-          </a:stretch>
-        </p:blipFill>
-        <p:spPr>
-          <a:xfrm>
-            <a:off x="1619672" y="2341217"/>
-            <a:ext cx="5580112" cy="4084935"/>
-          </a:xfrm>
-          <a:prstGeom prst="rect">
-            <a:avLst/>
-          </a:prstGeom>
-        </p:spPr>
-      </p:pic>
     </p:spTree>
     <p:extLst>
       <p:ext uri="{BB962C8B-B14F-4D97-AF65-F5344CB8AC3E}">
-        <p14:creationId xmlns:p14="http://schemas.microsoft.com/office/powerpoint/2010/main" val="3932463832"/>
+        <p14:creationId xmlns:p14="http://schemas.microsoft.com/office/powerpoint/2010/main" val="1245901494"/>
       </p:ext>
     </p:extLst>
   </p:cSld>
@@ -30988,11 +32164,7 @@
           <a:p>
             <a:r>
               <a:rPr lang="en-US" dirty="0" smtClean="0"/>
-              <a:t>Profiling Tool: </a:t>
-            </a:r>
-            <a:r>
-              <a:rPr lang="en-US" dirty="0" err="1" smtClean="0"/>
-              <a:t>MemProfiler</a:t>
+              <a:t>Memory Leak in Unmanaged Heap</a:t>
             </a:r>
             <a:endParaRPr lang="en-US" dirty="0"/>
           </a:p>
@@ -31316,56 +32488,410 @@
             </a:lvl9pPr>
           </a:lstStyle>
           <a:p>
+            <a:pPr lvl="1"/>
+            <a:endParaRPr lang="en-US" sz="2000" dirty="0" smtClean="0"/>
+          </a:p>
+          <a:p>
+            <a:r>
+              <a:rPr lang="en-US" sz="2400" dirty="0" smtClean="0"/>
+              <a:t>Memory leak in </a:t>
+            </a:r>
+            <a:r>
+              <a:rPr lang="en-US" sz="2400" b="1" dirty="0" smtClean="0"/>
+              <a:t>unmanaged</a:t>
+            </a:r>
+            <a:r>
+              <a:rPr lang="en-US" sz="2400" dirty="0" smtClean="0"/>
+              <a:t> heap</a:t>
+            </a:r>
+            <a:endParaRPr lang="en-US" sz="2400" dirty="0"/>
+          </a:p>
+          <a:p>
+            <a:pPr lvl="1"/>
             <a:r>
               <a:rPr lang="en-US" sz="2000" dirty="0" smtClean="0"/>
-              <a:t>Many useful features for memory consumption, and performance analysis.</a:t>
+              <a:t>Resource disposing omitting</a:t>
             </a:r>
           </a:p>
-          <a:p>
+        </p:txBody>
+      </p:sp>
+      <p:sp>
+        <p:nvSpPr>
+          <p:cNvPr id="5" name="Rectangle 4"/>
+          <p:cNvSpPr/>
+          <p:nvPr/>
+        </p:nvSpPr>
+        <p:spPr>
+          <a:xfrm>
+            <a:off x="619659" y="4653136"/>
+            <a:ext cx="8136904" cy="787896"/>
+          </a:xfrm>
+          <a:prstGeom prst="rect">
+            <a:avLst/>
+          </a:prstGeom>
+          <a:solidFill>
+            <a:schemeClr val="accent5">
+              <a:lumMod val="40000"/>
+              <a:lumOff val="60000"/>
+            </a:schemeClr>
+          </a:solidFill>
+          <a:ln w="12700">
+            <a:solidFill>
+              <a:schemeClr val="bg1">
+                <a:lumMod val="65000"/>
+              </a:schemeClr>
+            </a:solidFill>
+          </a:ln>
+        </p:spPr>
+        <p:style>
+          <a:lnRef idx="2">
+            <a:schemeClr val="accent1">
+              <a:shade val="50000"/>
+            </a:schemeClr>
+          </a:lnRef>
+          <a:fillRef idx="1">
+            <a:schemeClr val="accent1"/>
+          </a:fillRef>
+          <a:effectRef idx="0">
+            <a:schemeClr val="accent1"/>
+          </a:effectRef>
+          <a:fontRef idx="minor">
+            <a:schemeClr val="lt1"/>
+          </a:fontRef>
+        </p:style>
+        <p:txBody>
+          <a:bodyPr vert="horz" rtlCol="0" anchor="t"/>
+          <a:lstStyle/>
+          <a:p>
+            <a:pPr algn="r"/>
             <a:r>
-              <a:rPr lang="en-US" sz="2000" dirty="0" smtClean="0"/>
-              <a:t>Have data access profiling in latest version.</a:t>
+              <a:rPr lang="en-US" b="1" dirty="0" smtClean="0">
+                <a:effectLst>
+                  <a:outerShdw blurRad="38100" dist="38100" dir="2700000" algn="tl">
+                    <a:srgbClr val="000000">
+                      <a:alpha val="43137"/>
+                    </a:srgbClr>
+                  </a:outerShdw>
+                </a:effectLst>
+              </a:rPr>
+              <a:t>Managed Heap</a:t>
             </a:r>
-          </a:p>
-          <a:p>
-            <a:endParaRPr lang="en-US" sz="2000" dirty="0" smtClean="0"/>
-          </a:p>
-        </p:txBody>
-      </p:sp>
-      <p:pic>
-        <p:nvPicPr>
-          <p:cNvPr id="5" name="Picture 4"/>
-          <p:cNvPicPr>
-            <a:picLocks noChangeAspect="1"/>
-          </p:cNvPicPr>
-          <p:nvPr/>
-        </p:nvPicPr>
-        <p:blipFill>
-          <a:blip r:embed="rId2">
-            <a:extLst>
-              <a:ext uri="{28A0092B-C50C-407E-A947-70E740481C1C}">
-                <a14:useLocalDpi xmlns:a14="http://schemas.microsoft.com/office/drawing/2010/main" val="0"/>
-              </a:ext>
-            </a:extLst>
-          </a:blip>
-          <a:stretch>
-            <a:fillRect/>
-          </a:stretch>
-        </p:blipFill>
-        <p:spPr>
-          <a:xfrm>
-            <a:off x="1043608" y="2445692"/>
-            <a:ext cx="6571275" cy="4023524"/>
+            <a:endParaRPr lang="ru-RU" b="1" dirty="0">
+              <a:effectLst>
+                <a:outerShdw blurRad="38100" dist="38100" dir="2700000" algn="tl">
+                  <a:srgbClr val="000000">
+                    <a:alpha val="43137"/>
+                  </a:srgbClr>
+                </a:outerShdw>
+              </a:effectLst>
+            </a:endParaRPr>
+          </a:p>
+        </p:txBody>
+      </p:sp>
+      <p:sp>
+        <p:nvSpPr>
+          <p:cNvPr id="6" name="Rectangle 5"/>
+          <p:cNvSpPr/>
+          <p:nvPr/>
+        </p:nvSpPr>
+        <p:spPr>
+          <a:xfrm>
+            <a:off x="611560" y="5517232"/>
+            <a:ext cx="8136904" cy="769969"/>
           </a:xfrm>
           <a:prstGeom prst="rect">
             <a:avLst/>
           </a:prstGeom>
-        </p:spPr>
-      </p:pic>
+          <a:solidFill>
+            <a:schemeClr val="accent5">
+              <a:lumMod val="40000"/>
+              <a:lumOff val="60000"/>
+            </a:schemeClr>
+          </a:solidFill>
+          <a:ln w="12700">
+            <a:solidFill>
+              <a:schemeClr val="bg1">
+                <a:lumMod val="65000"/>
+              </a:schemeClr>
+            </a:solidFill>
+          </a:ln>
+        </p:spPr>
+        <p:style>
+          <a:lnRef idx="2">
+            <a:schemeClr val="accent1">
+              <a:shade val="50000"/>
+            </a:schemeClr>
+          </a:lnRef>
+          <a:fillRef idx="1">
+            <a:schemeClr val="accent1"/>
+          </a:fillRef>
+          <a:effectRef idx="0">
+            <a:schemeClr val="accent1"/>
+          </a:effectRef>
+          <a:fontRef idx="minor">
+            <a:schemeClr val="lt1"/>
+          </a:fontRef>
+        </p:style>
+        <p:txBody>
+          <a:bodyPr rtlCol="0" anchor="t"/>
+          <a:lstStyle/>
+          <a:p>
+            <a:pPr algn="r"/>
+            <a:r>
+              <a:rPr lang="en-US" b="1" dirty="0" smtClean="0">
+                <a:effectLst>
+                  <a:outerShdw blurRad="38100" dist="38100" dir="2700000" algn="tl">
+                    <a:srgbClr val="000000">
+                      <a:alpha val="43137"/>
+                    </a:srgbClr>
+                  </a:outerShdw>
+                </a:effectLst>
+              </a:rPr>
+              <a:t>Native Heap</a:t>
+            </a:r>
+            <a:endParaRPr lang="ru-RU" b="1" dirty="0">
+              <a:effectLst>
+                <a:outerShdw blurRad="38100" dist="38100" dir="2700000" algn="tl">
+                  <a:srgbClr val="000000">
+                    <a:alpha val="43137"/>
+                  </a:srgbClr>
+                </a:outerShdw>
+              </a:effectLst>
+            </a:endParaRPr>
+          </a:p>
+        </p:txBody>
+      </p:sp>
+      <p:sp>
+        <p:nvSpPr>
+          <p:cNvPr id="7" name="Oval 6"/>
+          <p:cNvSpPr/>
+          <p:nvPr/>
+        </p:nvSpPr>
+        <p:spPr>
+          <a:xfrm>
+            <a:off x="1628579" y="4867064"/>
+            <a:ext cx="360040" cy="360040"/>
+          </a:xfrm>
+          <a:prstGeom prst="ellipse">
+            <a:avLst/>
+          </a:prstGeom>
+          <a:solidFill>
+            <a:srgbClr val="F8E992"/>
+          </a:solidFill>
+          <a:ln w="9525">
+            <a:solidFill>
+              <a:srgbClr val="E0AC3A"/>
+            </a:solidFill>
+          </a:ln>
+        </p:spPr>
+        <p:style>
+          <a:lnRef idx="2">
+            <a:schemeClr val="accent1">
+              <a:shade val="50000"/>
+            </a:schemeClr>
+          </a:lnRef>
+          <a:fillRef idx="1">
+            <a:schemeClr val="accent1"/>
+          </a:fillRef>
+          <a:effectRef idx="0">
+            <a:schemeClr val="accent1"/>
+          </a:effectRef>
+          <a:fontRef idx="minor">
+            <a:schemeClr val="lt1"/>
+          </a:fontRef>
+        </p:style>
+        <p:txBody>
+          <a:bodyPr rtlCol="0" anchor="ctr"/>
+          <a:lstStyle/>
+          <a:p>
+            <a:pPr algn="ctr"/>
+            <a:endParaRPr lang="ru-RU"/>
+          </a:p>
+        </p:txBody>
+      </p:sp>
+      <p:sp>
+        <p:nvSpPr>
+          <p:cNvPr id="8" name="Oval 7"/>
+          <p:cNvSpPr/>
+          <p:nvPr/>
+        </p:nvSpPr>
+        <p:spPr>
+          <a:xfrm>
+            <a:off x="2171324" y="5716300"/>
+            <a:ext cx="360040" cy="360040"/>
+          </a:xfrm>
+          <a:prstGeom prst="ellipse">
+            <a:avLst/>
+          </a:prstGeom>
+          <a:solidFill>
+            <a:srgbClr val="F8E992"/>
+          </a:solidFill>
+          <a:ln w="9525">
+            <a:solidFill>
+              <a:srgbClr val="E0AC3A"/>
+            </a:solidFill>
+          </a:ln>
+        </p:spPr>
+        <p:style>
+          <a:lnRef idx="2">
+            <a:schemeClr val="accent1">
+              <a:shade val="50000"/>
+            </a:schemeClr>
+          </a:lnRef>
+          <a:fillRef idx="1">
+            <a:schemeClr val="accent1"/>
+          </a:fillRef>
+          <a:effectRef idx="0">
+            <a:schemeClr val="accent1"/>
+          </a:effectRef>
+          <a:fontRef idx="minor">
+            <a:schemeClr val="lt1"/>
+          </a:fontRef>
+        </p:style>
+        <p:txBody>
+          <a:bodyPr rtlCol="0" anchor="ctr"/>
+          <a:lstStyle/>
+          <a:p>
+            <a:pPr algn="ctr"/>
+            <a:endParaRPr lang="ru-RU"/>
+          </a:p>
+        </p:txBody>
+      </p:sp>
+      <p:sp>
+        <p:nvSpPr>
+          <p:cNvPr id="9" name="Oval 8"/>
+          <p:cNvSpPr/>
+          <p:nvPr/>
+        </p:nvSpPr>
+        <p:spPr>
+          <a:xfrm>
+            <a:off x="1117767" y="5716300"/>
+            <a:ext cx="360040" cy="360040"/>
+          </a:xfrm>
+          <a:prstGeom prst="ellipse">
+            <a:avLst/>
+          </a:prstGeom>
+          <a:solidFill>
+            <a:srgbClr val="F8E992"/>
+          </a:solidFill>
+          <a:ln w="9525">
+            <a:solidFill>
+              <a:srgbClr val="E0AC3A"/>
+            </a:solidFill>
+          </a:ln>
+        </p:spPr>
+        <p:style>
+          <a:lnRef idx="2">
+            <a:schemeClr val="accent1">
+              <a:shade val="50000"/>
+            </a:schemeClr>
+          </a:lnRef>
+          <a:fillRef idx="1">
+            <a:schemeClr val="accent1"/>
+          </a:fillRef>
+          <a:effectRef idx="0">
+            <a:schemeClr val="accent1"/>
+          </a:effectRef>
+          <a:fontRef idx="minor">
+            <a:schemeClr val="lt1"/>
+          </a:fontRef>
+        </p:style>
+        <p:txBody>
+          <a:bodyPr rtlCol="0" anchor="ctr"/>
+          <a:lstStyle/>
+          <a:p>
+            <a:pPr algn="ctr"/>
+            <a:endParaRPr lang="ru-RU"/>
+          </a:p>
+        </p:txBody>
+      </p:sp>
+      <p:cxnSp>
+        <p:nvCxnSpPr>
+          <p:cNvPr id="10" name="Straight Arrow Connector 9"/>
+          <p:cNvCxnSpPr>
+            <a:stCxn id="7" idx="4"/>
+            <a:endCxn id="8" idx="1"/>
+          </p:cNvCxnSpPr>
+          <p:nvPr/>
+        </p:nvCxnSpPr>
+        <p:spPr>
+          <a:xfrm>
+            <a:off x="1808599" y="5227104"/>
+            <a:ext cx="415452" cy="541923"/>
+          </a:xfrm>
+          <a:prstGeom prst="straightConnector1">
+            <a:avLst/>
+          </a:prstGeom>
+          <a:ln w="15875">
+            <a:solidFill>
+              <a:schemeClr val="tx1">
+                <a:lumMod val="50000"/>
+                <a:lumOff val="50000"/>
+              </a:schemeClr>
+            </a:solidFill>
+            <a:tailEnd type="triangle"/>
+          </a:ln>
+        </p:spPr>
+        <p:style>
+          <a:lnRef idx="1">
+            <a:schemeClr val="accent1"/>
+          </a:lnRef>
+          <a:fillRef idx="0">
+            <a:schemeClr val="accent1"/>
+          </a:fillRef>
+          <a:effectRef idx="0">
+            <a:schemeClr val="accent1"/>
+          </a:effectRef>
+          <a:fontRef idx="minor">
+            <a:schemeClr val="tx1"/>
+          </a:fontRef>
+        </p:style>
+      </p:cxnSp>
+      <p:cxnSp>
+        <p:nvCxnSpPr>
+          <p:cNvPr id="13" name="Straight Arrow Connector 12"/>
+          <p:cNvCxnSpPr>
+            <a:endCxn id="9" idx="7"/>
+          </p:cNvCxnSpPr>
+          <p:nvPr/>
+        </p:nvCxnSpPr>
+        <p:spPr>
+          <a:xfrm flipH="1">
+            <a:off x="1425080" y="5234534"/>
+            <a:ext cx="376018" cy="534493"/>
+          </a:xfrm>
+          <a:prstGeom prst="straightConnector1">
+            <a:avLst/>
+          </a:prstGeom>
+          <a:ln w="15875">
+            <a:solidFill>
+              <a:schemeClr val="tx1">
+                <a:lumMod val="50000"/>
+                <a:lumOff val="50000"/>
+              </a:schemeClr>
+            </a:solidFill>
+            <a:tailEnd type="triangle"/>
+          </a:ln>
+        </p:spPr>
+        <p:style>
+          <a:lnRef idx="1">
+            <a:schemeClr val="accent1"/>
+          </a:lnRef>
+          <a:fillRef idx="0">
+            <a:schemeClr val="accent1"/>
+          </a:fillRef>
+          <a:effectRef idx="0">
+            <a:schemeClr val="accent1"/>
+          </a:effectRef>
+          <a:fontRef idx="minor">
+            <a:schemeClr val="tx1"/>
+          </a:fontRef>
+        </p:style>
+      </p:cxnSp>
     </p:spTree>
     <p:extLst>
       <p:ext uri="{BB962C8B-B14F-4D97-AF65-F5344CB8AC3E}">
-        <p14:creationId xmlns:p14="http://schemas.microsoft.com/office/powerpoint/2010/main" val="673273499"/>
+        <p14:creationId xmlns:p14="http://schemas.microsoft.com/office/powerpoint/2010/main" val="3708627554"/>
       </p:ext>
     </p:extLst>
   </p:cSld>
@@ -31416,11 +32942,7 @@
           <a:p>
             <a:r>
               <a:rPr lang="en-US" dirty="0" smtClean="0"/>
-              <a:t>Profiling Tool: </a:t>
-            </a:r>
-            <a:r>
-              <a:rPr lang="en-US" dirty="0" err="1" smtClean="0"/>
-              <a:t>MemProfiler</a:t>
+              <a:t>Profiling Tools</a:t>
             </a:r>
             <a:endParaRPr lang="en-US" dirty="0"/>
           </a:p>
@@ -31745,64 +33267,118 @@
           </a:lstStyle>
           <a:p>
             <a:r>
-              <a:rPr lang="en-US" sz="2000" dirty="0" smtClean="0"/>
-              <a:t>Easy and free.</a:t>
+              <a:rPr lang="en-US" sz="2400" dirty="0" err="1" smtClean="0"/>
+              <a:t>MemProfiler</a:t>
             </a:r>
-          </a:p>
-          <a:p>
+            <a:r>
+              <a:rPr lang="en-US" sz="2400" dirty="0" smtClean="0"/>
+              <a:t> (SciTech Software)</a:t>
+            </a:r>
+          </a:p>
+          <a:p>
+            <a:pPr lvl="1"/>
+            <a:r>
+              <a:rPr lang="en-US" sz="1600" dirty="0">
+                <a:hlinkClick r:id="rId2"/>
+              </a:rPr>
+              <a:t>http://memprofiler.com</a:t>
+            </a:r>
+            <a:r>
+              <a:rPr lang="en-US" sz="1600" dirty="0" smtClean="0">
+                <a:hlinkClick r:id="rId2"/>
+              </a:rPr>
+              <a:t>/</a:t>
+            </a:r>
+            <a:endParaRPr lang="en-US" sz="1600" dirty="0" smtClean="0"/>
+          </a:p>
+          <a:p>
+            <a:pPr lvl="1"/>
+            <a:endParaRPr lang="en-US" sz="1600" dirty="0" smtClean="0"/>
+          </a:p>
+          <a:p>
+            <a:r>
+              <a:rPr lang="en-US" sz="2000" dirty="0" err="1" smtClean="0"/>
+              <a:t>dotTrace</a:t>
+            </a:r>
             <a:r>
               <a:rPr lang="en-US" sz="2000" dirty="0" smtClean="0"/>
-              <a:t>Integrated in Visual Studio</a:t>
+              <a:t> Memory (</a:t>
             </a:r>
-          </a:p>
-          <a:p>
+            <a:r>
+              <a:rPr lang="en-US" sz="2000" dirty="0" err="1" smtClean="0"/>
+              <a:t>JetBrains</a:t>
+            </a:r>
             <a:r>
               <a:rPr lang="en-US" sz="2000" dirty="0" smtClean="0"/>
-              <a:t>Command based interface.</a:t>
+              <a:t>)</a:t>
             </a:r>
+          </a:p>
+          <a:p>
+            <a:pPr lvl="1"/>
+            <a:r>
+              <a:rPr lang="en-US" sz="1600" dirty="0">
+                <a:hlinkClick r:id="rId3"/>
+              </a:rPr>
+              <a:t>http://www.jetbrains.com/profiler</a:t>
+            </a:r>
+            <a:r>
+              <a:rPr lang="en-US" sz="1600" dirty="0" smtClean="0">
+                <a:hlinkClick r:id="rId3"/>
+              </a:rPr>
+              <a:t>/</a:t>
+            </a:r>
+            <a:endParaRPr lang="en-US" sz="1600" dirty="0" smtClean="0"/>
+          </a:p>
+          <a:p>
+            <a:pPr lvl="1"/>
+            <a:endParaRPr lang="en-US" sz="1600" dirty="0" smtClean="0"/>
           </a:p>
           <a:p>
             <a:r>
               <a:rPr lang="en-US" sz="2000" dirty="0" smtClean="0"/>
-              <a:t>Good for quick initial memory profiling.</a:t>
+              <a:t>ANTS Performance Profiler 8 (</a:t>
             </a:r>
-          </a:p>
-        </p:txBody>
-      </p:sp>
-      <p:pic>
-        <p:nvPicPr>
-          <p:cNvPr id="5" name="Picture 4"/>
-          <p:cNvPicPr>
-            <a:picLocks noChangeAspect="1"/>
-          </p:cNvPicPr>
-          <p:nvPr/>
-        </p:nvPicPr>
-        <p:blipFill>
-          <a:blip r:embed="rId2">
-            <a:extLst>
-              <a:ext uri="{28A0092B-C50C-407E-A947-70E740481C1C}">
-                <a14:useLocalDpi xmlns:a14="http://schemas.microsoft.com/office/drawing/2010/main" val="0"/>
-              </a:ext>
-            </a:extLst>
-          </a:blip>
-          <a:stretch>
-            <a:fillRect/>
-          </a:stretch>
-        </p:blipFill>
-        <p:spPr>
-          <a:xfrm>
-            <a:off x="1452316" y="3383931"/>
-            <a:ext cx="6279513" cy="3001588"/>
-          </a:xfrm>
-          <a:prstGeom prst="rect">
-            <a:avLst/>
-          </a:prstGeom>
-        </p:spPr>
-      </p:pic>
+            <a:r>
+              <a:rPr lang="en-US" sz="2000" dirty="0" err="1" smtClean="0"/>
+              <a:t>Redgate</a:t>
+            </a:r>
+            <a:r>
+              <a:rPr lang="en-US" sz="2000" dirty="0" smtClean="0"/>
+              <a:t>)</a:t>
+            </a:r>
+          </a:p>
+          <a:p>
+            <a:pPr lvl="1"/>
+            <a:r>
+              <a:rPr lang="en-US" sz="1600" dirty="0">
+                <a:hlinkClick r:id="rId4"/>
+              </a:rPr>
+              <a:t>http://www.red-gate.com/products/dotnet-development/ants-performance-profiler</a:t>
+            </a:r>
+            <a:r>
+              <a:rPr lang="en-US" sz="1600" dirty="0" smtClean="0">
+                <a:hlinkClick r:id="rId4"/>
+              </a:rPr>
+              <a:t>/</a:t>
+            </a:r>
+            <a:endParaRPr lang="en-US" sz="1600" dirty="0" smtClean="0"/>
+          </a:p>
+          <a:p>
+            <a:pPr lvl="1"/>
+            <a:endParaRPr lang="en-US" sz="1600" dirty="0" smtClean="0"/>
+          </a:p>
+          <a:p>
+            <a:r>
+              <a:rPr lang="en-US" sz="2000" dirty="0" smtClean="0"/>
+              <a:t>WinDbg.exe + SOS</a:t>
+            </a:r>
+          </a:p>
+        </p:txBody>
+      </p:sp>
     </p:spTree>
     <p:extLst>
       <p:ext uri="{BB962C8B-B14F-4D97-AF65-F5344CB8AC3E}">
-        <p14:creationId xmlns:p14="http://schemas.microsoft.com/office/powerpoint/2010/main" val="3038345518"/>
+        <p14:creationId xmlns:p14="http://schemas.microsoft.com/office/powerpoint/2010/main" val="3974821222"/>
       </p:ext>
     </p:extLst>
   </p:cSld>
@@ -31838,12 +33414,12 @@
       </p:grpSpPr>
       <p:sp>
         <p:nvSpPr>
-          <p:cNvPr id="2" name="Text Placeholder 1"/>
+          <p:cNvPr id="2" name="Title 1"/>
           <p:cNvSpPr>
             <a:spLocks noGrp="1"/>
           </p:cNvSpPr>
           <p:nvPr>
-            <p:ph type="body" sz="quarter" idx="10"/>
+            <p:ph type="title"/>
           </p:nvPr>
         </p:nvSpPr>
         <p:spPr/>
@@ -31853,7 +33429,11 @@
           <a:p>
             <a:r>
               <a:rPr lang="en-US" dirty="0" smtClean="0"/>
-              <a:t>Yuriy Shapovalov</a:t>
+              <a:t>Profiling Tool: </a:t>
+            </a:r>
+            <a:r>
+              <a:rPr lang="en-US" dirty="0" err="1" smtClean="0"/>
+              <a:t>MemProfiler</a:t>
             </a:r>
             <a:endParaRPr lang="en-US" dirty="0"/>
           </a:p>
@@ -31861,165 +33441,845 @@
       </p:sp>
       <p:sp>
         <p:nvSpPr>
-          <p:cNvPr id="3" name="Text Placeholder 2"/>
+          <p:cNvPr id="3" name="Content Placeholder 2"/>
+          <p:cNvSpPr txBox="1">
+            <a:spLocks/>
+          </p:cNvSpPr>
+          <p:nvPr/>
+        </p:nvSpPr>
+        <p:spPr>
+          <a:xfrm>
+            <a:off x="611560" y="1174019"/>
+            <a:ext cx="8280920" cy="5112567"/>
+          </a:xfrm>
+          <a:prstGeom prst="rect">
+            <a:avLst/>
+          </a:prstGeom>
+        </p:spPr>
+        <p:txBody>
+          <a:bodyPr/>
+          <a:lstStyle>
+            <a:lvl1pPr marL="342900" indent="-342900" algn="l" defTabSz="914400" rtl="0" eaLnBrk="1" latinLnBrk="0" hangingPunct="1">
+              <a:spcBef>
+                <a:spcPct val="20000"/>
+              </a:spcBef>
+              <a:buFont typeface="Arial" pitchFamily="34" charset="0"/>
+              <a:buChar char="•"/>
+              <a:defRPr sz="3200" kern="1200">
+                <a:solidFill>
+                  <a:schemeClr val="tx1"/>
+                </a:solidFill>
+                <a:latin typeface="+mn-lt"/>
+                <a:ea typeface="+mn-ea"/>
+                <a:cs typeface="+mn-cs"/>
+              </a:defRPr>
+            </a:lvl1pPr>
+            <a:lvl2pPr marL="742950" indent="-285750" algn="l" defTabSz="914400" rtl="0" eaLnBrk="1" latinLnBrk="0" hangingPunct="1">
+              <a:spcBef>
+                <a:spcPct val="20000"/>
+              </a:spcBef>
+              <a:buFont typeface="Arial" pitchFamily="34" charset="0"/>
+              <a:buChar char="–"/>
+              <a:defRPr sz="2800" kern="1200">
+                <a:solidFill>
+                  <a:schemeClr val="tx1"/>
+                </a:solidFill>
+                <a:latin typeface="+mn-lt"/>
+                <a:ea typeface="+mn-ea"/>
+                <a:cs typeface="+mn-cs"/>
+              </a:defRPr>
+            </a:lvl2pPr>
+            <a:lvl3pPr marL="1143000" indent="-228600" algn="l" defTabSz="914400" rtl="0" eaLnBrk="1" latinLnBrk="0" hangingPunct="1">
+              <a:spcBef>
+                <a:spcPct val="20000"/>
+              </a:spcBef>
+              <a:buFont typeface="Arial" pitchFamily="34" charset="0"/>
+              <a:buChar char="•"/>
+              <a:defRPr sz="2400" kern="1200">
+                <a:solidFill>
+                  <a:schemeClr val="tx1"/>
+                </a:solidFill>
+                <a:latin typeface="+mn-lt"/>
+                <a:ea typeface="+mn-ea"/>
+                <a:cs typeface="+mn-cs"/>
+              </a:defRPr>
+            </a:lvl3pPr>
+            <a:lvl4pPr marL="1600200" indent="-228600" algn="l" defTabSz="914400" rtl="0" eaLnBrk="1" latinLnBrk="0" hangingPunct="1">
+              <a:spcBef>
+                <a:spcPct val="20000"/>
+              </a:spcBef>
+              <a:buFont typeface="Arial" pitchFamily="34" charset="0"/>
+              <a:buChar char="–"/>
+              <a:defRPr sz="2000" kern="1200">
+                <a:solidFill>
+                  <a:schemeClr val="tx1"/>
+                </a:solidFill>
+                <a:latin typeface="+mn-lt"/>
+                <a:ea typeface="+mn-ea"/>
+                <a:cs typeface="+mn-cs"/>
+              </a:defRPr>
+            </a:lvl4pPr>
+            <a:lvl5pPr marL="2057400" indent="-228600" algn="l" defTabSz="914400" rtl="0" eaLnBrk="1" latinLnBrk="0" hangingPunct="1">
+              <a:spcBef>
+                <a:spcPct val="20000"/>
+              </a:spcBef>
+              <a:buFont typeface="Arial" pitchFamily="34" charset="0"/>
+              <a:buChar char="»"/>
+              <a:defRPr sz="2000" kern="1200">
+                <a:solidFill>
+                  <a:schemeClr val="tx1"/>
+                </a:solidFill>
+                <a:latin typeface="+mn-lt"/>
+                <a:ea typeface="+mn-ea"/>
+                <a:cs typeface="+mn-cs"/>
+              </a:defRPr>
+            </a:lvl5pPr>
+            <a:lvl6pPr marL="2514600" indent="-228600" algn="l" defTabSz="914400" rtl="0" eaLnBrk="1" latinLnBrk="0" hangingPunct="1">
+              <a:spcBef>
+                <a:spcPct val="20000"/>
+              </a:spcBef>
+              <a:buFont typeface="Arial" pitchFamily="34" charset="0"/>
+              <a:buChar char="•"/>
+              <a:defRPr sz="2000" kern="1200">
+                <a:solidFill>
+                  <a:schemeClr val="tx1"/>
+                </a:solidFill>
+                <a:latin typeface="+mn-lt"/>
+                <a:ea typeface="+mn-ea"/>
+                <a:cs typeface="+mn-cs"/>
+              </a:defRPr>
+            </a:lvl6pPr>
+            <a:lvl7pPr marL="2971800" indent="-228600" algn="l" defTabSz="914400" rtl="0" eaLnBrk="1" latinLnBrk="0" hangingPunct="1">
+              <a:spcBef>
+                <a:spcPct val="20000"/>
+              </a:spcBef>
+              <a:buFont typeface="Arial" pitchFamily="34" charset="0"/>
+              <a:buChar char="•"/>
+              <a:defRPr sz="2000" kern="1200">
+                <a:solidFill>
+                  <a:schemeClr val="tx1"/>
+                </a:solidFill>
+                <a:latin typeface="+mn-lt"/>
+                <a:ea typeface="+mn-ea"/>
+                <a:cs typeface="+mn-cs"/>
+              </a:defRPr>
+            </a:lvl7pPr>
+            <a:lvl8pPr marL="3429000" indent="-228600" algn="l" defTabSz="914400" rtl="0" eaLnBrk="1" latinLnBrk="0" hangingPunct="1">
+              <a:spcBef>
+                <a:spcPct val="20000"/>
+              </a:spcBef>
+              <a:buFont typeface="Arial" pitchFamily="34" charset="0"/>
+              <a:buChar char="•"/>
+              <a:defRPr sz="2000" kern="1200">
+                <a:solidFill>
+                  <a:schemeClr val="tx1"/>
+                </a:solidFill>
+                <a:latin typeface="+mn-lt"/>
+                <a:ea typeface="+mn-ea"/>
+                <a:cs typeface="+mn-cs"/>
+              </a:defRPr>
+            </a:lvl8pPr>
+            <a:lvl9pPr marL="3886200" indent="-228600" algn="l" defTabSz="914400" rtl="0" eaLnBrk="1" latinLnBrk="0" hangingPunct="1">
+              <a:spcBef>
+                <a:spcPct val="20000"/>
+              </a:spcBef>
+              <a:buFont typeface="Arial" pitchFamily="34" charset="0"/>
+              <a:buChar char="•"/>
+              <a:defRPr sz="2000" kern="1200">
+                <a:solidFill>
+                  <a:schemeClr val="tx1"/>
+                </a:solidFill>
+                <a:latin typeface="+mn-lt"/>
+                <a:ea typeface="+mn-ea"/>
+                <a:cs typeface="+mn-cs"/>
+              </a:defRPr>
+            </a:lvl9pPr>
+          </a:lstStyle>
+          <a:p>
+            <a:endParaRPr lang="ru-RU" sz="2400" dirty="0"/>
+          </a:p>
+        </p:txBody>
+      </p:sp>
+      <p:sp>
+        <p:nvSpPr>
+          <p:cNvPr id="4" name="Content Placeholder 2"/>
+          <p:cNvSpPr txBox="1">
+            <a:spLocks/>
+          </p:cNvSpPr>
+          <p:nvPr/>
+        </p:nvSpPr>
+        <p:spPr>
+          <a:xfrm>
+            <a:off x="763960" y="1349152"/>
+            <a:ext cx="8280920" cy="5112567"/>
+          </a:xfrm>
+          <a:prstGeom prst="rect">
+            <a:avLst/>
+          </a:prstGeom>
+        </p:spPr>
+        <p:txBody>
+          <a:bodyPr/>
+          <a:lstStyle>
+            <a:lvl1pPr marL="342900" indent="-342900" algn="l" defTabSz="914400" rtl="0" eaLnBrk="1" latinLnBrk="0" hangingPunct="1">
+              <a:spcBef>
+                <a:spcPct val="20000"/>
+              </a:spcBef>
+              <a:buFont typeface="Arial" pitchFamily="34" charset="0"/>
+              <a:buChar char="•"/>
+              <a:defRPr sz="3200" kern="1200">
+                <a:solidFill>
+                  <a:schemeClr val="tx1"/>
+                </a:solidFill>
+                <a:latin typeface="+mn-lt"/>
+                <a:ea typeface="+mn-ea"/>
+                <a:cs typeface="+mn-cs"/>
+              </a:defRPr>
+            </a:lvl1pPr>
+            <a:lvl2pPr marL="742950" indent="-285750" algn="l" defTabSz="914400" rtl="0" eaLnBrk="1" latinLnBrk="0" hangingPunct="1">
+              <a:spcBef>
+                <a:spcPct val="20000"/>
+              </a:spcBef>
+              <a:buFont typeface="Arial" pitchFamily="34" charset="0"/>
+              <a:buChar char="–"/>
+              <a:defRPr sz="2800" kern="1200">
+                <a:solidFill>
+                  <a:schemeClr val="tx1"/>
+                </a:solidFill>
+                <a:latin typeface="+mn-lt"/>
+                <a:ea typeface="+mn-ea"/>
+                <a:cs typeface="+mn-cs"/>
+              </a:defRPr>
+            </a:lvl2pPr>
+            <a:lvl3pPr marL="1143000" indent="-228600" algn="l" defTabSz="914400" rtl="0" eaLnBrk="1" latinLnBrk="0" hangingPunct="1">
+              <a:spcBef>
+                <a:spcPct val="20000"/>
+              </a:spcBef>
+              <a:buFont typeface="Arial" pitchFamily="34" charset="0"/>
+              <a:buChar char="•"/>
+              <a:defRPr sz="2400" kern="1200">
+                <a:solidFill>
+                  <a:schemeClr val="tx1"/>
+                </a:solidFill>
+                <a:latin typeface="+mn-lt"/>
+                <a:ea typeface="+mn-ea"/>
+                <a:cs typeface="+mn-cs"/>
+              </a:defRPr>
+            </a:lvl3pPr>
+            <a:lvl4pPr marL="1600200" indent="-228600" algn="l" defTabSz="914400" rtl="0" eaLnBrk="1" latinLnBrk="0" hangingPunct="1">
+              <a:spcBef>
+                <a:spcPct val="20000"/>
+              </a:spcBef>
+              <a:buFont typeface="Arial" pitchFamily="34" charset="0"/>
+              <a:buChar char="–"/>
+              <a:defRPr sz="2000" kern="1200">
+                <a:solidFill>
+                  <a:schemeClr val="tx1"/>
+                </a:solidFill>
+                <a:latin typeface="+mn-lt"/>
+                <a:ea typeface="+mn-ea"/>
+                <a:cs typeface="+mn-cs"/>
+              </a:defRPr>
+            </a:lvl4pPr>
+            <a:lvl5pPr marL="2057400" indent="-228600" algn="l" defTabSz="914400" rtl="0" eaLnBrk="1" latinLnBrk="0" hangingPunct="1">
+              <a:spcBef>
+                <a:spcPct val="20000"/>
+              </a:spcBef>
+              <a:buFont typeface="Arial" pitchFamily="34" charset="0"/>
+              <a:buChar char="»"/>
+              <a:defRPr sz="2000" kern="1200">
+                <a:solidFill>
+                  <a:schemeClr val="tx1"/>
+                </a:solidFill>
+                <a:latin typeface="+mn-lt"/>
+                <a:ea typeface="+mn-ea"/>
+                <a:cs typeface="+mn-cs"/>
+              </a:defRPr>
+            </a:lvl5pPr>
+            <a:lvl6pPr marL="2514600" indent="-228600" algn="l" defTabSz="914400" rtl="0" eaLnBrk="1" latinLnBrk="0" hangingPunct="1">
+              <a:spcBef>
+                <a:spcPct val="20000"/>
+              </a:spcBef>
+              <a:buFont typeface="Arial" pitchFamily="34" charset="0"/>
+              <a:buChar char="•"/>
+              <a:defRPr sz="2000" kern="1200">
+                <a:solidFill>
+                  <a:schemeClr val="tx1"/>
+                </a:solidFill>
+                <a:latin typeface="+mn-lt"/>
+                <a:ea typeface="+mn-ea"/>
+                <a:cs typeface="+mn-cs"/>
+              </a:defRPr>
+            </a:lvl6pPr>
+            <a:lvl7pPr marL="2971800" indent="-228600" algn="l" defTabSz="914400" rtl="0" eaLnBrk="1" latinLnBrk="0" hangingPunct="1">
+              <a:spcBef>
+                <a:spcPct val="20000"/>
+              </a:spcBef>
+              <a:buFont typeface="Arial" pitchFamily="34" charset="0"/>
+              <a:buChar char="•"/>
+              <a:defRPr sz="2000" kern="1200">
+                <a:solidFill>
+                  <a:schemeClr val="tx1"/>
+                </a:solidFill>
+                <a:latin typeface="+mn-lt"/>
+                <a:ea typeface="+mn-ea"/>
+                <a:cs typeface="+mn-cs"/>
+              </a:defRPr>
+            </a:lvl7pPr>
+            <a:lvl8pPr marL="3429000" indent="-228600" algn="l" defTabSz="914400" rtl="0" eaLnBrk="1" latinLnBrk="0" hangingPunct="1">
+              <a:spcBef>
+                <a:spcPct val="20000"/>
+              </a:spcBef>
+              <a:buFont typeface="Arial" pitchFamily="34" charset="0"/>
+              <a:buChar char="•"/>
+              <a:defRPr sz="2000" kern="1200">
+                <a:solidFill>
+                  <a:schemeClr val="tx1"/>
+                </a:solidFill>
+                <a:latin typeface="+mn-lt"/>
+                <a:ea typeface="+mn-ea"/>
+                <a:cs typeface="+mn-cs"/>
+              </a:defRPr>
+            </a:lvl8pPr>
+            <a:lvl9pPr marL="3886200" indent="-228600" algn="l" defTabSz="914400" rtl="0" eaLnBrk="1" latinLnBrk="0" hangingPunct="1">
+              <a:spcBef>
+                <a:spcPct val="20000"/>
+              </a:spcBef>
+              <a:buFont typeface="Arial" pitchFamily="34" charset="0"/>
+              <a:buChar char="•"/>
+              <a:defRPr sz="2000" kern="1200">
+                <a:solidFill>
+                  <a:schemeClr val="tx1"/>
+                </a:solidFill>
+                <a:latin typeface="+mn-lt"/>
+                <a:ea typeface="+mn-ea"/>
+                <a:cs typeface="+mn-cs"/>
+              </a:defRPr>
+            </a:lvl9pPr>
+          </a:lstStyle>
+          <a:p>
+            <a:r>
+              <a:rPr lang="en-US" sz="2000" dirty="0" smtClean="0"/>
+              <a:t>Highly focused on memory profiling and leak detection.</a:t>
+            </a:r>
+          </a:p>
+          <a:p>
+            <a:r>
+              <a:rPr lang="en-US" sz="2000" dirty="0" smtClean="0"/>
+              <a:t>Rich User interface.</a:t>
+            </a:r>
+          </a:p>
+          <a:p>
+            <a:r>
+              <a:rPr lang="en-US" sz="2000" dirty="0" smtClean="0"/>
+              <a:t>Can work on production server and generate reports.</a:t>
+            </a:r>
+            <a:endParaRPr lang="en-US" sz="2000" dirty="0" smtClean="0"/>
+          </a:p>
+        </p:txBody>
+      </p:sp>
+      <p:sp>
+        <p:nvSpPr>
+          <p:cNvPr id="6" name="AutoShape 4" descr="http://www-cdn.memprofiler.com/screenshots/GuidedOverview.png"/>
+          <p:cNvSpPr>
+            <a:spLocks noChangeAspect="1" noChangeArrowheads="1"/>
+          </p:cNvSpPr>
+          <p:nvPr/>
+        </p:nvSpPr>
+        <p:spPr bwMode="auto">
+          <a:xfrm>
+            <a:off x="63500" y="-136525"/>
+            <a:ext cx="10534650" cy="6781800"/>
+          </a:xfrm>
+          <a:prstGeom prst="rect">
+            <a:avLst/>
+          </a:prstGeom>
+          <a:noFill/>
+          <a:extLst>
+            <a:ext uri="{909E8E84-426E-40DD-AFC4-6F175D3DCCD1}">
+              <a14:hiddenFill xmlns:a14="http://schemas.microsoft.com/office/drawing/2010/main">
+                <a:solidFill>
+                  <a:srgbClr val="FFFFFF"/>
+                </a:solidFill>
+              </a14:hiddenFill>
+            </a:ext>
+          </a:extLst>
+        </p:spPr>
+        <p:txBody>
+          <a:bodyPr vert="horz" wrap="square" lIns="91440" tIns="45720" rIns="91440" bIns="45720" numCol="1" anchor="t" anchorCtr="0" compatLnSpc="1">
+            <a:prstTxWarp prst="textNoShape">
+              <a:avLst/>
+            </a:prstTxWarp>
+          </a:bodyPr>
+          <a:lstStyle/>
+          <a:p>
+            <a:endParaRPr lang="ru-RU"/>
+          </a:p>
+        </p:txBody>
+      </p:sp>
+      <p:pic>
+        <p:nvPicPr>
+          <p:cNvPr id="8" name="Picture 7"/>
+          <p:cNvPicPr>
+            <a:picLocks noChangeAspect="1"/>
+          </p:cNvPicPr>
+          <p:nvPr/>
+        </p:nvPicPr>
+        <p:blipFill>
+          <a:blip r:embed="rId2">
+            <a:extLst>
+              <a:ext uri="{28A0092B-C50C-407E-A947-70E740481C1C}">
+                <a14:useLocalDpi xmlns:a14="http://schemas.microsoft.com/office/drawing/2010/main" val="0"/>
+              </a:ext>
+            </a:extLst>
+          </a:blip>
+          <a:stretch>
+            <a:fillRect/>
+          </a:stretch>
+        </p:blipFill>
+        <p:spPr>
+          <a:xfrm>
+            <a:off x="1434664" y="2647970"/>
+            <a:ext cx="5652120" cy="3638616"/>
+          </a:xfrm>
+          <a:prstGeom prst="rect">
+            <a:avLst/>
+          </a:prstGeom>
+        </p:spPr>
+      </p:pic>
+    </p:spTree>
+    <p:extLst>
+      <p:ext uri="{BB962C8B-B14F-4D97-AF65-F5344CB8AC3E}">
+        <p14:creationId xmlns:p14="http://schemas.microsoft.com/office/powerpoint/2010/main" val="1142978076"/>
+      </p:ext>
+    </p:extLst>
+  </p:cSld>
+  <p:clrMapOvr>
+    <a:masterClrMapping/>
+  </p:clrMapOvr>
+  <p:timing>
+    <p:tnLst>
+      <p:par>
+        <p:cTn id="1" dur="indefinite" restart="never" nodeType="tmRoot"/>
+      </p:par>
+    </p:tnLst>
+  </p:timing>
+</p:sld>
+</file>
+
+<file path=ppt/slides/slide29.xml><?xml version="1.0" encoding="utf-8"?>
+<p:sld xmlns:a="http://schemas.openxmlformats.org/drawingml/2006/main" xmlns:r="http://schemas.openxmlformats.org/officeDocument/2006/relationships" xmlns:p="http://schemas.openxmlformats.org/presentationml/2006/main">
+  <p:cSld>
+    <p:spTree>
+      <p:nvGrpSpPr>
+        <p:cNvPr id="1" name=""/>
+        <p:cNvGrpSpPr/>
+        <p:nvPr/>
+      </p:nvGrpSpPr>
+      <p:grpSpPr>
+        <a:xfrm>
+          <a:off x="0" y="0"/>
+          <a:ext cx="0" cy="0"/>
+          <a:chOff x="0" y="0"/>
+          <a:chExt cx="0" cy="0"/>
+        </a:xfrm>
+      </p:grpSpPr>
+      <p:sp>
+        <p:nvSpPr>
+          <p:cNvPr id="2" name="Title 1"/>
           <p:cNvSpPr>
             <a:spLocks noGrp="1"/>
           </p:cNvSpPr>
           <p:nvPr>
-            <p:ph type="body" sz="quarter" idx="11"/>
+            <p:ph type="title"/>
           </p:nvPr>
         </p:nvSpPr>
-        <p:spPr>
-          <a:xfrm>
-            <a:off x="595792" y="3273667"/>
-            <a:ext cx="4312143" cy="353943"/>
-          </a:xfrm>
-        </p:spPr>
+        <p:spPr/>
         <p:txBody>
           <a:bodyPr/>
           <a:lstStyle/>
           <a:p>
             <a:r>
               <a:rPr lang="en-US" dirty="0" smtClean="0"/>
-              <a:t>Senior Software Engineer, EPAM (Kharkov)</a:t>
-            </a:r>
-            <a:endParaRPr lang="en-US" dirty="0"/>
-          </a:p>
-        </p:txBody>
-      </p:sp>
-      <p:sp>
-        <p:nvSpPr>
-          <p:cNvPr id="4" name="Text Placeholder 3"/>
-          <p:cNvSpPr>
-            <a:spLocks noGrp="1"/>
-          </p:cNvSpPr>
-          <p:nvPr>
-            <p:ph type="body" sz="quarter" idx="12"/>
-          </p:nvPr>
-        </p:nvSpPr>
-        <p:spPr>
-          <a:xfrm>
-            <a:off x="1078992" y="4187952"/>
-            <a:ext cx="3493008" cy="477699"/>
-          </a:xfrm>
-        </p:spPr>
-        <p:txBody>
-          <a:bodyPr/>
-          <a:lstStyle/>
-          <a:p>
-            <a:r>
-              <a:rPr lang="en-US" dirty="0" smtClean="0"/>
-              <a:t>yurii_shapovalov@epam.com</a:t>
-            </a:r>
-            <a:endParaRPr lang="en-US" dirty="0"/>
-          </a:p>
-        </p:txBody>
-      </p:sp>
-      <p:sp>
-        <p:nvSpPr>
-          <p:cNvPr id="5" name="Text Placeholder 4"/>
-          <p:cNvSpPr>
-            <a:spLocks noGrp="1"/>
-          </p:cNvSpPr>
-          <p:nvPr>
-            <p:ph type="body" sz="quarter" idx="13"/>
-          </p:nvPr>
-        </p:nvSpPr>
-        <p:spPr>
-          <a:xfrm>
-            <a:off x="1078992" y="4974336"/>
-            <a:ext cx="3493008" cy="477699"/>
-          </a:xfrm>
-        </p:spPr>
-        <p:txBody>
-          <a:bodyPr/>
-          <a:lstStyle/>
-          <a:p>
-            <a:r>
-              <a:rPr lang="en-US" sz="1800" dirty="0" smtClean="0"/>
-              <a:t>linkedin.com/in/</a:t>
-            </a:r>
-            <a:r>
-              <a:rPr lang="en-US" sz="1800" dirty="0" err="1" smtClean="0"/>
-              <a:t>yuriyshapovalov</a:t>
-            </a:r>
-            <a:endParaRPr lang="en-US" sz="1800" dirty="0"/>
-          </a:p>
-        </p:txBody>
-      </p:sp>
-      <p:sp>
-        <p:nvSpPr>
-          <p:cNvPr id="6" name="Text Placeholder 5"/>
-          <p:cNvSpPr>
-            <a:spLocks noGrp="1"/>
-          </p:cNvSpPr>
-          <p:nvPr>
-            <p:ph type="body" sz="quarter" idx="14"/>
-          </p:nvPr>
-        </p:nvSpPr>
-        <p:spPr/>
-        <p:txBody>
-          <a:bodyPr/>
-          <a:lstStyle/>
-          <a:p>
-            <a:endParaRPr lang="en-US"/>
-          </a:p>
-        </p:txBody>
-      </p:sp>
-      <p:sp>
-        <p:nvSpPr>
-          <p:cNvPr id="7" name="Text Placeholder 6"/>
-          <p:cNvSpPr>
-            <a:spLocks noGrp="1"/>
-          </p:cNvSpPr>
-          <p:nvPr>
-            <p:ph type="body" sz="quarter" idx="15"/>
-          </p:nvPr>
-        </p:nvSpPr>
-        <p:spPr/>
-        <p:txBody>
-          <a:bodyPr/>
-          <a:lstStyle/>
-          <a:p>
-            <a:r>
-              <a:rPr lang="en-US" dirty="0" smtClean="0"/>
-              <a:t>shapovalov.yuriy</a:t>
-            </a:r>
-            <a:endParaRPr lang="en-US" dirty="0"/>
-          </a:p>
-        </p:txBody>
-      </p:sp>
-      <p:sp>
-        <p:nvSpPr>
-          <p:cNvPr id="8" name="Text Placeholder 7"/>
-          <p:cNvSpPr>
-            <a:spLocks noGrp="1"/>
-          </p:cNvSpPr>
-          <p:nvPr>
-            <p:ph type="body" sz="quarter" idx="16"/>
-          </p:nvPr>
-        </p:nvSpPr>
-        <p:spPr/>
-        <p:txBody>
-          <a:bodyPr/>
-          <a:lstStyle/>
-          <a:p>
-            <a:r>
-              <a:rPr lang="en-US" dirty="0" smtClean="0"/>
-              <a:t>@</a:t>
+              <a:t>Profiling Tool: </a:t>
             </a:r>
             <a:r>
               <a:rPr lang="en-US" dirty="0" err="1" smtClean="0"/>
-              <a:t>YuriyShapovalov</a:t>
+              <a:t>dotTrace</a:t>
+            </a:r>
+            <a:r>
+              <a:rPr lang="en-US" dirty="0" smtClean="0"/>
+              <a:t> Memory</a:t>
             </a:r>
             <a:endParaRPr lang="en-US" dirty="0"/>
           </a:p>
         </p:txBody>
       </p:sp>
+      <p:sp>
+        <p:nvSpPr>
+          <p:cNvPr id="3" name="Content Placeholder 2"/>
+          <p:cNvSpPr txBox="1">
+            <a:spLocks/>
+          </p:cNvSpPr>
+          <p:nvPr/>
+        </p:nvSpPr>
+        <p:spPr>
+          <a:xfrm>
+            <a:off x="611560" y="1196752"/>
+            <a:ext cx="8280920" cy="5112567"/>
+          </a:xfrm>
+          <a:prstGeom prst="rect">
+            <a:avLst/>
+          </a:prstGeom>
+        </p:spPr>
+        <p:txBody>
+          <a:bodyPr/>
+          <a:lstStyle>
+            <a:lvl1pPr marL="342900" indent="-342900" algn="l" defTabSz="914400" rtl="0" eaLnBrk="1" latinLnBrk="0" hangingPunct="1">
+              <a:spcBef>
+                <a:spcPct val="20000"/>
+              </a:spcBef>
+              <a:buFont typeface="Arial" pitchFamily="34" charset="0"/>
+              <a:buChar char="•"/>
+              <a:defRPr sz="3200" kern="1200">
+                <a:solidFill>
+                  <a:schemeClr val="tx1"/>
+                </a:solidFill>
+                <a:latin typeface="+mn-lt"/>
+                <a:ea typeface="+mn-ea"/>
+                <a:cs typeface="+mn-cs"/>
+              </a:defRPr>
+            </a:lvl1pPr>
+            <a:lvl2pPr marL="742950" indent="-285750" algn="l" defTabSz="914400" rtl="0" eaLnBrk="1" latinLnBrk="0" hangingPunct="1">
+              <a:spcBef>
+                <a:spcPct val="20000"/>
+              </a:spcBef>
+              <a:buFont typeface="Arial" pitchFamily="34" charset="0"/>
+              <a:buChar char="–"/>
+              <a:defRPr sz="2800" kern="1200">
+                <a:solidFill>
+                  <a:schemeClr val="tx1"/>
+                </a:solidFill>
+                <a:latin typeface="+mn-lt"/>
+                <a:ea typeface="+mn-ea"/>
+                <a:cs typeface="+mn-cs"/>
+              </a:defRPr>
+            </a:lvl2pPr>
+            <a:lvl3pPr marL="1143000" indent="-228600" algn="l" defTabSz="914400" rtl="0" eaLnBrk="1" latinLnBrk="0" hangingPunct="1">
+              <a:spcBef>
+                <a:spcPct val="20000"/>
+              </a:spcBef>
+              <a:buFont typeface="Arial" pitchFamily="34" charset="0"/>
+              <a:buChar char="•"/>
+              <a:defRPr sz="2400" kern="1200">
+                <a:solidFill>
+                  <a:schemeClr val="tx1"/>
+                </a:solidFill>
+                <a:latin typeface="+mn-lt"/>
+                <a:ea typeface="+mn-ea"/>
+                <a:cs typeface="+mn-cs"/>
+              </a:defRPr>
+            </a:lvl3pPr>
+            <a:lvl4pPr marL="1600200" indent="-228600" algn="l" defTabSz="914400" rtl="0" eaLnBrk="1" latinLnBrk="0" hangingPunct="1">
+              <a:spcBef>
+                <a:spcPct val="20000"/>
+              </a:spcBef>
+              <a:buFont typeface="Arial" pitchFamily="34" charset="0"/>
+              <a:buChar char="–"/>
+              <a:defRPr sz="2000" kern="1200">
+                <a:solidFill>
+                  <a:schemeClr val="tx1"/>
+                </a:solidFill>
+                <a:latin typeface="+mn-lt"/>
+                <a:ea typeface="+mn-ea"/>
+                <a:cs typeface="+mn-cs"/>
+              </a:defRPr>
+            </a:lvl4pPr>
+            <a:lvl5pPr marL="2057400" indent="-228600" algn="l" defTabSz="914400" rtl="0" eaLnBrk="1" latinLnBrk="0" hangingPunct="1">
+              <a:spcBef>
+                <a:spcPct val="20000"/>
+              </a:spcBef>
+              <a:buFont typeface="Arial" pitchFamily="34" charset="0"/>
+              <a:buChar char="»"/>
+              <a:defRPr sz="2000" kern="1200">
+                <a:solidFill>
+                  <a:schemeClr val="tx1"/>
+                </a:solidFill>
+                <a:latin typeface="+mn-lt"/>
+                <a:ea typeface="+mn-ea"/>
+                <a:cs typeface="+mn-cs"/>
+              </a:defRPr>
+            </a:lvl5pPr>
+            <a:lvl6pPr marL="2514600" indent="-228600" algn="l" defTabSz="914400" rtl="0" eaLnBrk="1" latinLnBrk="0" hangingPunct="1">
+              <a:spcBef>
+                <a:spcPct val="20000"/>
+              </a:spcBef>
+              <a:buFont typeface="Arial" pitchFamily="34" charset="0"/>
+              <a:buChar char="•"/>
+              <a:defRPr sz="2000" kern="1200">
+                <a:solidFill>
+                  <a:schemeClr val="tx1"/>
+                </a:solidFill>
+                <a:latin typeface="+mn-lt"/>
+                <a:ea typeface="+mn-ea"/>
+                <a:cs typeface="+mn-cs"/>
+              </a:defRPr>
+            </a:lvl6pPr>
+            <a:lvl7pPr marL="2971800" indent="-228600" algn="l" defTabSz="914400" rtl="0" eaLnBrk="1" latinLnBrk="0" hangingPunct="1">
+              <a:spcBef>
+                <a:spcPct val="20000"/>
+              </a:spcBef>
+              <a:buFont typeface="Arial" pitchFamily="34" charset="0"/>
+              <a:buChar char="•"/>
+              <a:defRPr sz="2000" kern="1200">
+                <a:solidFill>
+                  <a:schemeClr val="tx1"/>
+                </a:solidFill>
+                <a:latin typeface="+mn-lt"/>
+                <a:ea typeface="+mn-ea"/>
+                <a:cs typeface="+mn-cs"/>
+              </a:defRPr>
+            </a:lvl7pPr>
+            <a:lvl8pPr marL="3429000" indent="-228600" algn="l" defTabSz="914400" rtl="0" eaLnBrk="1" latinLnBrk="0" hangingPunct="1">
+              <a:spcBef>
+                <a:spcPct val="20000"/>
+              </a:spcBef>
+              <a:buFont typeface="Arial" pitchFamily="34" charset="0"/>
+              <a:buChar char="•"/>
+              <a:defRPr sz="2000" kern="1200">
+                <a:solidFill>
+                  <a:schemeClr val="tx1"/>
+                </a:solidFill>
+                <a:latin typeface="+mn-lt"/>
+                <a:ea typeface="+mn-ea"/>
+                <a:cs typeface="+mn-cs"/>
+              </a:defRPr>
+            </a:lvl8pPr>
+            <a:lvl9pPr marL="3886200" indent="-228600" algn="l" defTabSz="914400" rtl="0" eaLnBrk="1" latinLnBrk="0" hangingPunct="1">
+              <a:spcBef>
+                <a:spcPct val="20000"/>
+              </a:spcBef>
+              <a:buFont typeface="Arial" pitchFamily="34" charset="0"/>
+              <a:buChar char="•"/>
+              <a:defRPr sz="2000" kern="1200">
+                <a:solidFill>
+                  <a:schemeClr val="tx1"/>
+                </a:solidFill>
+                <a:latin typeface="+mn-lt"/>
+                <a:ea typeface="+mn-ea"/>
+                <a:cs typeface="+mn-cs"/>
+              </a:defRPr>
+            </a:lvl9pPr>
+          </a:lstStyle>
+          <a:p>
+            <a:endParaRPr lang="ru-RU" sz="2400" dirty="0"/>
+          </a:p>
+        </p:txBody>
+      </p:sp>
+      <p:sp>
+        <p:nvSpPr>
+          <p:cNvPr id="4" name="Content Placeholder 2"/>
+          <p:cNvSpPr txBox="1">
+            <a:spLocks/>
+          </p:cNvSpPr>
+          <p:nvPr/>
+        </p:nvSpPr>
+        <p:spPr>
+          <a:xfrm>
+            <a:off x="763960" y="1349152"/>
+            <a:ext cx="8280920" cy="5112567"/>
+          </a:xfrm>
+          <a:prstGeom prst="rect">
+            <a:avLst/>
+          </a:prstGeom>
+        </p:spPr>
+        <p:txBody>
+          <a:bodyPr/>
+          <a:lstStyle>
+            <a:lvl1pPr marL="342900" indent="-342900" algn="l" defTabSz="914400" rtl="0" eaLnBrk="1" latinLnBrk="0" hangingPunct="1">
+              <a:spcBef>
+                <a:spcPct val="20000"/>
+              </a:spcBef>
+              <a:buFont typeface="Arial" pitchFamily="34" charset="0"/>
+              <a:buChar char="•"/>
+              <a:defRPr sz="3200" kern="1200">
+                <a:solidFill>
+                  <a:schemeClr val="tx1"/>
+                </a:solidFill>
+                <a:latin typeface="+mn-lt"/>
+                <a:ea typeface="+mn-ea"/>
+                <a:cs typeface="+mn-cs"/>
+              </a:defRPr>
+            </a:lvl1pPr>
+            <a:lvl2pPr marL="742950" indent="-285750" algn="l" defTabSz="914400" rtl="0" eaLnBrk="1" latinLnBrk="0" hangingPunct="1">
+              <a:spcBef>
+                <a:spcPct val="20000"/>
+              </a:spcBef>
+              <a:buFont typeface="Arial" pitchFamily="34" charset="0"/>
+              <a:buChar char="–"/>
+              <a:defRPr sz="2800" kern="1200">
+                <a:solidFill>
+                  <a:schemeClr val="tx1"/>
+                </a:solidFill>
+                <a:latin typeface="+mn-lt"/>
+                <a:ea typeface="+mn-ea"/>
+                <a:cs typeface="+mn-cs"/>
+              </a:defRPr>
+            </a:lvl2pPr>
+            <a:lvl3pPr marL="1143000" indent="-228600" algn="l" defTabSz="914400" rtl="0" eaLnBrk="1" latinLnBrk="0" hangingPunct="1">
+              <a:spcBef>
+                <a:spcPct val="20000"/>
+              </a:spcBef>
+              <a:buFont typeface="Arial" pitchFamily="34" charset="0"/>
+              <a:buChar char="•"/>
+              <a:defRPr sz="2400" kern="1200">
+                <a:solidFill>
+                  <a:schemeClr val="tx1"/>
+                </a:solidFill>
+                <a:latin typeface="+mn-lt"/>
+                <a:ea typeface="+mn-ea"/>
+                <a:cs typeface="+mn-cs"/>
+              </a:defRPr>
+            </a:lvl3pPr>
+            <a:lvl4pPr marL="1600200" indent="-228600" algn="l" defTabSz="914400" rtl="0" eaLnBrk="1" latinLnBrk="0" hangingPunct="1">
+              <a:spcBef>
+                <a:spcPct val="20000"/>
+              </a:spcBef>
+              <a:buFont typeface="Arial" pitchFamily="34" charset="0"/>
+              <a:buChar char="–"/>
+              <a:defRPr sz="2000" kern="1200">
+                <a:solidFill>
+                  <a:schemeClr val="tx1"/>
+                </a:solidFill>
+                <a:latin typeface="+mn-lt"/>
+                <a:ea typeface="+mn-ea"/>
+                <a:cs typeface="+mn-cs"/>
+              </a:defRPr>
+            </a:lvl4pPr>
+            <a:lvl5pPr marL="2057400" indent="-228600" algn="l" defTabSz="914400" rtl="0" eaLnBrk="1" latinLnBrk="0" hangingPunct="1">
+              <a:spcBef>
+                <a:spcPct val="20000"/>
+              </a:spcBef>
+              <a:buFont typeface="Arial" pitchFamily="34" charset="0"/>
+              <a:buChar char="»"/>
+              <a:defRPr sz="2000" kern="1200">
+                <a:solidFill>
+                  <a:schemeClr val="tx1"/>
+                </a:solidFill>
+                <a:latin typeface="+mn-lt"/>
+                <a:ea typeface="+mn-ea"/>
+                <a:cs typeface="+mn-cs"/>
+              </a:defRPr>
+            </a:lvl5pPr>
+            <a:lvl6pPr marL="2514600" indent="-228600" algn="l" defTabSz="914400" rtl="0" eaLnBrk="1" latinLnBrk="0" hangingPunct="1">
+              <a:spcBef>
+                <a:spcPct val="20000"/>
+              </a:spcBef>
+              <a:buFont typeface="Arial" pitchFamily="34" charset="0"/>
+              <a:buChar char="•"/>
+              <a:defRPr sz="2000" kern="1200">
+                <a:solidFill>
+                  <a:schemeClr val="tx1"/>
+                </a:solidFill>
+                <a:latin typeface="+mn-lt"/>
+                <a:ea typeface="+mn-ea"/>
+                <a:cs typeface="+mn-cs"/>
+              </a:defRPr>
+            </a:lvl6pPr>
+            <a:lvl7pPr marL="2971800" indent="-228600" algn="l" defTabSz="914400" rtl="0" eaLnBrk="1" latinLnBrk="0" hangingPunct="1">
+              <a:spcBef>
+                <a:spcPct val="20000"/>
+              </a:spcBef>
+              <a:buFont typeface="Arial" pitchFamily="34" charset="0"/>
+              <a:buChar char="•"/>
+              <a:defRPr sz="2000" kern="1200">
+                <a:solidFill>
+                  <a:schemeClr val="tx1"/>
+                </a:solidFill>
+                <a:latin typeface="+mn-lt"/>
+                <a:ea typeface="+mn-ea"/>
+                <a:cs typeface="+mn-cs"/>
+              </a:defRPr>
+            </a:lvl7pPr>
+            <a:lvl8pPr marL="3429000" indent="-228600" algn="l" defTabSz="914400" rtl="0" eaLnBrk="1" latinLnBrk="0" hangingPunct="1">
+              <a:spcBef>
+                <a:spcPct val="20000"/>
+              </a:spcBef>
+              <a:buFont typeface="Arial" pitchFamily="34" charset="0"/>
+              <a:buChar char="•"/>
+              <a:defRPr sz="2000" kern="1200">
+                <a:solidFill>
+                  <a:schemeClr val="tx1"/>
+                </a:solidFill>
+                <a:latin typeface="+mn-lt"/>
+                <a:ea typeface="+mn-ea"/>
+                <a:cs typeface="+mn-cs"/>
+              </a:defRPr>
+            </a:lvl8pPr>
+            <a:lvl9pPr marL="3886200" indent="-228600" algn="l" defTabSz="914400" rtl="0" eaLnBrk="1" latinLnBrk="0" hangingPunct="1">
+              <a:spcBef>
+                <a:spcPct val="20000"/>
+              </a:spcBef>
+              <a:buFont typeface="Arial" pitchFamily="34" charset="0"/>
+              <a:buChar char="•"/>
+              <a:defRPr sz="2000" kern="1200">
+                <a:solidFill>
+                  <a:schemeClr val="tx1"/>
+                </a:solidFill>
+                <a:latin typeface="+mn-lt"/>
+                <a:ea typeface="+mn-ea"/>
+                <a:cs typeface="+mn-cs"/>
+              </a:defRPr>
+            </a:lvl9pPr>
+          </a:lstStyle>
+          <a:p>
+            <a:r>
+              <a:rPr lang="en-US" sz="2000" dirty="0" smtClean="0"/>
+              <a:t>Very convenient data representation, easy to use.</a:t>
+            </a:r>
+          </a:p>
+          <a:p>
+            <a:r>
+              <a:rPr lang="en-US" sz="2000" dirty="0" smtClean="0"/>
+              <a:t>Provide referencing to source code which is cause memory leak.</a:t>
+            </a:r>
+            <a:endParaRPr lang="en-US" sz="2000" dirty="0" smtClean="0"/>
+          </a:p>
+        </p:txBody>
+      </p:sp>
+      <p:pic>
+        <p:nvPicPr>
+          <p:cNvPr id="5" name="Picture 4"/>
+          <p:cNvPicPr>
+            <a:picLocks noChangeAspect="1"/>
+          </p:cNvPicPr>
+          <p:nvPr/>
+        </p:nvPicPr>
+        <p:blipFill>
+          <a:blip r:embed="rId2">
+            <a:extLst>
+              <a:ext uri="{28A0092B-C50C-407E-A947-70E740481C1C}">
+                <a14:useLocalDpi xmlns:a14="http://schemas.microsoft.com/office/drawing/2010/main" val="0"/>
+              </a:ext>
+            </a:extLst>
+          </a:blip>
+          <a:stretch>
+            <a:fillRect/>
+          </a:stretch>
+        </p:blipFill>
+        <p:spPr>
+          <a:xfrm>
+            <a:off x="1619672" y="2341217"/>
+            <a:ext cx="5580112" cy="4084935"/>
+          </a:xfrm>
+          <a:prstGeom prst="rect">
+            <a:avLst/>
+          </a:prstGeom>
+        </p:spPr>
+      </p:pic>
     </p:spTree>
     <p:extLst>
       <p:ext uri="{BB962C8B-B14F-4D97-AF65-F5344CB8AC3E}">
-        <p14:creationId xmlns:p14="http://schemas.microsoft.com/office/powerpoint/2010/main" val="3857341903"/>
+        <p14:creationId xmlns:p14="http://schemas.microsoft.com/office/powerpoint/2010/main" val="3932463832"/>
       </p:ext>
     </p:extLst>
   </p:cSld>
@@ -32348,6 +34608,1088 @@
     <p:extLst>
       <p:ext uri="{BB962C8B-B14F-4D97-AF65-F5344CB8AC3E}">
         <p14:creationId xmlns:p14="http://schemas.microsoft.com/office/powerpoint/2010/main" val="3117169676"/>
+      </p:ext>
+    </p:extLst>
+  </p:cSld>
+  <p:clrMapOvr>
+    <a:masterClrMapping/>
+  </p:clrMapOvr>
+  <p:timing>
+    <p:tnLst>
+      <p:par>
+        <p:cTn id="1" dur="indefinite" restart="never" nodeType="tmRoot"/>
+      </p:par>
+    </p:tnLst>
+  </p:timing>
+</p:sld>
+</file>
+
+<file path=ppt/slides/slide30.xml><?xml version="1.0" encoding="utf-8"?>
+<p:sld xmlns:a="http://schemas.openxmlformats.org/drawingml/2006/main" xmlns:r="http://schemas.openxmlformats.org/officeDocument/2006/relationships" xmlns:p="http://schemas.openxmlformats.org/presentationml/2006/main">
+  <p:cSld>
+    <p:spTree>
+      <p:nvGrpSpPr>
+        <p:cNvPr id="1" name=""/>
+        <p:cNvGrpSpPr/>
+        <p:nvPr/>
+      </p:nvGrpSpPr>
+      <p:grpSpPr>
+        <a:xfrm>
+          <a:off x="0" y="0"/>
+          <a:ext cx="0" cy="0"/>
+          <a:chOff x="0" y="0"/>
+          <a:chExt cx="0" cy="0"/>
+        </a:xfrm>
+      </p:grpSpPr>
+      <p:sp>
+        <p:nvSpPr>
+          <p:cNvPr id="2" name="Title 1"/>
+          <p:cNvSpPr>
+            <a:spLocks noGrp="1"/>
+          </p:cNvSpPr>
+          <p:nvPr>
+            <p:ph type="title"/>
+          </p:nvPr>
+        </p:nvSpPr>
+        <p:spPr/>
+        <p:txBody>
+          <a:bodyPr/>
+          <a:lstStyle/>
+          <a:p>
+            <a:r>
+              <a:rPr lang="en-US" dirty="0" smtClean="0"/>
+              <a:t>Profiling Tool: </a:t>
+            </a:r>
+            <a:r>
+              <a:rPr lang="en-US" dirty="0" err="1" smtClean="0"/>
+              <a:t>MemProfiler</a:t>
+            </a:r>
+            <a:endParaRPr lang="en-US" dirty="0"/>
+          </a:p>
+        </p:txBody>
+      </p:sp>
+      <p:sp>
+        <p:nvSpPr>
+          <p:cNvPr id="3" name="Content Placeholder 2"/>
+          <p:cNvSpPr txBox="1">
+            <a:spLocks/>
+          </p:cNvSpPr>
+          <p:nvPr/>
+        </p:nvSpPr>
+        <p:spPr>
+          <a:xfrm>
+            <a:off x="611560" y="1196752"/>
+            <a:ext cx="8280920" cy="5112567"/>
+          </a:xfrm>
+          <a:prstGeom prst="rect">
+            <a:avLst/>
+          </a:prstGeom>
+        </p:spPr>
+        <p:txBody>
+          <a:bodyPr/>
+          <a:lstStyle>
+            <a:lvl1pPr marL="342900" indent="-342900" algn="l" defTabSz="914400" rtl="0" eaLnBrk="1" latinLnBrk="0" hangingPunct="1">
+              <a:spcBef>
+                <a:spcPct val="20000"/>
+              </a:spcBef>
+              <a:buFont typeface="Arial" pitchFamily="34" charset="0"/>
+              <a:buChar char="•"/>
+              <a:defRPr sz="3200" kern="1200">
+                <a:solidFill>
+                  <a:schemeClr val="tx1"/>
+                </a:solidFill>
+                <a:latin typeface="+mn-lt"/>
+                <a:ea typeface="+mn-ea"/>
+                <a:cs typeface="+mn-cs"/>
+              </a:defRPr>
+            </a:lvl1pPr>
+            <a:lvl2pPr marL="742950" indent="-285750" algn="l" defTabSz="914400" rtl="0" eaLnBrk="1" latinLnBrk="0" hangingPunct="1">
+              <a:spcBef>
+                <a:spcPct val="20000"/>
+              </a:spcBef>
+              <a:buFont typeface="Arial" pitchFamily="34" charset="0"/>
+              <a:buChar char="–"/>
+              <a:defRPr sz="2800" kern="1200">
+                <a:solidFill>
+                  <a:schemeClr val="tx1"/>
+                </a:solidFill>
+                <a:latin typeface="+mn-lt"/>
+                <a:ea typeface="+mn-ea"/>
+                <a:cs typeface="+mn-cs"/>
+              </a:defRPr>
+            </a:lvl2pPr>
+            <a:lvl3pPr marL="1143000" indent="-228600" algn="l" defTabSz="914400" rtl="0" eaLnBrk="1" latinLnBrk="0" hangingPunct="1">
+              <a:spcBef>
+                <a:spcPct val="20000"/>
+              </a:spcBef>
+              <a:buFont typeface="Arial" pitchFamily="34" charset="0"/>
+              <a:buChar char="•"/>
+              <a:defRPr sz="2400" kern="1200">
+                <a:solidFill>
+                  <a:schemeClr val="tx1"/>
+                </a:solidFill>
+                <a:latin typeface="+mn-lt"/>
+                <a:ea typeface="+mn-ea"/>
+                <a:cs typeface="+mn-cs"/>
+              </a:defRPr>
+            </a:lvl3pPr>
+            <a:lvl4pPr marL="1600200" indent="-228600" algn="l" defTabSz="914400" rtl="0" eaLnBrk="1" latinLnBrk="0" hangingPunct="1">
+              <a:spcBef>
+                <a:spcPct val="20000"/>
+              </a:spcBef>
+              <a:buFont typeface="Arial" pitchFamily="34" charset="0"/>
+              <a:buChar char="–"/>
+              <a:defRPr sz="2000" kern="1200">
+                <a:solidFill>
+                  <a:schemeClr val="tx1"/>
+                </a:solidFill>
+                <a:latin typeface="+mn-lt"/>
+                <a:ea typeface="+mn-ea"/>
+                <a:cs typeface="+mn-cs"/>
+              </a:defRPr>
+            </a:lvl4pPr>
+            <a:lvl5pPr marL="2057400" indent="-228600" algn="l" defTabSz="914400" rtl="0" eaLnBrk="1" latinLnBrk="0" hangingPunct="1">
+              <a:spcBef>
+                <a:spcPct val="20000"/>
+              </a:spcBef>
+              <a:buFont typeface="Arial" pitchFamily="34" charset="0"/>
+              <a:buChar char="»"/>
+              <a:defRPr sz="2000" kern="1200">
+                <a:solidFill>
+                  <a:schemeClr val="tx1"/>
+                </a:solidFill>
+                <a:latin typeface="+mn-lt"/>
+                <a:ea typeface="+mn-ea"/>
+                <a:cs typeface="+mn-cs"/>
+              </a:defRPr>
+            </a:lvl5pPr>
+            <a:lvl6pPr marL="2514600" indent="-228600" algn="l" defTabSz="914400" rtl="0" eaLnBrk="1" latinLnBrk="0" hangingPunct="1">
+              <a:spcBef>
+                <a:spcPct val="20000"/>
+              </a:spcBef>
+              <a:buFont typeface="Arial" pitchFamily="34" charset="0"/>
+              <a:buChar char="•"/>
+              <a:defRPr sz="2000" kern="1200">
+                <a:solidFill>
+                  <a:schemeClr val="tx1"/>
+                </a:solidFill>
+                <a:latin typeface="+mn-lt"/>
+                <a:ea typeface="+mn-ea"/>
+                <a:cs typeface="+mn-cs"/>
+              </a:defRPr>
+            </a:lvl6pPr>
+            <a:lvl7pPr marL="2971800" indent="-228600" algn="l" defTabSz="914400" rtl="0" eaLnBrk="1" latinLnBrk="0" hangingPunct="1">
+              <a:spcBef>
+                <a:spcPct val="20000"/>
+              </a:spcBef>
+              <a:buFont typeface="Arial" pitchFamily="34" charset="0"/>
+              <a:buChar char="•"/>
+              <a:defRPr sz="2000" kern="1200">
+                <a:solidFill>
+                  <a:schemeClr val="tx1"/>
+                </a:solidFill>
+                <a:latin typeface="+mn-lt"/>
+                <a:ea typeface="+mn-ea"/>
+                <a:cs typeface="+mn-cs"/>
+              </a:defRPr>
+            </a:lvl7pPr>
+            <a:lvl8pPr marL="3429000" indent="-228600" algn="l" defTabSz="914400" rtl="0" eaLnBrk="1" latinLnBrk="0" hangingPunct="1">
+              <a:spcBef>
+                <a:spcPct val="20000"/>
+              </a:spcBef>
+              <a:buFont typeface="Arial" pitchFamily="34" charset="0"/>
+              <a:buChar char="•"/>
+              <a:defRPr sz="2000" kern="1200">
+                <a:solidFill>
+                  <a:schemeClr val="tx1"/>
+                </a:solidFill>
+                <a:latin typeface="+mn-lt"/>
+                <a:ea typeface="+mn-ea"/>
+                <a:cs typeface="+mn-cs"/>
+              </a:defRPr>
+            </a:lvl8pPr>
+            <a:lvl9pPr marL="3886200" indent="-228600" algn="l" defTabSz="914400" rtl="0" eaLnBrk="1" latinLnBrk="0" hangingPunct="1">
+              <a:spcBef>
+                <a:spcPct val="20000"/>
+              </a:spcBef>
+              <a:buFont typeface="Arial" pitchFamily="34" charset="0"/>
+              <a:buChar char="•"/>
+              <a:defRPr sz="2000" kern="1200">
+                <a:solidFill>
+                  <a:schemeClr val="tx1"/>
+                </a:solidFill>
+                <a:latin typeface="+mn-lt"/>
+                <a:ea typeface="+mn-ea"/>
+                <a:cs typeface="+mn-cs"/>
+              </a:defRPr>
+            </a:lvl9pPr>
+          </a:lstStyle>
+          <a:p>
+            <a:endParaRPr lang="ru-RU" sz="2400" dirty="0"/>
+          </a:p>
+        </p:txBody>
+      </p:sp>
+      <p:sp>
+        <p:nvSpPr>
+          <p:cNvPr id="4" name="Content Placeholder 2"/>
+          <p:cNvSpPr txBox="1">
+            <a:spLocks/>
+          </p:cNvSpPr>
+          <p:nvPr/>
+        </p:nvSpPr>
+        <p:spPr>
+          <a:xfrm>
+            <a:off x="763960" y="1349152"/>
+            <a:ext cx="8280920" cy="5112567"/>
+          </a:xfrm>
+          <a:prstGeom prst="rect">
+            <a:avLst/>
+          </a:prstGeom>
+        </p:spPr>
+        <p:txBody>
+          <a:bodyPr/>
+          <a:lstStyle>
+            <a:lvl1pPr marL="342900" indent="-342900" algn="l" defTabSz="914400" rtl="0" eaLnBrk="1" latinLnBrk="0" hangingPunct="1">
+              <a:spcBef>
+                <a:spcPct val="20000"/>
+              </a:spcBef>
+              <a:buFont typeface="Arial" pitchFamily="34" charset="0"/>
+              <a:buChar char="•"/>
+              <a:defRPr sz="3200" kern="1200">
+                <a:solidFill>
+                  <a:schemeClr val="tx1"/>
+                </a:solidFill>
+                <a:latin typeface="+mn-lt"/>
+                <a:ea typeface="+mn-ea"/>
+                <a:cs typeface="+mn-cs"/>
+              </a:defRPr>
+            </a:lvl1pPr>
+            <a:lvl2pPr marL="742950" indent="-285750" algn="l" defTabSz="914400" rtl="0" eaLnBrk="1" latinLnBrk="0" hangingPunct="1">
+              <a:spcBef>
+                <a:spcPct val="20000"/>
+              </a:spcBef>
+              <a:buFont typeface="Arial" pitchFamily="34" charset="0"/>
+              <a:buChar char="–"/>
+              <a:defRPr sz="2800" kern="1200">
+                <a:solidFill>
+                  <a:schemeClr val="tx1"/>
+                </a:solidFill>
+                <a:latin typeface="+mn-lt"/>
+                <a:ea typeface="+mn-ea"/>
+                <a:cs typeface="+mn-cs"/>
+              </a:defRPr>
+            </a:lvl2pPr>
+            <a:lvl3pPr marL="1143000" indent="-228600" algn="l" defTabSz="914400" rtl="0" eaLnBrk="1" latinLnBrk="0" hangingPunct="1">
+              <a:spcBef>
+                <a:spcPct val="20000"/>
+              </a:spcBef>
+              <a:buFont typeface="Arial" pitchFamily="34" charset="0"/>
+              <a:buChar char="•"/>
+              <a:defRPr sz="2400" kern="1200">
+                <a:solidFill>
+                  <a:schemeClr val="tx1"/>
+                </a:solidFill>
+                <a:latin typeface="+mn-lt"/>
+                <a:ea typeface="+mn-ea"/>
+                <a:cs typeface="+mn-cs"/>
+              </a:defRPr>
+            </a:lvl3pPr>
+            <a:lvl4pPr marL="1600200" indent="-228600" algn="l" defTabSz="914400" rtl="0" eaLnBrk="1" latinLnBrk="0" hangingPunct="1">
+              <a:spcBef>
+                <a:spcPct val="20000"/>
+              </a:spcBef>
+              <a:buFont typeface="Arial" pitchFamily="34" charset="0"/>
+              <a:buChar char="–"/>
+              <a:defRPr sz="2000" kern="1200">
+                <a:solidFill>
+                  <a:schemeClr val="tx1"/>
+                </a:solidFill>
+                <a:latin typeface="+mn-lt"/>
+                <a:ea typeface="+mn-ea"/>
+                <a:cs typeface="+mn-cs"/>
+              </a:defRPr>
+            </a:lvl4pPr>
+            <a:lvl5pPr marL="2057400" indent="-228600" algn="l" defTabSz="914400" rtl="0" eaLnBrk="1" latinLnBrk="0" hangingPunct="1">
+              <a:spcBef>
+                <a:spcPct val="20000"/>
+              </a:spcBef>
+              <a:buFont typeface="Arial" pitchFamily="34" charset="0"/>
+              <a:buChar char="»"/>
+              <a:defRPr sz="2000" kern="1200">
+                <a:solidFill>
+                  <a:schemeClr val="tx1"/>
+                </a:solidFill>
+                <a:latin typeface="+mn-lt"/>
+                <a:ea typeface="+mn-ea"/>
+                <a:cs typeface="+mn-cs"/>
+              </a:defRPr>
+            </a:lvl5pPr>
+            <a:lvl6pPr marL="2514600" indent="-228600" algn="l" defTabSz="914400" rtl="0" eaLnBrk="1" latinLnBrk="0" hangingPunct="1">
+              <a:spcBef>
+                <a:spcPct val="20000"/>
+              </a:spcBef>
+              <a:buFont typeface="Arial" pitchFamily="34" charset="0"/>
+              <a:buChar char="•"/>
+              <a:defRPr sz="2000" kern="1200">
+                <a:solidFill>
+                  <a:schemeClr val="tx1"/>
+                </a:solidFill>
+                <a:latin typeface="+mn-lt"/>
+                <a:ea typeface="+mn-ea"/>
+                <a:cs typeface="+mn-cs"/>
+              </a:defRPr>
+            </a:lvl6pPr>
+            <a:lvl7pPr marL="2971800" indent="-228600" algn="l" defTabSz="914400" rtl="0" eaLnBrk="1" latinLnBrk="0" hangingPunct="1">
+              <a:spcBef>
+                <a:spcPct val="20000"/>
+              </a:spcBef>
+              <a:buFont typeface="Arial" pitchFamily="34" charset="0"/>
+              <a:buChar char="•"/>
+              <a:defRPr sz="2000" kern="1200">
+                <a:solidFill>
+                  <a:schemeClr val="tx1"/>
+                </a:solidFill>
+                <a:latin typeface="+mn-lt"/>
+                <a:ea typeface="+mn-ea"/>
+                <a:cs typeface="+mn-cs"/>
+              </a:defRPr>
+            </a:lvl7pPr>
+            <a:lvl8pPr marL="3429000" indent="-228600" algn="l" defTabSz="914400" rtl="0" eaLnBrk="1" latinLnBrk="0" hangingPunct="1">
+              <a:spcBef>
+                <a:spcPct val="20000"/>
+              </a:spcBef>
+              <a:buFont typeface="Arial" pitchFamily="34" charset="0"/>
+              <a:buChar char="•"/>
+              <a:defRPr sz="2000" kern="1200">
+                <a:solidFill>
+                  <a:schemeClr val="tx1"/>
+                </a:solidFill>
+                <a:latin typeface="+mn-lt"/>
+                <a:ea typeface="+mn-ea"/>
+                <a:cs typeface="+mn-cs"/>
+              </a:defRPr>
+            </a:lvl8pPr>
+            <a:lvl9pPr marL="3886200" indent="-228600" algn="l" defTabSz="914400" rtl="0" eaLnBrk="1" latinLnBrk="0" hangingPunct="1">
+              <a:spcBef>
+                <a:spcPct val="20000"/>
+              </a:spcBef>
+              <a:buFont typeface="Arial" pitchFamily="34" charset="0"/>
+              <a:buChar char="•"/>
+              <a:defRPr sz="2000" kern="1200">
+                <a:solidFill>
+                  <a:schemeClr val="tx1"/>
+                </a:solidFill>
+                <a:latin typeface="+mn-lt"/>
+                <a:ea typeface="+mn-ea"/>
+                <a:cs typeface="+mn-cs"/>
+              </a:defRPr>
+            </a:lvl9pPr>
+          </a:lstStyle>
+          <a:p>
+            <a:r>
+              <a:rPr lang="en-US" sz="2000" dirty="0" smtClean="0"/>
+              <a:t>Many useful features for memory consumption, and performance analysis.</a:t>
+            </a:r>
+          </a:p>
+          <a:p>
+            <a:r>
+              <a:rPr lang="en-US" sz="2000" dirty="0" smtClean="0"/>
+              <a:t>Have data access profiling in latest version.</a:t>
+            </a:r>
+          </a:p>
+          <a:p>
+            <a:endParaRPr lang="en-US" sz="2000" dirty="0" smtClean="0"/>
+          </a:p>
+        </p:txBody>
+      </p:sp>
+      <p:pic>
+        <p:nvPicPr>
+          <p:cNvPr id="5" name="Picture 4"/>
+          <p:cNvPicPr>
+            <a:picLocks noChangeAspect="1"/>
+          </p:cNvPicPr>
+          <p:nvPr/>
+        </p:nvPicPr>
+        <p:blipFill>
+          <a:blip r:embed="rId2">
+            <a:extLst>
+              <a:ext uri="{28A0092B-C50C-407E-A947-70E740481C1C}">
+                <a14:useLocalDpi xmlns:a14="http://schemas.microsoft.com/office/drawing/2010/main" val="0"/>
+              </a:ext>
+            </a:extLst>
+          </a:blip>
+          <a:stretch>
+            <a:fillRect/>
+          </a:stretch>
+        </p:blipFill>
+        <p:spPr>
+          <a:xfrm>
+            <a:off x="1043608" y="2445692"/>
+            <a:ext cx="6571275" cy="4023524"/>
+          </a:xfrm>
+          <a:prstGeom prst="rect">
+            <a:avLst/>
+          </a:prstGeom>
+        </p:spPr>
+      </p:pic>
+    </p:spTree>
+    <p:extLst>
+      <p:ext uri="{BB962C8B-B14F-4D97-AF65-F5344CB8AC3E}">
+        <p14:creationId xmlns:p14="http://schemas.microsoft.com/office/powerpoint/2010/main" val="673273499"/>
+      </p:ext>
+    </p:extLst>
+  </p:cSld>
+  <p:clrMapOvr>
+    <a:masterClrMapping/>
+  </p:clrMapOvr>
+  <p:timing>
+    <p:tnLst>
+      <p:par>
+        <p:cTn id="1" dur="indefinite" restart="never" nodeType="tmRoot"/>
+      </p:par>
+    </p:tnLst>
+  </p:timing>
+</p:sld>
+</file>
+
+<file path=ppt/slides/slide31.xml><?xml version="1.0" encoding="utf-8"?>
+<p:sld xmlns:a="http://schemas.openxmlformats.org/drawingml/2006/main" xmlns:r="http://schemas.openxmlformats.org/officeDocument/2006/relationships" xmlns:p="http://schemas.openxmlformats.org/presentationml/2006/main">
+  <p:cSld>
+    <p:spTree>
+      <p:nvGrpSpPr>
+        <p:cNvPr id="1" name=""/>
+        <p:cNvGrpSpPr/>
+        <p:nvPr/>
+      </p:nvGrpSpPr>
+      <p:grpSpPr>
+        <a:xfrm>
+          <a:off x="0" y="0"/>
+          <a:ext cx="0" cy="0"/>
+          <a:chOff x="0" y="0"/>
+          <a:chExt cx="0" cy="0"/>
+        </a:xfrm>
+      </p:grpSpPr>
+      <p:sp>
+        <p:nvSpPr>
+          <p:cNvPr id="2" name="Title 1"/>
+          <p:cNvSpPr>
+            <a:spLocks noGrp="1"/>
+          </p:cNvSpPr>
+          <p:nvPr>
+            <p:ph type="title"/>
+          </p:nvPr>
+        </p:nvSpPr>
+        <p:spPr/>
+        <p:txBody>
+          <a:bodyPr/>
+          <a:lstStyle/>
+          <a:p>
+            <a:r>
+              <a:rPr lang="en-US" dirty="0" smtClean="0"/>
+              <a:t>Profiling Tool: </a:t>
+            </a:r>
+            <a:r>
+              <a:rPr lang="en-US" dirty="0" err="1" smtClean="0"/>
+              <a:t>MemProfiler</a:t>
+            </a:r>
+            <a:endParaRPr lang="en-US" dirty="0"/>
+          </a:p>
+        </p:txBody>
+      </p:sp>
+      <p:sp>
+        <p:nvSpPr>
+          <p:cNvPr id="3" name="Content Placeholder 2"/>
+          <p:cNvSpPr txBox="1">
+            <a:spLocks/>
+          </p:cNvSpPr>
+          <p:nvPr/>
+        </p:nvSpPr>
+        <p:spPr>
+          <a:xfrm>
+            <a:off x="611560" y="1196752"/>
+            <a:ext cx="8280920" cy="5112567"/>
+          </a:xfrm>
+          <a:prstGeom prst="rect">
+            <a:avLst/>
+          </a:prstGeom>
+        </p:spPr>
+        <p:txBody>
+          <a:bodyPr/>
+          <a:lstStyle>
+            <a:lvl1pPr marL="342900" indent="-342900" algn="l" defTabSz="914400" rtl="0" eaLnBrk="1" latinLnBrk="0" hangingPunct="1">
+              <a:spcBef>
+                <a:spcPct val="20000"/>
+              </a:spcBef>
+              <a:buFont typeface="Arial" pitchFamily="34" charset="0"/>
+              <a:buChar char="•"/>
+              <a:defRPr sz="3200" kern="1200">
+                <a:solidFill>
+                  <a:schemeClr val="tx1"/>
+                </a:solidFill>
+                <a:latin typeface="+mn-lt"/>
+                <a:ea typeface="+mn-ea"/>
+                <a:cs typeface="+mn-cs"/>
+              </a:defRPr>
+            </a:lvl1pPr>
+            <a:lvl2pPr marL="742950" indent="-285750" algn="l" defTabSz="914400" rtl="0" eaLnBrk="1" latinLnBrk="0" hangingPunct="1">
+              <a:spcBef>
+                <a:spcPct val="20000"/>
+              </a:spcBef>
+              <a:buFont typeface="Arial" pitchFamily="34" charset="0"/>
+              <a:buChar char="–"/>
+              <a:defRPr sz="2800" kern="1200">
+                <a:solidFill>
+                  <a:schemeClr val="tx1"/>
+                </a:solidFill>
+                <a:latin typeface="+mn-lt"/>
+                <a:ea typeface="+mn-ea"/>
+                <a:cs typeface="+mn-cs"/>
+              </a:defRPr>
+            </a:lvl2pPr>
+            <a:lvl3pPr marL="1143000" indent="-228600" algn="l" defTabSz="914400" rtl="0" eaLnBrk="1" latinLnBrk="0" hangingPunct="1">
+              <a:spcBef>
+                <a:spcPct val="20000"/>
+              </a:spcBef>
+              <a:buFont typeface="Arial" pitchFamily="34" charset="0"/>
+              <a:buChar char="•"/>
+              <a:defRPr sz="2400" kern="1200">
+                <a:solidFill>
+                  <a:schemeClr val="tx1"/>
+                </a:solidFill>
+                <a:latin typeface="+mn-lt"/>
+                <a:ea typeface="+mn-ea"/>
+                <a:cs typeface="+mn-cs"/>
+              </a:defRPr>
+            </a:lvl3pPr>
+            <a:lvl4pPr marL="1600200" indent="-228600" algn="l" defTabSz="914400" rtl="0" eaLnBrk="1" latinLnBrk="0" hangingPunct="1">
+              <a:spcBef>
+                <a:spcPct val="20000"/>
+              </a:spcBef>
+              <a:buFont typeface="Arial" pitchFamily="34" charset="0"/>
+              <a:buChar char="–"/>
+              <a:defRPr sz="2000" kern="1200">
+                <a:solidFill>
+                  <a:schemeClr val="tx1"/>
+                </a:solidFill>
+                <a:latin typeface="+mn-lt"/>
+                <a:ea typeface="+mn-ea"/>
+                <a:cs typeface="+mn-cs"/>
+              </a:defRPr>
+            </a:lvl4pPr>
+            <a:lvl5pPr marL="2057400" indent="-228600" algn="l" defTabSz="914400" rtl="0" eaLnBrk="1" latinLnBrk="0" hangingPunct="1">
+              <a:spcBef>
+                <a:spcPct val="20000"/>
+              </a:spcBef>
+              <a:buFont typeface="Arial" pitchFamily="34" charset="0"/>
+              <a:buChar char="»"/>
+              <a:defRPr sz="2000" kern="1200">
+                <a:solidFill>
+                  <a:schemeClr val="tx1"/>
+                </a:solidFill>
+                <a:latin typeface="+mn-lt"/>
+                <a:ea typeface="+mn-ea"/>
+                <a:cs typeface="+mn-cs"/>
+              </a:defRPr>
+            </a:lvl5pPr>
+            <a:lvl6pPr marL="2514600" indent="-228600" algn="l" defTabSz="914400" rtl="0" eaLnBrk="1" latinLnBrk="0" hangingPunct="1">
+              <a:spcBef>
+                <a:spcPct val="20000"/>
+              </a:spcBef>
+              <a:buFont typeface="Arial" pitchFamily="34" charset="0"/>
+              <a:buChar char="•"/>
+              <a:defRPr sz="2000" kern="1200">
+                <a:solidFill>
+                  <a:schemeClr val="tx1"/>
+                </a:solidFill>
+                <a:latin typeface="+mn-lt"/>
+                <a:ea typeface="+mn-ea"/>
+                <a:cs typeface="+mn-cs"/>
+              </a:defRPr>
+            </a:lvl6pPr>
+            <a:lvl7pPr marL="2971800" indent="-228600" algn="l" defTabSz="914400" rtl="0" eaLnBrk="1" latinLnBrk="0" hangingPunct="1">
+              <a:spcBef>
+                <a:spcPct val="20000"/>
+              </a:spcBef>
+              <a:buFont typeface="Arial" pitchFamily="34" charset="0"/>
+              <a:buChar char="•"/>
+              <a:defRPr sz="2000" kern="1200">
+                <a:solidFill>
+                  <a:schemeClr val="tx1"/>
+                </a:solidFill>
+                <a:latin typeface="+mn-lt"/>
+                <a:ea typeface="+mn-ea"/>
+                <a:cs typeface="+mn-cs"/>
+              </a:defRPr>
+            </a:lvl7pPr>
+            <a:lvl8pPr marL="3429000" indent="-228600" algn="l" defTabSz="914400" rtl="0" eaLnBrk="1" latinLnBrk="0" hangingPunct="1">
+              <a:spcBef>
+                <a:spcPct val="20000"/>
+              </a:spcBef>
+              <a:buFont typeface="Arial" pitchFamily="34" charset="0"/>
+              <a:buChar char="•"/>
+              <a:defRPr sz="2000" kern="1200">
+                <a:solidFill>
+                  <a:schemeClr val="tx1"/>
+                </a:solidFill>
+                <a:latin typeface="+mn-lt"/>
+                <a:ea typeface="+mn-ea"/>
+                <a:cs typeface="+mn-cs"/>
+              </a:defRPr>
+            </a:lvl8pPr>
+            <a:lvl9pPr marL="3886200" indent="-228600" algn="l" defTabSz="914400" rtl="0" eaLnBrk="1" latinLnBrk="0" hangingPunct="1">
+              <a:spcBef>
+                <a:spcPct val="20000"/>
+              </a:spcBef>
+              <a:buFont typeface="Arial" pitchFamily="34" charset="0"/>
+              <a:buChar char="•"/>
+              <a:defRPr sz="2000" kern="1200">
+                <a:solidFill>
+                  <a:schemeClr val="tx1"/>
+                </a:solidFill>
+                <a:latin typeface="+mn-lt"/>
+                <a:ea typeface="+mn-ea"/>
+                <a:cs typeface="+mn-cs"/>
+              </a:defRPr>
+            </a:lvl9pPr>
+          </a:lstStyle>
+          <a:p>
+            <a:endParaRPr lang="ru-RU" sz="2400" dirty="0"/>
+          </a:p>
+        </p:txBody>
+      </p:sp>
+      <p:sp>
+        <p:nvSpPr>
+          <p:cNvPr id="4" name="Content Placeholder 2"/>
+          <p:cNvSpPr txBox="1">
+            <a:spLocks/>
+          </p:cNvSpPr>
+          <p:nvPr/>
+        </p:nvSpPr>
+        <p:spPr>
+          <a:xfrm>
+            <a:off x="763960" y="1349152"/>
+            <a:ext cx="8280920" cy="5112567"/>
+          </a:xfrm>
+          <a:prstGeom prst="rect">
+            <a:avLst/>
+          </a:prstGeom>
+        </p:spPr>
+        <p:txBody>
+          <a:bodyPr/>
+          <a:lstStyle>
+            <a:lvl1pPr marL="342900" indent="-342900" algn="l" defTabSz="914400" rtl="0" eaLnBrk="1" latinLnBrk="0" hangingPunct="1">
+              <a:spcBef>
+                <a:spcPct val="20000"/>
+              </a:spcBef>
+              <a:buFont typeface="Arial" pitchFamily="34" charset="0"/>
+              <a:buChar char="•"/>
+              <a:defRPr sz="3200" kern="1200">
+                <a:solidFill>
+                  <a:schemeClr val="tx1"/>
+                </a:solidFill>
+                <a:latin typeface="+mn-lt"/>
+                <a:ea typeface="+mn-ea"/>
+                <a:cs typeface="+mn-cs"/>
+              </a:defRPr>
+            </a:lvl1pPr>
+            <a:lvl2pPr marL="742950" indent="-285750" algn="l" defTabSz="914400" rtl="0" eaLnBrk="1" latinLnBrk="0" hangingPunct="1">
+              <a:spcBef>
+                <a:spcPct val="20000"/>
+              </a:spcBef>
+              <a:buFont typeface="Arial" pitchFamily="34" charset="0"/>
+              <a:buChar char="–"/>
+              <a:defRPr sz="2800" kern="1200">
+                <a:solidFill>
+                  <a:schemeClr val="tx1"/>
+                </a:solidFill>
+                <a:latin typeface="+mn-lt"/>
+                <a:ea typeface="+mn-ea"/>
+                <a:cs typeface="+mn-cs"/>
+              </a:defRPr>
+            </a:lvl2pPr>
+            <a:lvl3pPr marL="1143000" indent="-228600" algn="l" defTabSz="914400" rtl="0" eaLnBrk="1" latinLnBrk="0" hangingPunct="1">
+              <a:spcBef>
+                <a:spcPct val="20000"/>
+              </a:spcBef>
+              <a:buFont typeface="Arial" pitchFamily="34" charset="0"/>
+              <a:buChar char="•"/>
+              <a:defRPr sz="2400" kern="1200">
+                <a:solidFill>
+                  <a:schemeClr val="tx1"/>
+                </a:solidFill>
+                <a:latin typeface="+mn-lt"/>
+                <a:ea typeface="+mn-ea"/>
+                <a:cs typeface="+mn-cs"/>
+              </a:defRPr>
+            </a:lvl3pPr>
+            <a:lvl4pPr marL="1600200" indent="-228600" algn="l" defTabSz="914400" rtl="0" eaLnBrk="1" latinLnBrk="0" hangingPunct="1">
+              <a:spcBef>
+                <a:spcPct val="20000"/>
+              </a:spcBef>
+              <a:buFont typeface="Arial" pitchFamily="34" charset="0"/>
+              <a:buChar char="–"/>
+              <a:defRPr sz="2000" kern="1200">
+                <a:solidFill>
+                  <a:schemeClr val="tx1"/>
+                </a:solidFill>
+                <a:latin typeface="+mn-lt"/>
+                <a:ea typeface="+mn-ea"/>
+                <a:cs typeface="+mn-cs"/>
+              </a:defRPr>
+            </a:lvl4pPr>
+            <a:lvl5pPr marL="2057400" indent="-228600" algn="l" defTabSz="914400" rtl="0" eaLnBrk="1" latinLnBrk="0" hangingPunct="1">
+              <a:spcBef>
+                <a:spcPct val="20000"/>
+              </a:spcBef>
+              <a:buFont typeface="Arial" pitchFamily="34" charset="0"/>
+              <a:buChar char="»"/>
+              <a:defRPr sz="2000" kern="1200">
+                <a:solidFill>
+                  <a:schemeClr val="tx1"/>
+                </a:solidFill>
+                <a:latin typeface="+mn-lt"/>
+                <a:ea typeface="+mn-ea"/>
+                <a:cs typeface="+mn-cs"/>
+              </a:defRPr>
+            </a:lvl5pPr>
+            <a:lvl6pPr marL="2514600" indent="-228600" algn="l" defTabSz="914400" rtl="0" eaLnBrk="1" latinLnBrk="0" hangingPunct="1">
+              <a:spcBef>
+                <a:spcPct val="20000"/>
+              </a:spcBef>
+              <a:buFont typeface="Arial" pitchFamily="34" charset="0"/>
+              <a:buChar char="•"/>
+              <a:defRPr sz="2000" kern="1200">
+                <a:solidFill>
+                  <a:schemeClr val="tx1"/>
+                </a:solidFill>
+                <a:latin typeface="+mn-lt"/>
+                <a:ea typeface="+mn-ea"/>
+                <a:cs typeface="+mn-cs"/>
+              </a:defRPr>
+            </a:lvl6pPr>
+            <a:lvl7pPr marL="2971800" indent="-228600" algn="l" defTabSz="914400" rtl="0" eaLnBrk="1" latinLnBrk="0" hangingPunct="1">
+              <a:spcBef>
+                <a:spcPct val="20000"/>
+              </a:spcBef>
+              <a:buFont typeface="Arial" pitchFamily="34" charset="0"/>
+              <a:buChar char="•"/>
+              <a:defRPr sz="2000" kern="1200">
+                <a:solidFill>
+                  <a:schemeClr val="tx1"/>
+                </a:solidFill>
+                <a:latin typeface="+mn-lt"/>
+                <a:ea typeface="+mn-ea"/>
+                <a:cs typeface="+mn-cs"/>
+              </a:defRPr>
+            </a:lvl7pPr>
+            <a:lvl8pPr marL="3429000" indent="-228600" algn="l" defTabSz="914400" rtl="0" eaLnBrk="1" latinLnBrk="0" hangingPunct="1">
+              <a:spcBef>
+                <a:spcPct val="20000"/>
+              </a:spcBef>
+              <a:buFont typeface="Arial" pitchFamily="34" charset="0"/>
+              <a:buChar char="•"/>
+              <a:defRPr sz="2000" kern="1200">
+                <a:solidFill>
+                  <a:schemeClr val="tx1"/>
+                </a:solidFill>
+                <a:latin typeface="+mn-lt"/>
+                <a:ea typeface="+mn-ea"/>
+                <a:cs typeface="+mn-cs"/>
+              </a:defRPr>
+            </a:lvl8pPr>
+            <a:lvl9pPr marL="3886200" indent="-228600" algn="l" defTabSz="914400" rtl="0" eaLnBrk="1" latinLnBrk="0" hangingPunct="1">
+              <a:spcBef>
+                <a:spcPct val="20000"/>
+              </a:spcBef>
+              <a:buFont typeface="Arial" pitchFamily="34" charset="0"/>
+              <a:buChar char="•"/>
+              <a:defRPr sz="2000" kern="1200">
+                <a:solidFill>
+                  <a:schemeClr val="tx1"/>
+                </a:solidFill>
+                <a:latin typeface="+mn-lt"/>
+                <a:ea typeface="+mn-ea"/>
+                <a:cs typeface="+mn-cs"/>
+              </a:defRPr>
+            </a:lvl9pPr>
+          </a:lstStyle>
+          <a:p>
+            <a:r>
+              <a:rPr lang="en-US" sz="2000" dirty="0" smtClean="0"/>
+              <a:t>Easy and free.</a:t>
+            </a:r>
+          </a:p>
+          <a:p>
+            <a:r>
+              <a:rPr lang="en-US" sz="2000" dirty="0" smtClean="0"/>
+              <a:t>Integrated in Visual Studio</a:t>
+            </a:r>
+          </a:p>
+          <a:p>
+            <a:r>
+              <a:rPr lang="en-US" sz="2000" dirty="0" smtClean="0"/>
+              <a:t>Command based interface.</a:t>
+            </a:r>
+          </a:p>
+          <a:p>
+            <a:r>
+              <a:rPr lang="en-US" sz="2000" dirty="0" smtClean="0"/>
+              <a:t>Good for quick initial memory profiling.</a:t>
+            </a:r>
+          </a:p>
+        </p:txBody>
+      </p:sp>
+      <p:pic>
+        <p:nvPicPr>
+          <p:cNvPr id="5" name="Picture 4"/>
+          <p:cNvPicPr>
+            <a:picLocks noChangeAspect="1"/>
+          </p:cNvPicPr>
+          <p:nvPr/>
+        </p:nvPicPr>
+        <p:blipFill>
+          <a:blip r:embed="rId2">
+            <a:extLst>
+              <a:ext uri="{28A0092B-C50C-407E-A947-70E740481C1C}">
+                <a14:useLocalDpi xmlns:a14="http://schemas.microsoft.com/office/drawing/2010/main" val="0"/>
+              </a:ext>
+            </a:extLst>
+          </a:blip>
+          <a:stretch>
+            <a:fillRect/>
+          </a:stretch>
+        </p:blipFill>
+        <p:spPr>
+          <a:xfrm>
+            <a:off x="1452316" y="3383931"/>
+            <a:ext cx="6279513" cy="3001588"/>
+          </a:xfrm>
+          <a:prstGeom prst="rect">
+            <a:avLst/>
+          </a:prstGeom>
+        </p:spPr>
+      </p:pic>
+    </p:spTree>
+    <p:extLst>
+      <p:ext uri="{BB962C8B-B14F-4D97-AF65-F5344CB8AC3E}">
+        <p14:creationId xmlns:p14="http://schemas.microsoft.com/office/powerpoint/2010/main" val="3038345518"/>
+      </p:ext>
+    </p:extLst>
+  </p:cSld>
+  <p:clrMapOvr>
+    <a:masterClrMapping/>
+  </p:clrMapOvr>
+  <p:timing>
+    <p:tnLst>
+      <p:par>
+        <p:cTn id="1" dur="indefinite" restart="never" nodeType="tmRoot"/>
+      </p:par>
+    </p:tnLst>
+  </p:timing>
+</p:sld>
+</file>
+
+<file path=ppt/slides/slide32.xml><?xml version="1.0" encoding="utf-8"?>
+<p:sld xmlns:a="http://schemas.openxmlformats.org/drawingml/2006/main" xmlns:r="http://schemas.openxmlformats.org/officeDocument/2006/relationships" xmlns:p="http://schemas.openxmlformats.org/presentationml/2006/main">
+  <p:cSld>
+    <p:spTree>
+      <p:nvGrpSpPr>
+        <p:cNvPr id="1" name=""/>
+        <p:cNvGrpSpPr/>
+        <p:nvPr/>
+      </p:nvGrpSpPr>
+      <p:grpSpPr>
+        <a:xfrm>
+          <a:off x="0" y="0"/>
+          <a:ext cx="0" cy="0"/>
+          <a:chOff x="0" y="0"/>
+          <a:chExt cx="0" cy="0"/>
+        </a:xfrm>
+      </p:grpSpPr>
+      <p:sp>
+        <p:nvSpPr>
+          <p:cNvPr id="2" name="Text Placeholder 1"/>
+          <p:cNvSpPr>
+            <a:spLocks noGrp="1"/>
+          </p:cNvSpPr>
+          <p:nvPr>
+            <p:ph type="body" sz="quarter" idx="10"/>
+          </p:nvPr>
+        </p:nvSpPr>
+        <p:spPr/>
+        <p:txBody>
+          <a:bodyPr/>
+          <a:lstStyle/>
+          <a:p>
+            <a:r>
+              <a:rPr lang="en-US" dirty="0" smtClean="0"/>
+              <a:t>Yuriy Shapovalov</a:t>
+            </a:r>
+            <a:endParaRPr lang="en-US" dirty="0"/>
+          </a:p>
+        </p:txBody>
+      </p:sp>
+      <p:sp>
+        <p:nvSpPr>
+          <p:cNvPr id="3" name="Text Placeholder 2"/>
+          <p:cNvSpPr>
+            <a:spLocks noGrp="1"/>
+          </p:cNvSpPr>
+          <p:nvPr>
+            <p:ph type="body" sz="quarter" idx="11"/>
+          </p:nvPr>
+        </p:nvSpPr>
+        <p:spPr>
+          <a:xfrm>
+            <a:off x="595792" y="3273667"/>
+            <a:ext cx="4312143" cy="353943"/>
+          </a:xfrm>
+        </p:spPr>
+        <p:txBody>
+          <a:bodyPr/>
+          <a:lstStyle/>
+          <a:p>
+            <a:r>
+              <a:rPr lang="en-US" dirty="0" smtClean="0"/>
+              <a:t>Senior Software Engineer, EPAM (Kharkov)</a:t>
+            </a:r>
+            <a:endParaRPr lang="en-US" dirty="0"/>
+          </a:p>
+        </p:txBody>
+      </p:sp>
+      <p:sp>
+        <p:nvSpPr>
+          <p:cNvPr id="4" name="Text Placeholder 3"/>
+          <p:cNvSpPr>
+            <a:spLocks noGrp="1"/>
+          </p:cNvSpPr>
+          <p:nvPr>
+            <p:ph type="body" sz="quarter" idx="12"/>
+          </p:nvPr>
+        </p:nvSpPr>
+        <p:spPr>
+          <a:xfrm>
+            <a:off x="1078992" y="4187952"/>
+            <a:ext cx="3493008" cy="477699"/>
+          </a:xfrm>
+        </p:spPr>
+        <p:txBody>
+          <a:bodyPr/>
+          <a:lstStyle/>
+          <a:p>
+            <a:r>
+              <a:rPr lang="en-US" dirty="0" smtClean="0"/>
+              <a:t>yurii_shapovalov@epam.com</a:t>
+            </a:r>
+            <a:endParaRPr lang="en-US" dirty="0"/>
+          </a:p>
+        </p:txBody>
+      </p:sp>
+      <p:sp>
+        <p:nvSpPr>
+          <p:cNvPr id="5" name="Text Placeholder 4"/>
+          <p:cNvSpPr>
+            <a:spLocks noGrp="1"/>
+          </p:cNvSpPr>
+          <p:nvPr>
+            <p:ph type="body" sz="quarter" idx="13"/>
+          </p:nvPr>
+        </p:nvSpPr>
+        <p:spPr>
+          <a:xfrm>
+            <a:off x="1078992" y="4974336"/>
+            <a:ext cx="3493008" cy="477699"/>
+          </a:xfrm>
+        </p:spPr>
+        <p:txBody>
+          <a:bodyPr/>
+          <a:lstStyle/>
+          <a:p>
+            <a:r>
+              <a:rPr lang="en-US" sz="1800" dirty="0" smtClean="0"/>
+              <a:t>linkedin.com/in/</a:t>
+            </a:r>
+            <a:r>
+              <a:rPr lang="en-US" sz="1800" dirty="0" err="1" smtClean="0"/>
+              <a:t>yuriyshapovalov</a:t>
+            </a:r>
+            <a:endParaRPr lang="en-US" sz="1800" dirty="0"/>
+          </a:p>
+        </p:txBody>
+      </p:sp>
+      <p:sp>
+        <p:nvSpPr>
+          <p:cNvPr id="6" name="Text Placeholder 5"/>
+          <p:cNvSpPr>
+            <a:spLocks noGrp="1"/>
+          </p:cNvSpPr>
+          <p:nvPr>
+            <p:ph type="body" sz="quarter" idx="14"/>
+          </p:nvPr>
+        </p:nvSpPr>
+        <p:spPr/>
+        <p:txBody>
+          <a:bodyPr/>
+          <a:lstStyle/>
+          <a:p>
+            <a:endParaRPr lang="en-US"/>
+          </a:p>
+        </p:txBody>
+      </p:sp>
+      <p:sp>
+        <p:nvSpPr>
+          <p:cNvPr id="7" name="Text Placeholder 6"/>
+          <p:cNvSpPr>
+            <a:spLocks noGrp="1"/>
+          </p:cNvSpPr>
+          <p:nvPr>
+            <p:ph type="body" sz="quarter" idx="15"/>
+          </p:nvPr>
+        </p:nvSpPr>
+        <p:spPr/>
+        <p:txBody>
+          <a:bodyPr/>
+          <a:lstStyle/>
+          <a:p>
+            <a:r>
+              <a:rPr lang="en-US" dirty="0" smtClean="0"/>
+              <a:t>shapovalov.yuriy</a:t>
+            </a:r>
+            <a:endParaRPr lang="en-US" dirty="0"/>
+          </a:p>
+        </p:txBody>
+      </p:sp>
+      <p:sp>
+        <p:nvSpPr>
+          <p:cNvPr id="8" name="Text Placeholder 7"/>
+          <p:cNvSpPr>
+            <a:spLocks noGrp="1"/>
+          </p:cNvSpPr>
+          <p:nvPr>
+            <p:ph type="body" sz="quarter" idx="16"/>
+          </p:nvPr>
+        </p:nvSpPr>
+        <p:spPr/>
+        <p:txBody>
+          <a:bodyPr/>
+          <a:lstStyle/>
+          <a:p>
+            <a:r>
+              <a:rPr lang="en-US" dirty="0" smtClean="0"/>
+              <a:t>@</a:t>
+            </a:r>
+            <a:r>
+              <a:rPr lang="en-US" dirty="0" err="1" smtClean="0"/>
+              <a:t>YuriyShapovalov</a:t>
+            </a:r>
+            <a:endParaRPr lang="en-US" dirty="0"/>
+          </a:p>
+        </p:txBody>
+      </p:sp>
+    </p:spTree>
+    <p:extLst>
+      <p:ext uri="{BB962C8B-B14F-4D97-AF65-F5344CB8AC3E}">
+        <p14:creationId xmlns:p14="http://schemas.microsoft.com/office/powerpoint/2010/main" val="3857341903"/>
       </p:ext>
     </p:extLst>
   </p:cSld>

</xml_diff>